<commit_message>
gift on her birthday
</commit_message>
<xml_diff>
--- a/mood.pptx
+++ b/mood.pptx
@@ -274,7 +274,7 @@
           <a:p>
             <a:fld id="{2C937129-3323-4A0E-946D-8D61D760E2BF}" type="datetimeFigureOut">
               <a:rPr lang="en-US" smtClean="0"/>
-              <a:t>11/25/2019</a:t>
+              <a:t>11/29/2019</a:t>
             </a:fld>
             <a:endParaRPr lang="en-US"/>
           </a:p>
@@ -472,7 +472,7 @@
           <a:p>
             <a:fld id="{2C937129-3323-4A0E-946D-8D61D760E2BF}" type="datetimeFigureOut">
               <a:rPr lang="en-US" smtClean="0"/>
-              <a:t>11/25/2019</a:t>
+              <a:t>11/29/2019</a:t>
             </a:fld>
             <a:endParaRPr lang="en-US"/>
           </a:p>
@@ -680,7 +680,7 @@
           <a:p>
             <a:fld id="{2C937129-3323-4A0E-946D-8D61D760E2BF}" type="datetimeFigureOut">
               <a:rPr lang="en-US" smtClean="0"/>
-              <a:t>11/25/2019</a:t>
+              <a:t>11/29/2019</a:t>
             </a:fld>
             <a:endParaRPr lang="en-US"/>
           </a:p>
@@ -878,7 +878,7 @@
           <a:p>
             <a:fld id="{2C937129-3323-4A0E-946D-8D61D760E2BF}" type="datetimeFigureOut">
               <a:rPr lang="en-US" smtClean="0"/>
-              <a:t>11/25/2019</a:t>
+              <a:t>11/29/2019</a:t>
             </a:fld>
             <a:endParaRPr lang="en-US"/>
           </a:p>
@@ -1153,7 +1153,7 @@
           <a:p>
             <a:fld id="{2C937129-3323-4A0E-946D-8D61D760E2BF}" type="datetimeFigureOut">
               <a:rPr lang="en-US" smtClean="0"/>
-              <a:t>11/25/2019</a:t>
+              <a:t>11/29/2019</a:t>
             </a:fld>
             <a:endParaRPr lang="en-US"/>
           </a:p>
@@ -1418,7 +1418,7 @@
           <a:p>
             <a:fld id="{2C937129-3323-4A0E-946D-8D61D760E2BF}" type="datetimeFigureOut">
               <a:rPr lang="en-US" smtClean="0"/>
-              <a:t>11/25/2019</a:t>
+              <a:t>11/29/2019</a:t>
             </a:fld>
             <a:endParaRPr lang="en-US"/>
           </a:p>
@@ -1830,7 +1830,7 @@
           <a:p>
             <a:fld id="{2C937129-3323-4A0E-946D-8D61D760E2BF}" type="datetimeFigureOut">
               <a:rPr lang="en-US" smtClean="0"/>
-              <a:t>11/25/2019</a:t>
+              <a:t>11/29/2019</a:t>
             </a:fld>
             <a:endParaRPr lang="en-US"/>
           </a:p>
@@ -1971,7 +1971,7 @@
           <a:p>
             <a:fld id="{2C937129-3323-4A0E-946D-8D61D760E2BF}" type="datetimeFigureOut">
               <a:rPr lang="en-US" smtClean="0"/>
-              <a:t>11/25/2019</a:t>
+              <a:t>11/29/2019</a:t>
             </a:fld>
             <a:endParaRPr lang="en-US"/>
           </a:p>
@@ -2084,7 +2084,7 @@
           <a:p>
             <a:fld id="{2C937129-3323-4A0E-946D-8D61D760E2BF}" type="datetimeFigureOut">
               <a:rPr lang="en-US" smtClean="0"/>
-              <a:t>11/25/2019</a:t>
+              <a:t>11/29/2019</a:t>
             </a:fld>
             <a:endParaRPr lang="en-US"/>
           </a:p>
@@ -2395,7 +2395,7 @@
           <a:p>
             <a:fld id="{2C937129-3323-4A0E-946D-8D61D760E2BF}" type="datetimeFigureOut">
               <a:rPr lang="en-US" smtClean="0"/>
-              <a:t>11/25/2019</a:t>
+              <a:t>11/29/2019</a:t>
             </a:fld>
             <a:endParaRPr lang="en-US"/>
           </a:p>
@@ -2683,7 +2683,7 @@
           <a:p>
             <a:fld id="{2C937129-3323-4A0E-946D-8D61D760E2BF}" type="datetimeFigureOut">
               <a:rPr lang="en-US" smtClean="0"/>
-              <a:t>11/25/2019</a:t>
+              <a:t>11/29/2019</a:t>
             </a:fld>
             <a:endParaRPr lang="en-US"/>
           </a:p>
@@ -2924,7 +2924,7 @@
           <a:p>
             <a:fld id="{2C937129-3323-4A0E-946D-8D61D760E2BF}" type="datetimeFigureOut">
               <a:rPr lang="en-US" smtClean="0"/>
-              <a:t>11/25/2019</a:t>
+              <a:t>11/29/2019</a:t>
             </a:fld>
             <a:endParaRPr lang="en-US"/>
           </a:p>
@@ -7852,7 +7852,7 @@
             <a:avLst/>
           </a:prstGeom>
           <a:solidFill>
-            <a:schemeClr val="accent2"/>
+            <a:srgbClr val="FF8047"/>
           </a:solidFill>
           <a:ln>
             <a:noFill/>
@@ -7906,7 +7906,7 @@
             </a:avLst>
           </a:prstGeom>
           <a:solidFill>
-            <a:schemeClr val="accent2"/>
+            <a:srgbClr val="FF8047"/>
           </a:solidFill>
           <a:ln>
             <a:noFill/>
@@ -10775,6 +10775,36 @@
           <a:xfrm rot="19530630">
             <a:off x="7712199" y="5353167"/>
             <a:ext cx="167298" cy="85434"/>
+          </a:xfrm>
+          <a:prstGeom prst="rect">
+            <a:avLst/>
+          </a:prstGeom>
+        </p:spPr>
+      </p:pic>
+      <p:pic>
+        <p:nvPicPr>
+          <p:cNvPr id="62" name="Picture 61">
+            <a:extLst>
+              <a:ext uri="{FF2B5EF4-FFF2-40B4-BE49-F238E27FC236}">
+                <a16:creationId xmlns:a16="http://schemas.microsoft.com/office/drawing/2014/main" id="{CC416BFA-F3E2-4E90-9222-85D4306CC187}"/>
+              </a:ext>
+            </a:extLst>
+          </p:cNvPr>
+          <p:cNvPicPr>
+            <a:picLocks noChangeAspect="1"/>
+          </p:cNvPicPr>
+          <p:nvPr/>
+        </p:nvPicPr>
+        <p:blipFill>
+          <a:blip r:embed="rId4"/>
+          <a:stretch>
+            <a:fillRect/>
+          </a:stretch>
+        </p:blipFill>
+        <p:spPr>
+          <a:xfrm>
+            <a:off x="3436916" y="338715"/>
+            <a:ext cx="572253" cy="1072153"/>
           </a:xfrm>
           <a:prstGeom prst="rect">
             <a:avLst/>

</xml_diff>

<commit_message>
limited lamps, floating portfolio menu
</commit_message>
<xml_diff>
--- a/mood.pptx
+++ b/mood.pptx
@@ -7,20 +7,21 @@
   <p:sldIdLst>
     <p:sldId id="256" r:id="rId2"/>
     <p:sldId id="269" r:id="rId3"/>
-    <p:sldId id="270" r:id="rId4"/>
-    <p:sldId id="271" r:id="rId5"/>
-    <p:sldId id="265" r:id="rId6"/>
-    <p:sldId id="267" r:id="rId7"/>
-    <p:sldId id="268" r:id="rId8"/>
-    <p:sldId id="266" r:id="rId9"/>
-    <p:sldId id="257" r:id="rId10"/>
-    <p:sldId id="258" r:id="rId11"/>
-    <p:sldId id="259" r:id="rId12"/>
-    <p:sldId id="260" r:id="rId13"/>
-    <p:sldId id="261" r:id="rId14"/>
-    <p:sldId id="262" r:id="rId15"/>
-    <p:sldId id="263" r:id="rId16"/>
-    <p:sldId id="264" r:id="rId17"/>
+    <p:sldId id="272" r:id="rId4"/>
+    <p:sldId id="270" r:id="rId5"/>
+    <p:sldId id="271" r:id="rId6"/>
+    <p:sldId id="265" r:id="rId7"/>
+    <p:sldId id="267" r:id="rId8"/>
+    <p:sldId id="268" r:id="rId9"/>
+    <p:sldId id="266" r:id="rId10"/>
+    <p:sldId id="257" r:id="rId11"/>
+    <p:sldId id="258" r:id="rId12"/>
+    <p:sldId id="259" r:id="rId13"/>
+    <p:sldId id="260" r:id="rId14"/>
+    <p:sldId id="261" r:id="rId15"/>
+    <p:sldId id="262" r:id="rId16"/>
+    <p:sldId id="263" r:id="rId17"/>
+    <p:sldId id="264" r:id="rId18"/>
   </p:sldIdLst>
   <p:sldSz cx="12192000" cy="6858000"/>
   <p:notesSz cx="6858000" cy="9144000"/>
@@ -274,7 +275,7 @@
           <a:p>
             <a:fld id="{2C937129-3323-4A0E-946D-8D61D760E2BF}" type="datetimeFigureOut">
               <a:rPr lang="en-US" smtClean="0"/>
-              <a:t>11/29/2019</a:t>
+              <a:t>12/17/19</a:t>
             </a:fld>
             <a:endParaRPr lang="en-US"/>
           </a:p>
@@ -472,7 +473,7 @@
           <a:p>
             <a:fld id="{2C937129-3323-4A0E-946D-8D61D760E2BF}" type="datetimeFigureOut">
               <a:rPr lang="en-US" smtClean="0"/>
-              <a:t>11/29/2019</a:t>
+              <a:t>12/17/19</a:t>
             </a:fld>
             <a:endParaRPr lang="en-US"/>
           </a:p>
@@ -680,7 +681,7 @@
           <a:p>
             <a:fld id="{2C937129-3323-4A0E-946D-8D61D760E2BF}" type="datetimeFigureOut">
               <a:rPr lang="en-US" smtClean="0"/>
-              <a:t>11/29/2019</a:t>
+              <a:t>12/17/19</a:t>
             </a:fld>
             <a:endParaRPr lang="en-US"/>
           </a:p>
@@ -878,7 +879,7 @@
           <a:p>
             <a:fld id="{2C937129-3323-4A0E-946D-8D61D760E2BF}" type="datetimeFigureOut">
               <a:rPr lang="en-US" smtClean="0"/>
-              <a:t>11/29/2019</a:t>
+              <a:t>12/17/19</a:t>
             </a:fld>
             <a:endParaRPr lang="en-US"/>
           </a:p>
@@ -1153,7 +1154,7 @@
           <a:p>
             <a:fld id="{2C937129-3323-4A0E-946D-8D61D760E2BF}" type="datetimeFigureOut">
               <a:rPr lang="en-US" smtClean="0"/>
-              <a:t>11/29/2019</a:t>
+              <a:t>12/17/19</a:t>
             </a:fld>
             <a:endParaRPr lang="en-US"/>
           </a:p>
@@ -1418,7 +1419,7 @@
           <a:p>
             <a:fld id="{2C937129-3323-4A0E-946D-8D61D760E2BF}" type="datetimeFigureOut">
               <a:rPr lang="en-US" smtClean="0"/>
-              <a:t>11/29/2019</a:t>
+              <a:t>12/17/19</a:t>
             </a:fld>
             <a:endParaRPr lang="en-US"/>
           </a:p>
@@ -1830,7 +1831,7 @@
           <a:p>
             <a:fld id="{2C937129-3323-4A0E-946D-8D61D760E2BF}" type="datetimeFigureOut">
               <a:rPr lang="en-US" smtClean="0"/>
-              <a:t>11/29/2019</a:t>
+              <a:t>12/17/19</a:t>
             </a:fld>
             <a:endParaRPr lang="en-US"/>
           </a:p>
@@ -1971,7 +1972,7 @@
           <a:p>
             <a:fld id="{2C937129-3323-4A0E-946D-8D61D760E2BF}" type="datetimeFigureOut">
               <a:rPr lang="en-US" smtClean="0"/>
-              <a:t>11/29/2019</a:t>
+              <a:t>12/17/19</a:t>
             </a:fld>
             <a:endParaRPr lang="en-US"/>
           </a:p>
@@ -2084,7 +2085,7 @@
           <a:p>
             <a:fld id="{2C937129-3323-4A0E-946D-8D61D760E2BF}" type="datetimeFigureOut">
               <a:rPr lang="en-US" smtClean="0"/>
-              <a:t>11/29/2019</a:t>
+              <a:t>12/17/19</a:t>
             </a:fld>
             <a:endParaRPr lang="en-US"/>
           </a:p>
@@ -2395,7 +2396,7 @@
           <a:p>
             <a:fld id="{2C937129-3323-4A0E-946D-8D61D760E2BF}" type="datetimeFigureOut">
               <a:rPr lang="en-US" smtClean="0"/>
-              <a:t>11/29/2019</a:t>
+              <a:t>12/17/19</a:t>
             </a:fld>
             <a:endParaRPr lang="en-US"/>
           </a:p>
@@ -2683,7 +2684,7 @@
           <a:p>
             <a:fld id="{2C937129-3323-4A0E-946D-8D61D760E2BF}" type="datetimeFigureOut">
               <a:rPr lang="en-US" smtClean="0"/>
-              <a:t>11/29/2019</a:t>
+              <a:t>12/17/19</a:t>
             </a:fld>
             <a:endParaRPr lang="en-US"/>
           </a:p>
@@ -2924,7 +2925,7 @@
           <a:p>
             <a:fld id="{2C937129-3323-4A0E-946D-8D61D760E2BF}" type="datetimeFigureOut">
               <a:rPr lang="en-US" smtClean="0"/>
-              <a:t>11/29/2019</a:t>
+              <a:t>12/17/19</a:t>
             </a:fld>
             <a:endParaRPr lang="en-US"/>
           </a:p>
@@ -3460,62 +3461,26 @@
             <p:ph type="ctrTitle"/>
           </p:nvPr>
         </p:nvSpPr>
-        <p:spPr>
-          <a:xfrm>
-            <a:off x="340659" y="1062599"/>
-            <a:ext cx="2569882" cy="1220413"/>
-          </a:xfrm>
-        </p:spPr>
-        <p:txBody>
-          <a:bodyPr anchor="ctr"/>
-          <a:lstStyle/>
-          <a:p>
-            <a:r>
-              <a:rPr lang="en-US" b="1" dirty="0">
+        <p:spPr/>
+        <p:txBody>
+          <a:bodyPr/>
+          <a:lstStyle/>
+          <a:p>
+            <a:r>
+              <a:rPr lang="en-US" dirty="0">
                 <a:solidFill>
                   <a:srgbClr val="FFEAC9"/>
                 </a:solidFill>
-                <a:latin typeface="AR BONNIE" panose="02000000000000000000" pitchFamily="2" charset="0"/>
               </a:rPr>
               <a:t>kvaish</a:t>
             </a:r>
           </a:p>
         </p:txBody>
       </p:sp>
-      <p:pic>
-        <p:nvPicPr>
-          <p:cNvPr id="3" name="Picture 2">
-            <a:extLst>
-              <a:ext uri="{FF2B5EF4-FFF2-40B4-BE49-F238E27FC236}">
-                <a16:creationId xmlns:a16="http://schemas.microsoft.com/office/drawing/2014/main" id="{B3553EDE-3EDF-4BBE-B0E5-576B7E1FB88C}"/>
-              </a:ext>
-            </a:extLst>
-          </p:cNvPr>
-          <p:cNvPicPr>
-            <a:picLocks noChangeAspect="1"/>
-          </p:cNvPicPr>
-          <p:nvPr/>
-        </p:nvPicPr>
-        <p:blipFill>
-          <a:blip r:embed="rId2"/>
-          <a:stretch>
-            <a:fillRect/>
-          </a:stretch>
-        </p:blipFill>
-        <p:spPr>
-          <a:xfrm>
-            <a:off x="-167341" y="3089836"/>
-            <a:ext cx="12460941" cy="3881718"/>
-          </a:xfrm>
-          <a:prstGeom prst="rect">
-            <a:avLst/>
-          </a:prstGeom>
-        </p:spPr>
-      </p:pic>
     </p:spTree>
     <p:extLst>
       <p:ext uri="{BB962C8B-B14F-4D97-AF65-F5344CB8AC3E}">
-        <p14:creationId xmlns:p14="http://schemas.microsoft.com/office/powerpoint/2010/main" val="2657985456"/>
+        <p14:creationId xmlns:p14="http://schemas.microsoft.com/office/powerpoint/2010/main" val="521107553"/>
       </p:ext>
     </p:extLst>
   </p:cSld>
@@ -3581,7 +3546,7 @@
                 <a:solidFill>
                   <a:srgbClr val="FFEAC9"/>
                 </a:solidFill>
-                <a:latin typeface="Century Gothic" panose="020B0502020202020204" pitchFamily="34" charset="0"/>
+                <a:latin typeface="AR BONNIE" panose="02000000000000000000" pitchFamily="2" charset="0"/>
               </a:rPr>
               <a:t>kvaish</a:t>
             </a:r>
@@ -3621,7 +3586,7 @@
     </p:spTree>
     <p:extLst>
       <p:ext uri="{BB962C8B-B14F-4D97-AF65-F5344CB8AC3E}">
-        <p14:creationId xmlns:p14="http://schemas.microsoft.com/office/powerpoint/2010/main" val="3478512421"/>
+        <p14:creationId xmlns:p14="http://schemas.microsoft.com/office/powerpoint/2010/main" val="2657985456"/>
       </p:ext>
     </p:extLst>
   </p:cSld>
@@ -3679,9 +3644,7 @@
           </a:xfrm>
         </p:spPr>
         <p:txBody>
-          <a:bodyPr anchor="ctr">
-            <a:normAutofit/>
-          </a:bodyPr>
+          <a:bodyPr anchor="ctr"/>
           <a:lstStyle/>
           <a:p>
             <a:r>
@@ -3689,8 +3652,7 @@
                 <a:solidFill>
                   <a:srgbClr val="FFEAC9"/>
                 </a:solidFill>
-                <a:latin typeface="Dubai" panose="020B0503030403030204" pitchFamily="34" charset="-78"/>
-                <a:cs typeface="Dubai" panose="020B0503030403030204" pitchFamily="34" charset="-78"/>
+                <a:latin typeface="Century Gothic" panose="020B0502020202020204" pitchFamily="34" charset="0"/>
               </a:rPr>
               <a:t>kvaish</a:t>
             </a:r>
@@ -3730,7 +3692,7 @@
     </p:spTree>
     <p:extLst>
       <p:ext uri="{BB962C8B-B14F-4D97-AF65-F5344CB8AC3E}">
-        <p14:creationId xmlns:p14="http://schemas.microsoft.com/office/powerpoint/2010/main" val="1821017117"/>
+        <p14:creationId xmlns:p14="http://schemas.microsoft.com/office/powerpoint/2010/main" val="3478512421"/>
       </p:ext>
     </p:extLst>
   </p:cSld>
@@ -3798,7 +3760,7 @@
                 <a:solidFill>
                   <a:srgbClr val="FFEAC9"/>
                 </a:solidFill>
-                <a:latin typeface="Eras Medium ITC" panose="020B0602030504020804" pitchFamily="34" charset="0"/>
+                <a:latin typeface="Dubai" panose="020B0503030403030204" pitchFamily="34" charset="-78"/>
                 <a:cs typeface="Dubai" panose="020B0503030403030204" pitchFamily="34" charset="-78"/>
               </a:rPr>
               <a:t>kvaish</a:t>
@@ -3839,7 +3801,7 @@
     </p:spTree>
     <p:extLst>
       <p:ext uri="{BB962C8B-B14F-4D97-AF65-F5344CB8AC3E}">
-        <p14:creationId xmlns:p14="http://schemas.microsoft.com/office/powerpoint/2010/main" val="1329085931"/>
+        <p14:creationId xmlns:p14="http://schemas.microsoft.com/office/powerpoint/2010/main" val="1821017117"/>
       </p:ext>
     </p:extLst>
   </p:cSld>
@@ -3907,7 +3869,7 @@
                 <a:solidFill>
                   <a:srgbClr val="FFEAC9"/>
                 </a:solidFill>
-                <a:latin typeface="Gabriola" panose="04040605051002020D02" pitchFamily="82" charset="0"/>
+                <a:latin typeface="Eras Medium ITC" panose="020B0602030504020804" pitchFamily="34" charset="0"/>
                 <a:cs typeface="Dubai" panose="020B0503030403030204" pitchFamily="34" charset="-78"/>
               </a:rPr>
               <a:t>kvaish</a:t>
@@ -3948,7 +3910,7 @@
     </p:spTree>
     <p:extLst>
       <p:ext uri="{BB962C8B-B14F-4D97-AF65-F5344CB8AC3E}">
-        <p14:creationId xmlns:p14="http://schemas.microsoft.com/office/powerpoint/2010/main" val="2198146352"/>
+        <p14:creationId xmlns:p14="http://schemas.microsoft.com/office/powerpoint/2010/main" val="1329085931"/>
       </p:ext>
     </p:extLst>
   </p:cSld>
@@ -4016,7 +3978,7 @@
                 <a:solidFill>
                   <a:srgbClr val="FFEAC9"/>
                 </a:solidFill>
-                <a:latin typeface="Josefin Sans" pitchFamily="2" charset="0"/>
+                <a:latin typeface="Gabriola" panose="04040605051002020D02" pitchFamily="82" charset="0"/>
                 <a:cs typeface="Dubai" panose="020B0503030403030204" pitchFamily="34" charset="-78"/>
               </a:rPr>
               <a:t>kvaish</a:t>
@@ -4054,614 +4016,10 @@
           </a:prstGeom>
         </p:spPr>
       </p:pic>
-      <p:sp>
-        <p:nvSpPr>
-          <p:cNvPr id="5" name="Rectangle 4">
-            <a:extLst>
-              <a:ext uri="{FF2B5EF4-FFF2-40B4-BE49-F238E27FC236}">
-                <a16:creationId xmlns:a16="http://schemas.microsoft.com/office/drawing/2014/main" id="{B91FF1E1-2793-4669-B98E-5504109C3554}"/>
-              </a:ext>
-            </a:extLst>
-          </p:cNvPr>
-          <p:cNvSpPr/>
-          <p:nvPr/>
-        </p:nvSpPr>
-        <p:spPr>
-          <a:xfrm>
-            <a:off x="0" y="3089836"/>
-            <a:ext cx="12192000" cy="3938493"/>
-          </a:xfrm>
-          <a:prstGeom prst="rect">
-            <a:avLst/>
-          </a:prstGeom>
-          <a:solidFill>
-            <a:srgbClr val="FFEFD9"/>
-          </a:solidFill>
-          <a:ln>
-            <a:noFill/>
-          </a:ln>
-        </p:spPr>
-        <p:style>
-          <a:lnRef idx="2">
-            <a:schemeClr val="dk1">
-              <a:shade val="50000"/>
-            </a:schemeClr>
-          </a:lnRef>
-          <a:fillRef idx="1">
-            <a:schemeClr val="dk1"/>
-          </a:fillRef>
-          <a:effectRef idx="0">
-            <a:schemeClr val="dk1"/>
-          </a:effectRef>
-          <a:fontRef idx="minor">
-            <a:schemeClr val="lt1"/>
-          </a:fontRef>
-        </p:style>
-        <p:txBody>
-          <a:bodyPr rtlCol="0" anchor="ctr"/>
-          <a:lstStyle/>
-          <a:p>
-            <a:pPr algn="ctr"/>
-            <a:endParaRPr lang="en-US"/>
-          </a:p>
-        </p:txBody>
-      </p:sp>
-      <p:sp>
-        <p:nvSpPr>
-          <p:cNvPr id="6" name="Title 1">
-            <a:extLst>
-              <a:ext uri="{FF2B5EF4-FFF2-40B4-BE49-F238E27FC236}">
-                <a16:creationId xmlns:a16="http://schemas.microsoft.com/office/drawing/2014/main" id="{7211EBB2-D507-485E-AC0D-30B137BCA6FC}"/>
-              </a:ext>
-            </a:extLst>
-          </p:cNvPr>
-          <p:cNvSpPr txBox="1">
-            <a:spLocks/>
-          </p:cNvSpPr>
-          <p:nvPr/>
-        </p:nvSpPr>
-        <p:spPr>
-          <a:xfrm>
-            <a:off x="516965" y="3641447"/>
-            <a:ext cx="2569882" cy="1220413"/>
-          </a:xfrm>
-          <a:prstGeom prst="rect">
-            <a:avLst/>
-          </a:prstGeom>
-        </p:spPr>
-        <p:txBody>
-          <a:bodyPr vert="horz" lIns="91440" tIns="45720" rIns="91440" bIns="45720" rtlCol="0" anchor="ctr">
-            <a:normAutofit/>
-          </a:bodyPr>
-          <a:lstStyle>
-            <a:lvl1pPr algn="ctr" defTabSz="914400" rtl="0" eaLnBrk="1" latinLnBrk="0" hangingPunct="1">
-              <a:lnSpc>
-                <a:spcPct val="90000"/>
-              </a:lnSpc>
-              <a:spcBef>
-                <a:spcPct val="0"/>
-              </a:spcBef>
-              <a:buNone/>
-              <a:defRPr sz="6000" kern="1200">
-                <a:solidFill>
-                  <a:schemeClr val="tx1"/>
-                </a:solidFill>
-                <a:latin typeface="+mj-lt"/>
-                <a:ea typeface="+mj-ea"/>
-                <a:cs typeface="+mj-cs"/>
-              </a:defRPr>
-            </a:lvl1pPr>
-          </a:lstStyle>
-          <a:p>
-            <a:r>
-              <a:rPr lang="en-US" b="1" dirty="0">
-                <a:solidFill>
-                  <a:srgbClr val="C97529"/>
-                </a:solidFill>
-                <a:latin typeface="Josefin Sans" pitchFamily="2" charset="0"/>
-                <a:cs typeface="Dubai" panose="020B0503030403030204" pitchFamily="34" charset="-78"/>
-              </a:rPr>
-              <a:t>Header</a:t>
-            </a:r>
-          </a:p>
-        </p:txBody>
-      </p:sp>
-      <p:sp>
-        <p:nvSpPr>
-          <p:cNvPr id="7" name="Title 1">
-            <a:extLst>
-              <a:ext uri="{FF2B5EF4-FFF2-40B4-BE49-F238E27FC236}">
-                <a16:creationId xmlns:a16="http://schemas.microsoft.com/office/drawing/2014/main" id="{36E643B4-C94B-40F6-BC7C-1C0833906455}"/>
-              </a:ext>
-            </a:extLst>
-          </p:cNvPr>
-          <p:cNvSpPr txBox="1">
-            <a:spLocks/>
-          </p:cNvSpPr>
-          <p:nvPr/>
-        </p:nvSpPr>
-        <p:spPr>
-          <a:xfrm>
-            <a:off x="516965" y="5030695"/>
-            <a:ext cx="2569882" cy="1220413"/>
-          </a:xfrm>
-          <a:prstGeom prst="rect">
-            <a:avLst/>
-          </a:prstGeom>
-        </p:spPr>
-        <p:txBody>
-          <a:bodyPr vert="horz" lIns="91440" tIns="45720" rIns="91440" bIns="45720" rtlCol="0" anchor="ctr">
-            <a:normAutofit/>
-          </a:bodyPr>
-          <a:lstStyle>
-            <a:lvl1pPr algn="ctr" defTabSz="914400" rtl="0" eaLnBrk="1" latinLnBrk="0" hangingPunct="1">
-              <a:lnSpc>
-                <a:spcPct val="90000"/>
-              </a:lnSpc>
-              <a:spcBef>
-                <a:spcPct val="0"/>
-              </a:spcBef>
-              <a:buNone/>
-              <a:defRPr sz="6000" kern="1200">
-                <a:solidFill>
-                  <a:schemeClr val="tx1"/>
-                </a:solidFill>
-                <a:latin typeface="+mj-lt"/>
-                <a:ea typeface="+mj-ea"/>
-                <a:cs typeface="+mj-cs"/>
-              </a:defRPr>
-            </a:lvl1pPr>
-          </a:lstStyle>
-          <a:p>
-            <a:r>
-              <a:rPr lang="en-US" b="1" dirty="0">
-                <a:solidFill>
-                  <a:srgbClr val="DF9E63"/>
-                </a:solidFill>
-                <a:latin typeface="Josefin Sans" pitchFamily="2" charset="0"/>
-                <a:cs typeface="Dubai" panose="020B0503030403030204" pitchFamily="34" charset="-78"/>
-              </a:rPr>
-              <a:t>content</a:t>
-            </a:r>
-          </a:p>
-        </p:txBody>
-      </p:sp>
-      <p:sp>
-        <p:nvSpPr>
-          <p:cNvPr id="9" name="Title 1">
-            <a:extLst>
-              <a:ext uri="{FF2B5EF4-FFF2-40B4-BE49-F238E27FC236}">
-                <a16:creationId xmlns:a16="http://schemas.microsoft.com/office/drawing/2014/main" id="{FD7D1842-65C1-48C6-BFE0-E05511A7680B}"/>
-              </a:ext>
-            </a:extLst>
-          </p:cNvPr>
-          <p:cNvSpPr txBox="1">
-            <a:spLocks/>
-          </p:cNvSpPr>
-          <p:nvPr/>
-        </p:nvSpPr>
-        <p:spPr>
-          <a:xfrm>
-            <a:off x="9399775" y="0"/>
-            <a:ext cx="2569882" cy="1220413"/>
-          </a:xfrm>
-          <a:prstGeom prst="rect">
-            <a:avLst/>
-          </a:prstGeom>
-        </p:spPr>
-        <p:txBody>
-          <a:bodyPr vert="horz" lIns="91440" tIns="45720" rIns="91440" bIns="45720" rtlCol="0" anchor="ctr">
-            <a:normAutofit fontScale="85000" lnSpcReduction="10000"/>
-          </a:bodyPr>
-          <a:lstStyle>
-            <a:lvl1pPr algn="ctr" defTabSz="914400" rtl="0" eaLnBrk="1" latinLnBrk="0" hangingPunct="1">
-              <a:lnSpc>
-                <a:spcPct val="90000"/>
-              </a:lnSpc>
-              <a:spcBef>
-                <a:spcPct val="0"/>
-              </a:spcBef>
-              <a:buNone/>
-              <a:defRPr sz="6000" kern="1200">
-                <a:solidFill>
-                  <a:schemeClr val="tx1"/>
-                </a:solidFill>
-                <a:latin typeface="+mj-lt"/>
-                <a:ea typeface="+mj-ea"/>
-                <a:cs typeface="+mj-cs"/>
-              </a:defRPr>
-            </a:lvl1pPr>
-          </a:lstStyle>
-          <a:p>
-            <a:r>
-              <a:rPr lang="en-US" b="1" dirty="0">
-                <a:latin typeface="Josefin Sans" pitchFamily="2" charset="0"/>
-                <a:cs typeface="Dubai" panose="020B0503030403030204" pitchFamily="34" charset="-78"/>
-              </a:rPr>
-              <a:t>#de9e63</a:t>
-            </a:r>
-          </a:p>
-        </p:txBody>
-      </p:sp>
-      <p:sp>
-        <p:nvSpPr>
-          <p:cNvPr id="10" name="Title 1">
-            <a:extLst>
-              <a:ext uri="{FF2B5EF4-FFF2-40B4-BE49-F238E27FC236}">
-                <a16:creationId xmlns:a16="http://schemas.microsoft.com/office/drawing/2014/main" id="{699114F4-719C-45A0-B850-66FB6B8B7138}"/>
-              </a:ext>
-            </a:extLst>
-          </p:cNvPr>
-          <p:cNvSpPr txBox="1">
-            <a:spLocks/>
-          </p:cNvSpPr>
-          <p:nvPr/>
-        </p:nvSpPr>
-        <p:spPr>
-          <a:xfrm>
-            <a:off x="9395666" y="5681012"/>
-            <a:ext cx="2569882" cy="1220413"/>
-          </a:xfrm>
-          <a:prstGeom prst="rect">
-            <a:avLst/>
-          </a:prstGeom>
-        </p:spPr>
-        <p:txBody>
-          <a:bodyPr vert="horz" lIns="91440" tIns="45720" rIns="91440" bIns="45720" rtlCol="0" anchor="ctr">
-            <a:normAutofit/>
-          </a:bodyPr>
-          <a:lstStyle>
-            <a:lvl1pPr algn="ctr" defTabSz="914400" rtl="0" eaLnBrk="1" latinLnBrk="0" hangingPunct="1">
-              <a:lnSpc>
-                <a:spcPct val="90000"/>
-              </a:lnSpc>
-              <a:spcBef>
-                <a:spcPct val="0"/>
-              </a:spcBef>
-              <a:buNone/>
-              <a:defRPr sz="6000" kern="1200">
-                <a:solidFill>
-                  <a:schemeClr val="tx1"/>
-                </a:solidFill>
-                <a:latin typeface="+mj-lt"/>
-                <a:ea typeface="+mj-ea"/>
-                <a:cs typeface="+mj-cs"/>
-              </a:defRPr>
-            </a:lvl1pPr>
-          </a:lstStyle>
-          <a:p>
-            <a:r>
-              <a:rPr lang="en-US" b="1" dirty="0">
-                <a:latin typeface="Josefin Sans" pitchFamily="2" charset="0"/>
-                <a:cs typeface="Dubai" panose="020B0503030403030204" pitchFamily="34" charset="-78"/>
-              </a:rPr>
-              <a:t>#ffefd9</a:t>
-            </a:r>
-          </a:p>
-        </p:txBody>
-      </p:sp>
-      <p:sp>
-        <p:nvSpPr>
-          <p:cNvPr id="11" name="Title 1">
-            <a:extLst>
-              <a:ext uri="{FF2B5EF4-FFF2-40B4-BE49-F238E27FC236}">
-                <a16:creationId xmlns:a16="http://schemas.microsoft.com/office/drawing/2014/main" id="{839C9C29-72DE-473B-ABF8-53092DEDC6C6}"/>
-              </a:ext>
-            </a:extLst>
-          </p:cNvPr>
-          <p:cNvSpPr txBox="1">
-            <a:spLocks/>
-          </p:cNvSpPr>
-          <p:nvPr/>
-        </p:nvSpPr>
-        <p:spPr>
-          <a:xfrm>
-            <a:off x="9395666" y="3794547"/>
-            <a:ext cx="2569882" cy="1220413"/>
-          </a:xfrm>
-          <a:prstGeom prst="rect">
-            <a:avLst/>
-          </a:prstGeom>
-        </p:spPr>
-        <p:txBody>
-          <a:bodyPr vert="horz" lIns="91440" tIns="45720" rIns="91440" bIns="45720" rtlCol="0" anchor="ctr">
-            <a:normAutofit fontScale="85000" lnSpcReduction="10000"/>
-          </a:bodyPr>
-          <a:lstStyle>
-            <a:lvl1pPr algn="ctr" defTabSz="914400" rtl="0" eaLnBrk="1" latinLnBrk="0" hangingPunct="1">
-              <a:lnSpc>
-                <a:spcPct val="90000"/>
-              </a:lnSpc>
-              <a:spcBef>
-                <a:spcPct val="0"/>
-              </a:spcBef>
-              <a:buNone/>
-              <a:defRPr sz="6000" kern="1200">
-                <a:solidFill>
-                  <a:schemeClr val="tx1"/>
-                </a:solidFill>
-                <a:latin typeface="+mj-lt"/>
-                <a:ea typeface="+mj-ea"/>
-                <a:cs typeface="+mj-cs"/>
-              </a:defRPr>
-            </a:lvl1pPr>
-          </a:lstStyle>
-          <a:p>
-            <a:r>
-              <a:rPr lang="en-US" b="1" dirty="0">
-                <a:latin typeface="Josefin Sans" pitchFamily="2" charset="0"/>
-                <a:cs typeface="Dubai" panose="020B0503030403030204" pitchFamily="34" charset="-78"/>
-              </a:rPr>
-              <a:t>#c97529</a:t>
-            </a:r>
-          </a:p>
-        </p:txBody>
-      </p:sp>
-      <p:pic>
-        <p:nvPicPr>
-          <p:cNvPr id="12" name="Picture 11">
-            <a:extLst>
-              <a:ext uri="{FF2B5EF4-FFF2-40B4-BE49-F238E27FC236}">
-                <a16:creationId xmlns:a16="http://schemas.microsoft.com/office/drawing/2014/main" id="{336A2928-C929-46E7-88B5-3F260E0E0737}"/>
-              </a:ext>
-            </a:extLst>
-          </p:cNvPr>
-          <p:cNvPicPr>
-            <a:picLocks noChangeAspect="1"/>
-          </p:cNvPicPr>
-          <p:nvPr/>
-        </p:nvPicPr>
-        <p:blipFill>
-          <a:blip r:embed="rId3"/>
-          <a:stretch>
-            <a:fillRect/>
-          </a:stretch>
-        </p:blipFill>
-        <p:spPr>
-          <a:xfrm>
-            <a:off x="12811125" y="138674"/>
-            <a:ext cx="895350" cy="923925"/>
-          </a:xfrm>
-          <a:prstGeom prst="rect">
-            <a:avLst/>
-          </a:prstGeom>
-        </p:spPr>
-      </p:pic>
-      <p:pic>
-        <p:nvPicPr>
-          <p:cNvPr id="13" name="Picture 12">
-            <a:extLst>
-              <a:ext uri="{FF2B5EF4-FFF2-40B4-BE49-F238E27FC236}">
-                <a16:creationId xmlns:a16="http://schemas.microsoft.com/office/drawing/2014/main" id="{9EA7936F-6002-4A31-80B0-515F201D0649}"/>
-              </a:ext>
-            </a:extLst>
-          </p:cNvPr>
-          <p:cNvPicPr>
-            <a:picLocks noChangeAspect="1"/>
-          </p:cNvPicPr>
-          <p:nvPr/>
-        </p:nvPicPr>
-        <p:blipFill>
-          <a:blip r:embed="rId4"/>
-          <a:stretch>
-            <a:fillRect/>
-          </a:stretch>
-        </p:blipFill>
-        <p:spPr>
-          <a:xfrm>
-            <a:off x="12792075" y="1821049"/>
-            <a:ext cx="933450" cy="923925"/>
-          </a:xfrm>
-          <a:prstGeom prst="rect">
-            <a:avLst/>
-          </a:prstGeom>
-        </p:spPr>
-      </p:pic>
-      <p:pic>
-        <p:nvPicPr>
-          <p:cNvPr id="14" name="Picture 13">
-            <a:extLst>
-              <a:ext uri="{FF2B5EF4-FFF2-40B4-BE49-F238E27FC236}">
-                <a16:creationId xmlns:a16="http://schemas.microsoft.com/office/drawing/2014/main" id="{32381728-761F-41F8-B856-239DBA8EC312}"/>
-              </a:ext>
-            </a:extLst>
-          </p:cNvPr>
-          <p:cNvPicPr>
-            <a:picLocks noChangeAspect="1"/>
-          </p:cNvPicPr>
-          <p:nvPr/>
-        </p:nvPicPr>
-        <p:blipFill>
-          <a:blip r:embed="rId5"/>
-          <a:stretch>
-            <a:fillRect/>
-          </a:stretch>
-        </p:blipFill>
-        <p:spPr>
-          <a:xfrm>
-            <a:off x="12782550" y="3669834"/>
-            <a:ext cx="942975" cy="914400"/>
-          </a:xfrm>
-          <a:prstGeom prst="rect">
-            <a:avLst/>
-          </a:prstGeom>
-        </p:spPr>
-      </p:pic>
-      <p:sp>
-        <p:nvSpPr>
-          <p:cNvPr id="15" name="Title 1">
-            <a:extLst>
-              <a:ext uri="{FF2B5EF4-FFF2-40B4-BE49-F238E27FC236}">
-                <a16:creationId xmlns:a16="http://schemas.microsoft.com/office/drawing/2014/main" id="{7F70C19C-762D-4759-BA36-752A2D268027}"/>
-              </a:ext>
-            </a:extLst>
-          </p:cNvPr>
-          <p:cNvSpPr txBox="1">
-            <a:spLocks/>
-          </p:cNvSpPr>
-          <p:nvPr/>
-        </p:nvSpPr>
-        <p:spPr>
-          <a:xfrm>
-            <a:off x="13927605" y="115563"/>
-            <a:ext cx="2569882" cy="1220413"/>
-          </a:xfrm>
-          <a:prstGeom prst="rect">
-            <a:avLst/>
-          </a:prstGeom>
-        </p:spPr>
-        <p:txBody>
-          <a:bodyPr vert="horz" lIns="91440" tIns="45720" rIns="91440" bIns="45720" rtlCol="0" anchor="ctr">
-            <a:normAutofit fontScale="85000" lnSpcReduction="10000"/>
-          </a:bodyPr>
-          <a:lstStyle>
-            <a:lvl1pPr algn="ctr" defTabSz="914400" rtl="0" eaLnBrk="1" latinLnBrk="0" hangingPunct="1">
-              <a:lnSpc>
-                <a:spcPct val="90000"/>
-              </a:lnSpc>
-              <a:spcBef>
-                <a:spcPct val="0"/>
-              </a:spcBef>
-              <a:buNone/>
-              <a:defRPr sz="6000" kern="1200">
-                <a:solidFill>
-                  <a:schemeClr val="tx1"/>
-                </a:solidFill>
-                <a:latin typeface="+mj-lt"/>
-                <a:ea typeface="+mj-ea"/>
-                <a:cs typeface="+mj-cs"/>
-              </a:defRPr>
-            </a:lvl1pPr>
-          </a:lstStyle>
-          <a:p>
-            <a:r>
-              <a:rPr lang="en-US" b="1" dirty="0">
-                <a:latin typeface="Josefin Sans" pitchFamily="2" charset="0"/>
-                <a:cs typeface="Dubai" panose="020B0503030403030204" pitchFamily="34" charset="-78"/>
-              </a:rPr>
-              <a:t>#de9e63</a:t>
-            </a:r>
-          </a:p>
-        </p:txBody>
-      </p:sp>
-      <p:sp>
-        <p:nvSpPr>
-          <p:cNvPr id="16" name="Title 1">
-            <a:extLst>
-              <a:ext uri="{FF2B5EF4-FFF2-40B4-BE49-F238E27FC236}">
-                <a16:creationId xmlns:a16="http://schemas.microsoft.com/office/drawing/2014/main" id="{73880714-783B-4229-978A-4F26FEC8392A}"/>
-              </a:ext>
-            </a:extLst>
-          </p:cNvPr>
-          <p:cNvSpPr txBox="1">
-            <a:spLocks/>
-          </p:cNvSpPr>
-          <p:nvPr/>
-        </p:nvSpPr>
-        <p:spPr>
-          <a:xfrm>
-            <a:off x="13927605" y="3516827"/>
-            <a:ext cx="2569882" cy="1220413"/>
-          </a:xfrm>
-          <a:prstGeom prst="rect">
-            <a:avLst/>
-          </a:prstGeom>
-        </p:spPr>
-        <p:txBody>
-          <a:bodyPr vert="horz" lIns="91440" tIns="45720" rIns="91440" bIns="45720" rtlCol="0" anchor="ctr">
-            <a:normAutofit fontScale="85000" lnSpcReduction="10000"/>
-          </a:bodyPr>
-          <a:lstStyle>
-            <a:lvl1pPr algn="ctr" defTabSz="914400" rtl="0" eaLnBrk="1" latinLnBrk="0" hangingPunct="1">
-              <a:lnSpc>
-                <a:spcPct val="90000"/>
-              </a:lnSpc>
-              <a:spcBef>
-                <a:spcPct val="0"/>
-              </a:spcBef>
-              <a:buNone/>
-              <a:defRPr sz="6000" kern="1200">
-                <a:solidFill>
-                  <a:schemeClr val="tx1"/>
-                </a:solidFill>
-                <a:latin typeface="+mj-lt"/>
-                <a:ea typeface="+mj-ea"/>
-                <a:cs typeface="+mj-cs"/>
-              </a:defRPr>
-            </a:lvl1pPr>
-          </a:lstStyle>
-          <a:p>
-            <a:r>
-              <a:rPr lang="en-US" b="1" dirty="0">
-                <a:latin typeface="Josefin Sans" pitchFamily="2" charset="0"/>
-                <a:cs typeface="Dubai" panose="020B0503030403030204" pitchFamily="34" charset="-78"/>
-              </a:rPr>
-              <a:t>#c97529</a:t>
-            </a:r>
-          </a:p>
-        </p:txBody>
-      </p:sp>
-      <p:sp>
-        <p:nvSpPr>
-          <p:cNvPr id="18" name="Title 1">
-            <a:extLst>
-              <a:ext uri="{FF2B5EF4-FFF2-40B4-BE49-F238E27FC236}">
-                <a16:creationId xmlns:a16="http://schemas.microsoft.com/office/drawing/2014/main" id="{EE4E22DF-44DD-4D14-A083-C17119AC68DD}"/>
-              </a:ext>
-            </a:extLst>
-          </p:cNvPr>
-          <p:cNvSpPr txBox="1">
-            <a:spLocks/>
-          </p:cNvSpPr>
-          <p:nvPr/>
-        </p:nvSpPr>
-        <p:spPr>
-          <a:xfrm>
-            <a:off x="13927605" y="1816195"/>
-            <a:ext cx="2569882" cy="1220413"/>
-          </a:xfrm>
-          <a:prstGeom prst="rect">
-            <a:avLst/>
-          </a:prstGeom>
-        </p:spPr>
-        <p:txBody>
-          <a:bodyPr vert="horz" lIns="91440" tIns="45720" rIns="91440" bIns="45720" rtlCol="0" anchor="ctr">
-            <a:normAutofit/>
-          </a:bodyPr>
-          <a:lstStyle>
-            <a:lvl1pPr algn="ctr" defTabSz="914400" rtl="0" eaLnBrk="1" latinLnBrk="0" hangingPunct="1">
-              <a:lnSpc>
-                <a:spcPct val="90000"/>
-              </a:lnSpc>
-              <a:spcBef>
-                <a:spcPct val="0"/>
-              </a:spcBef>
-              <a:buNone/>
-              <a:defRPr sz="6000" kern="1200">
-                <a:solidFill>
-                  <a:schemeClr val="tx1"/>
-                </a:solidFill>
-                <a:latin typeface="+mj-lt"/>
-                <a:ea typeface="+mj-ea"/>
-                <a:cs typeface="+mj-cs"/>
-              </a:defRPr>
-            </a:lvl1pPr>
-          </a:lstStyle>
-          <a:p>
-            <a:r>
-              <a:rPr lang="en-US" b="1" dirty="0">
-                <a:latin typeface="Josefin Sans" pitchFamily="2" charset="0"/>
-                <a:cs typeface="Dubai" panose="020B0503030403030204" pitchFamily="34" charset="-78"/>
-              </a:rPr>
-              <a:t>#ffefd9</a:t>
-            </a:r>
-          </a:p>
-        </p:txBody>
-      </p:sp>
     </p:spTree>
     <p:extLst>
       <p:ext uri="{BB962C8B-B14F-4D97-AF65-F5344CB8AC3E}">
-        <p14:creationId xmlns:p14="http://schemas.microsoft.com/office/powerpoint/2010/main" val="71784214"/>
+        <p14:creationId xmlns:p14="http://schemas.microsoft.com/office/powerpoint/2010/main" val="2198146352"/>
       </p:ext>
     </p:extLst>
   </p:cSld>
@@ -4729,6 +4087,719 @@
                 <a:solidFill>
                   <a:srgbClr val="FFEAC9"/>
                 </a:solidFill>
+                <a:latin typeface="Josefin Sans" pitchFamily="2" charset="0"/>
+                <a:cs typeface="Dubai" panose="020B0503030403030204" pitchFamily="34" charset="-78"/>
+              </a:rPr>
+              <a:t>kvaish</a:t>
+            </a:r>
+          </a:p>
+        </p:txBody>
+      </p:sp>
+      <p:pic>
+        <p:nvPicPr>
+          <p:cNvPr id="3" name="Picture 2">
+            <a:extLst>
+              <a:ext uri="{FF2B5EF4-FFF2-40B4-BE49-F238E27FC236}">
+                <a16:creationId xmlns:a16="http://schemas.microsoft.com/office/drawing/2014/main" id="{B3553EDE-3EDF-4BBE-B0E5-576B7E1FB88C}"/>
+              </a:ext>
+            </a:extLst>
+          </p:cNvPr>
+          <p:cNvPicPr>
+            <a:picLocks noChangeAspect="1"/>
+          </p:cNvPicPr>
+          <p:nvPr/>
+        </p:nvPicPr>
+        <p:blipFill>
+          <a:blip r:embed="rId2"/>
+          <a:stretch>
+            <a:fillRect/>
+          </a:stretch>
+        </p:blipFill>
+        <p:spPr>
+          <a:xfrm>
+            <a:off x="-167341" y="3089836"/>
+            <a:ext cx="12460941" cy="3881718"/>
+          </a:xfrm>
+          <a:prstGeom prst="rect">
+            <a:avLst/>
+          </a:prstGeom>
+        </p:spPr>
+      </p:pic>
+      <p:sp>
+        <p:nvSpPr>
+          <p:cNvPr id="5" name="Rectangle 4">
+            <a:extLst>
+              <a:ext uri="{FF2B5EF4-FFF2-40B4-BE49-F238E27FC236}">
+                <a16:creationId xmlns:a16="http://schemas.microsoft.com/office/drawing/2014/main" id="{B91FF1E1-2793-4669-B98E-5504109C3554}"/>
+              </a:ext>
+            </a:extLst>
+          </p:cNvPr>
+          <p:cNvSpPr/>
+          <p:nvPr/>
+        </p:nvSpPr>
+        <p:spPr>
+          <a:xfrm>
+            <a:off x="0" y="3089836"/>
+            <a:ext cx="12192000" cy="3938493"/>
+          </a:xfrm>
+          <a:prstGeom prst="rect">
+            <a:avLst/>
+          </a:prstGeom>
+          <a:solidFill>
+            <a:srgbClr val="FFEFD9"/>
+          </a:solidFill>
+          <a:ln>
+            <a:noFill/>
+          </a:ln>
+        </p:spPr>
+        <p:style>
+          <a:lnRef idx="2">
+            <a:schemeClr val="dk1">
+              <a:shade val="50000"/>
+            </a:schemeClr>
+          </a:lnRef>
+          <a:fillRef idx="1">
+            <a:schemeClr val="dk1"/>
+          </a:fillRef>
+          <a:effectRef idx="0">
+            <a:schemeClr val="dk1"/>
+          </a:effectRef>
+          <a:fontRef idx="minor">
+            <a:schemeClr val="lt1"/>
+          </a:fontRef>
+        </p:style>
+        <p:txBody>
+          <a:bodyPr rtlCol="0" anchor="ctr"/>
+          <a:lstStyle/>
+          <a:p>
+            <a:pPr algn="ctr"/>
+            <a:endParaRPr lang="en-US"/>
+          </a:p>
+        </p:txBody>
+      </p:sp>
+      <p:sp>
+        <p:nvSpPr>
+          <p:cNvPr id="6" name="Title 1">
+            <a:extLst>
+              <a:ext uri="{FF2B5EF4-FFF2-40B4-BE49-F238E27FC236}">
+                <a16:creationId xmlns:a16="http://schemas.microsoft.com/office/drawing/2014/main" id="{7211EBB2-D507-485E-AC0D-30B137BCA6FC}"/>
+              </a:ext>
+            </a:extLst>
+          </p:cNvPr>
+          <p:cNvSpPr txBox="1">
+            <a:spLocks/>
+          </p:cNvSpPr>
+          <p:nvPr/>
+        </p:nvSpPr>
+        <p:spPr>
+          <a:xfrm>
+            <a:off x="516965" y="3641447"/>
+            <a:ext cx="2569882" cy="1220413"/>
+          </a:xfrm>
+          <a:prstGeom prst="rect">
+            <a:avLst/>
+          </a:prstGeom>
+        </p:spPr>
+        <p:txBody>
+          <a:bodyPr vert="horz" lIns="91440" tIns="45720" rIns="91440" bIns="45720" rtlCol="0" anchor="ctr">
+            <a:normAutofit/>
+          </a:bodyPr>
+          <a:lstStyle>
+            <a:lvl1pPr algn="ctr" defTabSz="914400" rtl="0" eaLnBrk="1" latinLnBrk="0" hangingPunct="1">
+              <a:lnSpc>
+                <a:spcPct val="90000"/>
+              </a:lnSpc>
+              <a:spcBef>
+                <a:spcPct val="0"/>
+              </a:spcBef>
+              <a:buNone/>
+              <a:defRPr sz="6000" kern="1200">
+                <a:solidFill>
+                  <a:schemeClr val="tx1"/>
+                </a:solidFill>
+                <a:latin typeface="+mj-lt"/>
+                <a:ea typeface="+mj-ea"/>
+                <a:cs typeface="+mj-cs"/>
+              </a:defRPr>
+            </a:lvl1pPr>
+          </a:lstStyle>
+          <a:p>
+            <a:r>
+              <a:rPr lang="en-US" b="1" dirty="0">
+                <a:solidFill>
+                  <a:srgbClr val="C97529"/>
+                </a:solidFill>
+                <a:latin typeface="Josefin Sans" pitchFamily="2" charset="0"/>
+                <a:cs typeface="Dubai" panose="020B0503030403030204" pitchFamily="34" charset="-78"/>
+              </a:rPr>
+              <a:t>Header</a:t>
+            </a:r>
+          </a:p>
+        </p:txBody>
+      </p:sp>
+      <p:sp>
+        <p:nvSpPr>
+          <p:cNvPr id="7" name="Title 1">
+            <a:extLst>
+              <a:ext uri="{FF2B5EF4-FFF2-40B4-BE49-F238E27FC236}">
+                <a16:creationId xmlns:a16="http://schemas.microsoft.com/office/drawing/2014/main" id="{36E643B4-C94B-40F6-BC7C-1C0833906455}"/>
+              </a:ext>
+            </a:extLst>
+          </p:cNvPr>
+          <p:cNvSpPr txBox="1">
+            <a:spLocks/>
+          </p:cNvSpPr>
+          <p:nvPr/>
+        </p:nvSpPr>
+        <p:spPr>
+          <a:xfrm>
+            <a:off x="516965" y="5030695"/>
+            <a:ext cx="2569882" cy="1220413"/>
+          </a:xfrm>
+          <a:prstGeom prst="rect">
+            <a:avLst/>
+          </a:prstGeom>
+        </p:spPr>
+        <p:txBody>
+          <a:bodyPr vert="horz" lIns="91440" tIns="45720" rIns="91440" bIns="45720" rtlCol="0" anchor="ctr">
+            <a:normAutofit fontScale="92500"/>
+          </a:bodyPr>
+          <a:lstStyle>
+            <a:lvl1pPr algn="ctr" defTabSz="914400" rtl="0" eaLnBrk="1" latinLnBrk="0" hangingPunct="1">
+              <a:lnSpc>
+                <a:spcPct val="90000"/>
+              </a:lnSpc>
+              <a:spcBef>
+                <a:spcPct val="0"/>
+              </a:spcBef>
+              <a:buNone/>
+              <a:defRPr sz="6000" kern="1200">
+                <a:solidFill>
+                  <a:schemeClr val="tx1"/>
+                </a:solidFill>
+                <a:latin typeface="+mj-lt"/>
+                <a:ea typeface="+mj-ea"/>
+                <a:cs typeface="+mj-cs"/>
+              </a:defRPr>
+            </a:lvl1pPr>
+          </a:lstStyle>
+          <a:p>
+            <a:r>
+              <a:rPr lang="en-US" b="1" dirty="0">
+                <a:solidFill>
+                  <a:srgbClr val="DF9E63"/>
+                </a:solidFill>
+                <a:latin typeface="Josefin Sans" pitchFamily="2" charset="0"/>
+                <a:cs typeface="Dubai" panose="020B0503030403030204" pitchFamily="34" charset="-78"/>
+              </a:rPr>
+              <a:t>content</a:t>
+            </a:r>
+          </a:p>
+        </p:txBody>
+      </p:sp>
+      <p:sp>
+        <p:nvSpPr>
+          <p:cNvPr id="9" name="Title 1">
+            <a:extLst>
+              <a:ext uri="{FF2B5EF4-FFF2-40B4-BE49-F238E27FC236}">
+                <a16:creationId xmlns:a16="http://schemas.microsoft.com/office/drawing/2014/main" id="{FD7D1842-65C1-48C6-BFE0-E05511A7680B}"/>
+              </a:ext>
+            </a:extLst>
+          </p:cNvPr>
+          <p:cNvSpPr txBox="1">
+            <a:spLocks/>
+          </p:cNvSpPr>
+          <p:nvPr/>
+        </p:nvSpPr>
+        <p:spPr>
+          <a:xfrm>
+            <a:off x="9399775" y="0"/>
+            <a:ext cx="2569882" cy="1220413"/>
+          </a:xfrm>
+          <a:prstGeom prst="rect">
+            <a:avLst/>
+          </a:prstGeom>
+        </p:spPr>
+        <p:txBody>
+          <a:bodyPr vert="horz" lIns="91440" tIns="45720" rIns="91440" bIns="45720" rtlCol="0" anchor="ctr">
+            <a:normAutofit fontScale="85000" lnSpcReduction="10000"/>
+          </a:bodyPr>
+          <a:lstStyle>
+            <a:lvl1pPr algn="ctr" defTabSz="914400" rtl="0" eaLnBrk="1" latinLnBrk="0" hangingPunct="1">
+              <a:lnSpc>
+                <a:spcPct val="90000"/>
+              </a:lnSpc>
+              <a:spcBef>
+                <a:spcPct val="0"/>
+              </a:spcBef>
+              <a:buNone/>
+              <a:defRPr sz="6000" kern="1200">
+                <a:solidFill>
+                  <a:schemeClr val="tx1"/>
+                </a:solidFill>
+                <a:latin typeface="+mj-lt"/>
+                <a:ea typeface="+mj-ea"/>
+                <a:cs typeface="+mj-cs"/>
+              </a:defRPr>
+            </a:lvl1pPr>
+          </a:lstStyle>
+          <a:p>
+            <a:r>
+              <a:rPr lang="en-US" b="1" dirty="0">
+                <a:latin typeface="Josefin Sans" pitchFamily="2" charset="0"/>
+                <a:cs typeface="Dubai" panose="020B0503030403030204" pitchFamily="34" charset="-78"/>
+              </a:rPr>
+              <a:t>#de9e63</a:t>
+            </a:r>
+          </a:p>
+        </p:txBody>
+      </p:sp>
+      <p:sp>
+        <p:nvSpPr>
+          <p:cNvPr id="10" name="Title 1">
+            <a:extLst>
+              <a:ext uri="{FF2B5EF4-FFF2-40B4-BE49-F238E27FC236}">
+                <a16:creationId xmlns:a16="http://schemas.microsoft.com/office/drawing/2014/main" id="{699114F4-719C-45A0-B850-66FB6B8B7138}"/>
+              </a:ext>
+            </a:extLst>
+          </p:cNvPr>
+          <p:cNvSpPr txBox="1">
+            <a:spLocks/>
+          </p:cNvSpPr>
+          <p:nvPr/>
+        </p:nvSpPr>
+        <p:spPr>
+          <a:xfrm>
+            <a:off x="9395666" y="5681012"/>
+            <a:ext cx="2569882" cy="1220413"/>
+          </a:xfrm>
+          <a:prstGeom prst="rect">
+            <a:avLst/>
+          </a:prstGeom>
+        </p:spPr>
+        <p:txBody>
+          <a:bodyPr vert="horz" lIns="91440" tIns="45720" rIns="91440" bIns="45720" rtlCol="0" anchor="ctr">
+            <a:normAutofit/>
+          </a:bodyPr>
+          <a:lstStyle>
+            <a:lvl1pPr algn="ctr" defTabSz="914400" rtl="0" eaLnBrk="1" latinLnBrk="0" hangingPunct="1">
+              <a:lnSpc>
+                <a:spcPct val="90000"/>
+              </a:lnSpc>
+              <a:spcBef>
+                <a:spcPct val="0"/>
+              </a:spcBef>
+              <a:buNone/>
+              <a:defRPr sz="6000" kern="1200">
+                <a:solidFill>
+                  <a:schemeClr val="tx1"/>
+                </a:solidFill>
+                <a:latin typeface="+mj-lt"/>
+                <a:ea typeface="+mj-ea"/>
+                <a:cs typeface="+mj-cs"/>
+              </a:defRPr>
+            </a:lvl1pPr>
+          </a:lstStyle>
+          <a:p>
+            <a:r>
+              <a:rPr lang="en-US" b="1" dirty="0">
+                <a:latin typeface="Josefin Sans" pitchFamily="2" charset="0"/>
+                <a:cs typeface="Dubai" panose="020B0503030403030204" pitchFamily="34" charset="-78"/>
+              </a:rPr>
+              <a:t>#ffefd9</a:t>
+            </a:r>
+          </a:p>
+        </p:txBody>
+      </p:sp>
+      <p:sp>
+        <p:nvSpPr>
+          <p:cNvPr id="11" name="Title 1">
+            <a:extLst>
+              <a:ext uri="{FF2B5EF4-FFF2-40B4-BE49-F238E27FC236}">
+                <a16:creationId xmlns:a16="http://schemas.microsoft.com/office/drawing/2014/main" id="{839C9C29-72DE-473B-ABF8-53092DEDC6C6}"/>
+              </a:ext>
+            </a:extLst>
+          </p:cNvPr>
+          <p:cNvSpPr txBox="1">
+            <a:spLocks/>
+          </p:cNvSpPr>
+          <p:nvPr/>
+        </p:nvSpPr>
+        <p:spPr>
+          <a:xfrm>
+            <a:off x="9395666" y="3794547"/>
+            <a:ext cx="2569882" cy="1220413"/>
+          </a:xfrm>
+          <a:prstGeom prst="rect">
+            <a:avLst/>
+          </a:prstGeom>
+        </p:spPr>
+        <p:txBody>
+          <a:bodyPr vert="horz" lIns="91440" tIns="45720" rIns="91440" bIns="45720" rtlCol="0" anchor="ctr">
+            <a:normAutofit fontScale="85000" lnSpcReduction="10000"/>
+          </a:bodyPr>
+          <a:lstStyle>
+            <a:lvl1pPr algn="ctr" defTabSz="914400" rtl="0" eaLnBrk="1" latinLnBrk="0" hangingPunct="1">
+              <a:lnSpc>
+                <a:spcPct val="90000"/>
+              </a:lnSpc>
+              <a:spcBef>
+                <a:spcPct val="0"/>
+              </a:spcBef>
+              <a:buNone/>
+              <a:defRPr sz="6000" kern="1200">
+                <a:solidFill>
+                  <a:schemeClr val="tx1"/>
+                </a:solidFill>
+                <a:latin typeface="+mj-lt"/>
+                <a:ea typeface="+mj-ea"/>
+                <a:cs typeface="+mj-cs"/>
+              </a:defRPr>
+            </a:lvl1pPr>
+          </a:lstStyle>
+          <a:p>
+            <a:r>
+              <a:rPr lang="en-US" b="1" dirty="0">
+                <a:latin typeface="Josefin Sans" pitchFamily="2" charset="0"/>
+                <a:cs typeface="Dubai" panose="020B0503030403030204" pitchFamily="34" charset="-78"/>
+              </a:rPr>
+              <a:t>#c97529</a:t>
+            </a:r>
+          </a:p>
+        </p:txBody>
+      </p:sp>
+      <p:pic>
+        <p:nvPicPr>
+          <p:cNvPr id="12" name="Picture 11">
+            <a:extLst>
+              <a:ext uri="{FF2B5EF4-FFF2-40B4-BE49-F238E27FC236}">
+                <a16:creationId xmlns:a16="http://schemas.microsoft.com/office/drawing/2014/main" id="{336A2928-C929-46E7-88B5-3F260E0E0737}"/>
+              </a:ext>
+            </a:extLst>
+          </p:cNvPr>
+          <p:cNvPicPr>
+            <a:picLocks noChangeAspect="1"/>
+          </p:cNvPicPr>
+          <p:nvPr/>
+        </p:nvPicPr>
+        <p:blipFill>
+          <a:blip r:embed="rId3"/>
+          <a:stretch>
+            <a:fillRect/>
+          </a:stretch>
+        </p:blipFill>
+        <p:spPr>
+          <a:xfrm>
+            <a:off x="12811125" y="138674"/>
+            <a:ext cx="895350" cy="923925"/>
+          </a:xfrm>
+          <a:prstGeom prst="rect">
+            <a:avLst/>
+          </a:prstGeom>
+        </p:spPr>
+      </p:pic>
+      <p:pic>
+        <p:nvPicPr>
+          <p:cNvPr id="13" name="Picture 12">
+            <a:extLst>
+              <a:ext uri="{FF2B5EF4-FFF2-40B4-BE49-F238E27FC236}">
+                <a16:creationId xmlns:a16="http://schemas.microsoft.com/office/drawing/2014/main" id="{9EA7936F-6002-4A31-80B0-515F201D0649}"/>
+              </a:ext>
+            </a:extLst>
+          </p:cNvPr>
+          <p:cNvPicPr>
+            <a:picLocks noChangeAspect="1"/>
+          </p:cNvPicPr>
+          <p:nvPr/>
+        </p:nvPicPr>
+        <p:blipFill>
+          <a:blip r:embed="rId4"/>
+          <a:stretch>
+            <a:fillRect/>
+          </a:stretch>
+        </p:blipFill>
+        <p:spPr>
+          <a:xfrm>
+            <a:off x="12792075" y="1821049"/>
+            <a:ext cx="933450" cy="923925"/>
+          </a:xfrm>
+          <a:prstGeom prst="rect">
+            <a:avLst/>
+          </a:prstGeom>
+        </p:spPr>
+      </p:pic>
+      <p:pic>
+        <p:nvPicPr>
+          <p:cNvPr id="14" name="Picture 13">
+            <a:extLst>
+              <a:ext uri="{FF2B5EF4-FFF2-40B4-BE49-F238E27FC236}">
+                <a16:creationId xmlns:a16="http://schemas.microsoft.com/office/drawing/2014/main" id="{32381728-761F-41F8-B856-239DBA8EC312}"/>
+              </a:ext>
+            </a:extLst>
+          </p:cNvPr>
+          <p:cNvPicPr>
+            <a:picLocks noChangeAspect="1"/>
+          </p:cNvPicPr>
+          <p:nvPr/>
+        </p:nvPicPr>
+        <p:blipFill>
+          <a:blip r:embed="rId5"/>
+          <a:stretch>
+            <a:fillRect/>
+          </a:stretch>
+        </p:blipFill>
+        <p:spPr>
+          <a:xfrm>
+            <a:off x="12782550" y="3669834"/>
+            <a:ext cx="942975" cy="914400"/>
+          </a:xfrm>
+          <a:prstGeom prst="rect">
+            <a:avLst/>
+          </a:prstGeom>
+        </p:spPr>
+      </p:pic>
+      <p:sp>
+        <p:nvSpPr>
+          <p:cNvPr id="15" name="Title 1">
+            <a:extLst>
+              <a:ext uri="{FF2B5EF4-FFF2-40B4-BE49-F238E27FC236}">
+                <a16:creationId xmlns:a16="http://schemas.microsoft.com/office/drawing/2014/main" id="{7F70C19C-762D-4759-BA36-752A2D268027}"/>
+              </a:ext>
+            </a:extLst>
+          </p:cNvPr>
+          <p:cNvSpPr txBox="1">
+            <a:spLocks/>
+          </p:cNvSpPr>
+          <p:nvPr/>
+        </p:nvSpPr>
+        <p:spPr>
+          <a:xfrm>
+            <a:off x="13927605" y="115563"/>
+            <a:ext cx="2569882" cy="1220413"/>
+          </a:xfrm>
+          <a:prstGeom prst="rect">
+            <a:avLst/>
+          </a:prstGeom>
+        </p:spPr>
+        <p:txBody>
+          <a:bodyPr vert="horz" lIns="91440" tIns="45720" rIns="91440" bIns="45720" rtlCol="0" anchor="ctr">
+            <a:normAutofit fontScale="85000" lnSpcReduction="10000"/>
+          </a:bodyPr>
+          <a:lstStyle>
+            <a:lvl1pPr algn="ctr" defTabSz="914400" rtl="0" eaLnBrk="1" latinLnBrk="0" hangingPunct="1">
+              <a:lnSpc>
+                <a:spcPct val="90000"/>
+              </a:lnSpc>
+              <a:spcBef>
+                <a:spcPct val="0"/>
+              </a:spcBef>
+              <a:buNone/>
+              <a:defRPr sz="6000" kern="1200">
+                <a:solidFill>
+                  <a:schemeClr val="tx1"/>
+                </a:solidFill>
+                <a:latin typeface="+mj-lt"/>
+                <a:ea typeface="+mj-ea"/>
+                <a:cs typeface="+mj-cs"/>
+              </a:defRPr>
+            </a:lvl1pPr>
+          </a:lstStyle>
+          <a:p>
+            <a:r>
+              <a:rPr lang="en-US" b="1" dirty="0">
+                <a:latin typeface="Josefin Sans" pitchFamily="2" charset="0"/>
+                <a:cs typeface="Dubai" panose="020B0503030403030204" pitchFamily="34" charset="-78"/>
+              </a:rPr>
+              <a:t>#de9e63</a:t>
+            </a:r>
+          </a:p>
+        </p:txBody>
+      </p:sp>
+      <p:sp>
+        <p:nvSpPr>
+          <p:cNvPr id="16" name="Title 1">
+            <a:extLst>
+              <a:ext uri="{FF2B5EF4-FFF2-40B4-BE49-F238E27FC236}">
+                <a16:creationId xmlns:a16="http://schemas.microsoft.com/office/drawing/2014/main" id="{73880714-783B-4229-978A-4F26FEC8392A}"/>
+              </a:ext>
+            </a:extLst>
+          </p:cNvPr>
+          <p:cNvSpPr txBox="1">
+            <a:spLocks/>
+          </p:cNvSpPr>
+          <p:nvPr/>
+        </p:nvSpPr>
+        <p:spPr>
+          <a:xfrm>
+            <a:off x="13927605" y="3516827"/>
+            <a:ext cx="2569882" cy="1220413"/>
+          </a:xfrm>
+          <a:prstGeom prst="rect">
+            <a:avLst/>
+          </a:prstGeom>
+        </p:spPr>
+        <p:txBody>
+          <a:bodyPr vert="horz" lIns="91440" tIns="45720" rIns="91440" bIns="45720" rtlCol="0" anchor="ctr">
+            <a:normAutofit fontScale="85000" lnSpcReduction="10000"/>
+          </a:bodyPr>
+          <a:lstStyle>
+            <a:lvl1pPr algn="ctr" defTabSz="914400" rtl="0" eaLnBrk="1" latinLnBrk="0" hangingPunct="1">
+              <a:lnSpc>
+                <a:spcPct val="90000"/>
+              </a:lnSpc>
+              <a:spcBef>
+                <a:spcPct val="0"/>
+              </a:spcBef>
+              <a:buNone/>
+              <a:defRPr sz="6000" kern="1200">
+                <a:solidFill>
+                  <a:schemeClr val="tx1"/>
+                </a:solidFill>
+                <a:latin typeface="+mj-lt"/>
+                <a:ea typeface="+mj-ea"/>
+                <a:cs typeface="+mj-cs"/>
+              </a:defRPr>
+            </a:lvl1pPr>
+          </a:lstStyle>
+          <a:p>
+            <a:r>
+              <a:rPr lang="en-US" b="1" dirty="0">
+                <a:latin typeface="Josefin Sans" pitchFamily="2" charset="0"/>
+                <a:cs typeface="Dubai" panose="020B0503030403030204" pitchFamily="34" charset="-78"/>
+              </a:rPr>
+              <a:t>#c97529</a:t>
+            </a:r>
+          </a:p>
+        </p:txBody>
+      </p:sp>
+      <p:sp>
+        <p:nvSpPr>
+          <p:cNvPr id="18" name="Title 1">
+            <a:extLst>
+              <a:ext uri="{FF2B5EF4-FFF2-40B4-BE49-F238E27FC236}">
+                <a16:creationId xmlns:a16="http://schemas.microsoft.com/office/drawing/2014/main" id="{EE4E22DF-44DD-4D14-A083-C17119AC68DD}"/>
+              </a:ext>
+            </a:extLst>
+          </p:cNvPr>
+          <p:cNvSpPr txBox="1">
+            <a:spLocks/>
+          </p:cNvSpPr>
+          <p:nvPr/>
+        </p:nvSpPr>
+        <p:spPr>
+          <a:xfrm>
+            <a:off x="13927605" y="1816195"/>
+            <a:ext cx="2569882" cy="1220413"/>
+          </a:xfrm>
+          <a:prstGeom prst="rect">
+            <a:avLst/>
+          </a:prstGeom>
+        </p:spPr>
+        <p:txBody>
+          <a:bodyPr vert="horz" lIns="91440" tIns="45720" rIns="91440" bIns="45720" rtlCol="0" anchor="ctr">
+            <a:normAutofit/>
+          </a:bodyPr>
+          <a:lstStyle>
+            <a:lvl1pPr algn="ctr" defTabSz="914400" rtl="0" eaLnBrk="1" latinLnBrk="0" hangingPunct="1">
+              <a:lnSpc>
+                <a:spcPct val="90000"/>
+              </a:lnSpc>
+              <a:spcBef>
+                <a:spcPct val="0"/>
+              </a:spcBef>
+              <a:buNone/>
+              <a:defRPr sz="6000" kern="1200">
+                <a:solidFill>
+                  <a:schemeClr val="tx1"/>
+                </a:solidFill>
+                <a:latin typeface="+mj-lt"/>
+                <a:ea typeface="+mj-ea"/>
+                <a:cs typeface="+mj-cs"/>
+              </a:defRPr>
+            </a:lvl1pPr>
+          </a:lstStyle>
+          <a:p>
+            <a:r>
+              <a:rPr lang="en-US" b="1" dirty="0">
+                <a:latin typeface="Josefin Sans" pitchFamily="2" charset="0"/>
+                <a:cs typeface="Dubai" panose="020B0503030403030204" pitchFamily="34" charset="-78"/>
+              </a:rPr>
+              <a:t>#ffefd9</a:t>
+            </a:r>
+          </a:p>
+        </p:txBody>
+      </p:sp>
+    </p:spTree>
+    <p:extLst>
+      <p:ext uri="{BB962C8B-B14F-4D97-AF65-F5344CB8AC3E}">
+        <p14:creationId xmlns:p14="http://schemas.microsoft.com/office/powerpoint/2010/main" val="71784214"/>
+      </p:ext>
+    </p:extLst>
+  </p:cSld>
+  <p:clrMapOvr>
+    <a:masterClrMapping/>
+  </p:clrMapOvr>
+</p:sld>
+</file>
+
+<file path=ppt/slides/slide17.xml><?xml version="1.0" encoding="utf-8"?>
+<p:sld xmlns:a="http://schemas.openxmlformats.org/drawingml/2006/main" xmlns:r="http://schemas.openxmlformats.org/officeDocument/2006/relationships" xmlns:p="http://schemas.openxmlformats.org/presentationml/2006/main">
+  <p:cSld>
+    <p:bg>
+      <p:bgPr>
+        <a:solidFill>
+          <a:srgbClr val="DF9E63"/>
+        </a:solidFill>
+        <a:effectLst/>
+      </p:bgPr>
+    </p:bg>
+    <p:spTree>
+      <p:nvGrpSpPr>
+        <p:cNvPr id="1" name=""/>
+        <p:cNvGrpSpPr/>
+        <p:nvPr/>
+      </p:nvGrpSpPr>
+      <p:grpSpPr>
+        <a:xfrm>
+          <a:off x="0" y="0"/>
+          <a:ext cx="0" cy="0"/>
+          <a:chOff x="0" y="0"/>
+          <a:chExt cx="0" cy="0"/>
+        </a:xfrm>
+      </p:grpSpPr>
+      <p:sp>
+        <p:nvSpPr>
+          <p:cNvPr id="2" name="Title 1">
+            <a:extLst>
+              <a:ext uri="{FF2B5EF4-FFF2-40B4-BE49-F238E27FC236}">
+                <a16:creationId xmlns:a16="http://schemas.microsoft.com/office/drawing/2014/main" id="{9AAAD01F-5244-4614-B534-B6D1F6DE6283}"/>
+              </a:ext>
+            </a:extLst>
+          </p:cNvPr>
+          <p:cNvSpPr>
+            <a:spLocks noGrp="1"/>
+          </p:cNvSpPr>
+          <p:nvPr>
+            <p:ph type="ctrTitle"/>
+          </p:nvPr>
+        </p:nvSpPr>
+        <p:spPr>
+          <a:xfrm>
+            <a:off x="340659" y="1062599"/>
+            <a:ext cx="2569882" cy="1220413"/>
+          </a:xfrm>
+        </p:spPr>
+        <p:txBody>
+          <a:bodyPr anchor="ctr">
+            <a:normAutofit/>
+          </a:bodyPr>
+          <a:lstStyle/>
+          <a:p>
+            <a:r>
+              <a:rPr lang="en-US" b="1" dirty="0">
+                <a:solidFill>
+                  <a:srgbClr val="FFEAC9"/>
+                </a:solidFill>
                 <a:latin typeface="Tw Cen MT Condensed" panose="020B0606020104020203" pitchFamily="34" charset="0"/>
                 <a:cs typeface="Dubai" panose="020B0503030403030204" pitchFamily="34" charset="-78"/>
               </a:rPr>
@@ -4899,6 +4970,14 @@
 <file path=ppt/slides/slide3.xml><?xml version="1.0" encoding="utf-8"?>
 <p:sld xmlns:a="http://schemas.openxmlformats.org/drawingml/2006/main" xmlns:r="http://schemas.openxmlformats.org/officeDocument/2006/relationships" xmlns:p="http://schemas.openxmlformats.org/presentationml/2006/main">
   <p:cSld>
+    <p:bg>
+      <p:bgPr>
+        <a:solidFill>
+          <a:srgbClr val="0F0E1A"/>
+        </a:solidFill>
+        <a:effectLst/>
+      </p:bgPr>
+    </p:bg>
     <p:spTree>
       <p:nvGrpSpPr>
         <p:cNvPr id="1" name=""/>
@@ -4915,10 +4994,10 @@
       </p:grpSpPr>
       <p:pic>
         <p:nvPicPr>
-          <p:cNvPr id="3" name="Picture 2">
-            <a:extLst>
-              <a:ext uri="{FF2B5EF4-FFF2-40B4-BE49-F238E27FC236}">
-                <a16:creationId xmlns:a16="http://schemas.microsoft.com/office/drawing/2014/main" id="{7C16F1BC-5C2D-46BB-8310-5A5C00DE969F}"/>
+          <p:cNvPr id="2" name="Picture 1">
+            <a:extLst>
+              <a:ext uri="{FF2B5EF4-FFF2-40B4-BE49-F238E27FC236}">
+                <a16:creationId xmlns:a16="http://schemas.microsoft.com/office/drawing/2014/main" id="{F153F6D7-6D20-164D-859B-C94123509098}"/>
               </a:ext>
             </a:extLst>
           </p:cNvPr>
@@ -4928,28 +5007,15 @@
           <p:nvPr/>
         </p:nvPicPr>
         <p:blipFill>
-          <a:blip r:embed="rId2">
-            <a:duotone>
-              <a:schemeClr val="accent2">
-                <a:shade val="45000"/>
-                <a:satMod val="135000"/>
-              </a:schemeClr>
-              <a:prstClr val="white"/>
-            </a:duotone>
-            <a:extLst>
-              <a:ext uri="{28A0092B-C50C-407E-A947-70E740481C1C}">
-                <a14:useLocalDpi xmlns:a14="http://schemas.microsoft.com/office/drawing/2010/main" val="0"/>
-              </a:ext>
-            </a:extLst>
-          </a:blip>
+          <a:blip r:embed="rId2"/>
           <a:stretch>
             <a:fillRect/>
           </a:stretch>
         </p:blipFill>
         <p:spPr>
           <a:xfrm>
-            <a:off x="1055582" y="2497584"/>
-            <a:ext cx="4241045" cy="2409911"/>
+            <a:off x="0" y="0"/>
+            <a:ext cx="12192000" cy="714103"/>
           </a:xfrm>
           <a:prstGeom prst="rect">
             <a:avLst/>
@@ -4958,10 +5024,10 @@
       </p:pic>
       <p:pic>
         <p:nvPicPr>
-          <p:cNvPr id="4" name="Picture 3">
-            <a:extLst>
-              <a:ext uri="{FF2B5EF4-FFF2-40B4-BE49-F238E27FC236}">
-                <a16:creationId xmlns:a16="http://schemas.microsoft.com/office/drawing/2014/main" id="{28E62F8E-4205-4EE1-872B-8CE60AA8C4B4}"/>
+          <p:cNvPr id="3" name="Picture 2">
+            <a:extLst>
+              <a:ext uri="{FF2B5EF4-FFF2-40B4-BE49-F238E27FC236}">
+                <a16:creationId xmlns:a16="http://schemas.microsoft.com/office/drawing/2014/main" id="{4AA597D8-9E21-954B-ADA3-A32300A5A676}"/>
               </a:ext>
             </a:extLst>
           </p:cNvPr>
@@ -4971,28 +5037,15 @@
           <p:nvPr/>
         </p:nvPicPr>
         <p:blipFill>
-          <a:blip r:embed="rId2">
-            <a:duotone>
-              <a:schemeClr val="accent3">
-                <a:shade val="45000"/>
-                <a:satMod val="135000"/>
-              </a:schemeClr>
-              <a:prstClr val="white"/>
-            </a:duotone>
-            <a:extLst>
-              <a:ext uri="{28A0092B-C50C-407E-A947-70E740481C1C}">
-                <a14:useLocalDpi xmlns:a14="http://schemas.microsoft.com/office/drawing/2010/main" val="0"/>
-              </a:ext>
-            </a:extLst>
-          </a:blip>
+          <a:blip r:embed="rId3"/>
           <a:stretch>
             <a:fillRect/>
           </a:stretch>
         </p:blipFill>
         <p:spPr>
           <a:xfrm>
-            <a:off x="6895374" y="2497585"/>
-            <a:ext cx="4241045" cy="2409911"/>
+            <a:off x="3678555" y="1290417"/>
+            <a:ext cx="4834890" cy="2830791"/>
           </a:xfrm>
           <a:prstGeom prst="rect">
             <a:avLst/>
@@ -5002,7 +5055,7 @@
     </p:spTree>
     <p:extLst>
       <p:ext uri="{BB962C8B-B14F-4D97-AF65-F5344CB8AC3E}">
-        <p14:creationId xmlns:p14="http://schemas.microsoft.com/office/powerpoint/2010/main" val="3227808824"/>
+        <p14:creationId xmlns:p14="http://schemas.microsoft.com/office/powerpoint/2010/main" val="3129422257"/>
       </p:ext>
     </p:extLst>
   </p:cSld>
@@ -5034,7 +5087,7 @@
           <p:cNvPr id="3" name="Picture 2">
             <a:extLst>
               <a:ext uri="{FF2B5EF4-FFF2-40B4-BE49-F238E27FC236}">
-                <a16:creationId xmlns:a16="http://schemas.microsoft.com/office/drawing/2014/main" id="{CEB59BB2-9965-443E-AAB4-F30469C87E7C}"/>
+                <a16:creationId xmlns:a16="http://schemas.microsoft.com/office/drawing/2014/main" id="{7C16F1BC-5C2D-46BB-8310-5A5C00DE969F}"/>
               </a:ext>
             </a:extLst>
           </p:cNvPr>
@@ -5064,8 +5117,8 @@
         </p:blipFill>
         <p:spPr>
           <a:xfrm>
-            <a:off x="636245" y="894531"/>
-            <a:ext cx="5068937" cy="5068937"/>
+            <a:off x="1055582" y="2497584"/>
+            <a:ext cx="4241045" cy="2409911"/>
           </a:xfrm>
           <a:prstGeom prst="rect">
             <a:avLst/>
@@ -5077,7 +5130,7 @@
           <p:cNvPr id="4" name="Picture 3">
             <a:extLst>
               <a:ext uri="{FF2B5EF4-FFF2-40B4-BE49-F238E27FC236}">
-                <a16:creationId xmlns:a16="http://schemas.microsoft.com/office/drawing/2014/main" id="{CAA4445F-3BED-4DDC-A992-F6288B3A2275}"/>
+                <a16:creationId xmlns:a16="http://schemas.microsoft.com/office/drawing/2014/main" id="{28E62F8E-4205-4EE1-872B-8CE60AA8C4B4}"/>
               </a:ext>
             </a:extLst>
           </p:cNvPr>
@@ -5107,8 +5160,8 @@
         </p:blipFill>
         <p:spPr>
           <a:xfrm>
-            <a:off x="6678952" y="1002053"/>
-            <a:ext cx="5068937" cy="5068937"/>
+            <a:off x="6895374" y="2497585"/>
+            <a:ext cx="4241045" cy="2409911"/>
           </a:xfrm>
           <a:prstGeom prst="rect">
             <a:avLst/>
@@ -5118,7 +5171,7 @@
     </p:spTree>
     <p:extLst>
       <p:ext uri="{BB962C8B-B14F-4D97-AF65-F5344CB8AC3E}">
-        <p14:creationId xmlns:p14="http://schemas.microsoft.com/office/powerpoint/2010/main" val="681381714"/>
+        <p14:creationId xmlns:p14="http://schemas.microsoft.com/office/powerpoint/2010/main" val="3227808824"/>
       </p:ext>
     </p:extLst>
   </p:cSld>
@@ -5131,14 +5184,6 @@
 <file path=ppt/slides/slide5.xml><?xml version="1.0" encoding="utf-8"?>
 <p:sld xmlns:a="http://schemas.openxmlformats.org/drawingml/2006/main" xmlns:r="http://schemas.openxmlformats.org/officeDocument/2006/relationships" xmlns:p="http://schemas.openxmlformats.org/presentationml/2006/main">
   <p:cSld>
-    <p:bg>
-      <p:bgPr>
-        <a:solidFill>
-          <a:srgbClr val="0F0F1A"/>
-        </a:solidFill>
-        <a:effectLst/>
-      </p:bgPr>
-    </p:bg>
     <p:spTree>
       <p:nvGrpSpPr>
         <p:cNvPr id="1" name=""/>
@@ -5153,131 +5198,12 @@
           <a:chExt cx="0" cy="0"/>
         </a:xfrm>
       </p:grpSpPr>
-      <p:sp>
-        <p:nvSpPr>
-          <p:cNvPr id="2" name="Title 1">
-            <a:extLst>
-              <a:ext uri="{FF2B5EF4-FFF2-40B4-BE49-F238E27FC236}">
-                <a16:creationId xmlns:a16="http://schemas.microsoft.com/office/drawing/2014/main" id="{EECEBA9E-9071-4ACD-AB60-D6FD8EE87D00}"/>
-              </a:ext>
-            </a:extLst>
-          </p:cNvPr>
-          <p:cNvSpPr>
-            <a:spLocks noGrp="1"/>
-          </p:cNvSpPr>
-          <p:nvPr>
-            <p:ph type="title"/>
-          </p:nvPr>
-        </p:nvSpPr>
-        <p:spPr>
-          <a:xfrm>
-            <a:off x="903180" y="305443"/>
-            <a:ext cx="3688921" cy="1325563"/>
-          </a:xfrm>
-        </p:spPr>
-        <p:txBody>
-          <a:bodyPr anchor="b">
-            <a:normAutofit fontScale="90000"/>
-          </a:bodyPr>
-          <a:lstStyle/>
-          <a:p>
-            <a:r>
-              <a:rPr lang="en-US" sz="8000" dirty="0">
-                <a:solidFill>
-                  <a:srgbClr val="FBC5A2"/>
-                </a:solidFill>
-                <a:latin typeface="Run Wild - Demo" pitchFamily="2" charset="0"/>
-              </a:rPr>
-              <a:t>kv	aish</a:t>
-            </a:r>
-          </a:p>
-        </p:txBody>
-      </p:sp>
-      <p:sp>
-        <p:nvSpPr>
-          <p:cNvPr id="3" name="Title 1">
-            <a:extLst>
-              <a:ext uri="{FF2B5EF4-FFF2-40B4-BE49-F238E27FC236}">
-                <a16:creationId xmlns:a16="http://schemas.microsoft.com/office/drawing/2014/main" id="{08EFA241-A330-4BEB-8BE7-AF0A2C6EDACE}"/>
-              </a:ext>
-            </a:extLst>
-          </p:cNvPr>
-          <p:cNvSpPr txBox="1">
-            <a:spLocks/>
-          </p:cNvSpPr>
-          <p:nvPr/>
-        </p:nvSpPr>
-        <p:spPr>
-          <a:xfrm>
-            <a:off x="5149811" y="2708284"/>
-            <a:ext cx="5441522" cy="1325563"/>
-          </a:xfrm>
-          <a:prstGeom prst="rect">
-            <a:avLst/>
-          </a:prstGeom>
-        </p:spPr>
-        <p:txBody>
-          <a:bodyPr vert="horz" lIns="91440" tIns="45720" rIns="91440" bIns="45720" rtlCol="0" anchor="ctr">
-            <a:normAutofit/>
-          </a:bodyPr>
-          <a:lstStyle>
-            <a:lvl1pPr algn="l" defTabSz="914400" rtl="0" eaLnBrk="1" latinLnBrk="0" hangingPunct="1">
-              <a:lnSpc>
-                <a:spcPct val="90000"/>
-              </a:lnSpc>
-              <a:spcBef>
-                <a:spcPct val="0"/>
-              </a:spcBef>
-              <a:buNone/>
-              <a:defRPr sz="4400" kern="1200">
-                <a:solidFill>
-                  <a:schemeClr val="tx1"/>
-                </a:solidFill>
-                <a:latin typeface="+mj-lt"/>
-                <a:ea typeface="+mj-ea"/>
-                <a:cs typeface="+mj-cs"/>
-              </a:defRPr>
-            </a:lvl1pPr>
-          </a:lstStyle>
-          <a:p>
-            <a:r>
-              <a:rPr lang="en-US" sz="3200" dirty="0">
-                <a:solidFill>
-                  <a:srgbClr val="FBC5A2"/>
-                </a:solidFill>
-                <a:latin typeface="Alegreya Sans Thin" panose="00000300000000000000" pitchFamily="2" charset="0"/>
-              </a:rPr>
-              <a:t>Hello  there </a:t>
-            </a:r>
-          </a:p>
-          <a:p>
-            <a:r>
-              <a:rPr lang="en-US" sz="3200" dirty="0" err="1">
-                <a:solidFill>
-                  <a:srgbClr val="FBC5A2"/>
-                </a:solidFill>
-                <a:latin typeface="Alegreya Sans Thin" panose="00000300000000000000" pitchFamily="2" charset="0"/>
-              </a:rPr>
-              <a:t>Im</a:t>
-            </a:r>
-            <a:r>
-              <a:rPr lang="en-US" sz="3200" dirty="0">
-                <a:solidFill>
-                  <a:srgbClr val="FBC5A2"/>
-                </a:solidFill>
-                <a:latin typeface="Alegreya Sans Thin" panose="00000300000000000000" pitchFamily="2" charset="0"/>
-              </a:rPr>
-              <a:t> Kanika Asavari Vaish</a:t>
-            </a:r>
-          </a:p>
-        </p:txBody>
-      </p:sp>
       <p:pic>
         <p:nvPicPr>
-          <p:cNvPr id="5" name="Picture 4">
-            <a:extLst>
-              <a:ext uri="{FF2B5EF4-FFF2-40B4-BE49-F238E27FC236}">
-                <a16:creationId xmlns:a16="http://schemas.microsoft.com/office/drawing/2014/main" id="{A6A9BD23-4661-4DD6-852B-418E2FD5B64C}"/>
+          <p:cNvPr id="3" name="Picture 2">
+            <a:extLst>
+              <a:ext uri="{FF2B5EF4-FFF2-40B4-BE49-F238E27FC236}">
+                <a16:creationId xmlns:a16="http://schemas.microsoft.com/office/drawing/2014/main" id="{CEB59BB2-9965-443E-AAB4-F30469C87E7C}"/>
               </a:ext>
             </a:extLst>
           </p:cNvPr>
@@ -5288,6 +5214,13 @@
         </p:nvPicPr>
         <p:blipFill>
           <a:blip r:embed="rId2">
+            <a:duotone>
+              <a:schemeClr val="accent2">
+                <a:shade val="45000"/>
+                <a:satMod val="135000"/>
+              </a:schemeClr>
+              <a:prstClr val="white"/>
+            </a:duotone>
             <a:extLst>
               <a:ext uri="{28A0092B-C50C-407E-A947-70E740481C1C}">
                 <a14:useLocalDpi xmlns:a14="http://schemas.microsoft.com/office/drawing/2010/main" val="0"/>
@@ -5300,476 +5233,20 @@
         </p:blipFill>
         <p:spPr>
           <a:xfrm>
-            <a:off x="903180" y="1486601"/>
-            <a:ext cx="3820869" cy="5094492"/>
+            <a:off x="636245" y="894531"/>
+            <a:ext cx="5068937" cy="5068937"/>
           </a:xfrm>
           <a:prstGeom prst="rect">
             <a:avLst/>
           </a:prstGeom>
         </p:spPr>
       </p:pic>
-      <p:sp>
-        <p:nvSpPr>
-          <p:cNvPr id="6" name="Rectangle 5">
-            <a:extLst>
-              <a:ext uri="{FF2B5EF4-FFF2-40B4-BE49-F238E27FC236}">
-                <a16:creationId xmlns:a16="http://schemas.microsoft.com/office/drawing/2014/main" id="{EA6ABC74-7487-4FB9-B52F-59DC2ED0294C}"/>
-              </a:ext>
-            </a:extLst>
-          </p:cNvPr>
-          <p:cNvSpPr/>
-          <p:nvPr/>
-        </p:nvSpPr>
-        <p:spPr>
-          <a:xfrm>
-            <a:off x="1032437" y="1279038"/>
-            <a:ext cx="2473929" cy="56098"/>
-          </a:xfrm>
-          <a:prstGeom prst="rect">
-            <a:avLst/>
-          </a:prstGeom>
-          <a:solidFill>
-            <a:srgbClr val="FF8047"/>
-          </a:solidFill>
-          <a:ln>
-            <a:noFill/>
-          </a:ln>
-        </p:spPr>
-        <p:style>
-          <a:lnRef idx="2">
-            <a:schemeClr val="accent1">
-              <a:shade val="50000"/>
-            </a:schemeClr>
-          </a:lnRef>
-          <a:fillRef idx="1">
-            <a:schemeClr val="accent1"/>
-          </a:fillRef>
-          <a:effectRef idx="0">
-            <a:schemeClr val="accent1"/>
-          </a:effectRef>
-          <a:fontRef idx="minor">
-            <a:schemeClr val="lt1"/>
-          </a:fontRef>
-        </p:style>
-        <p:txBody>
-          <a:bodyPr rtlCol="0" anchor="ctr"/>
-          <a:lstStyle/>
-          <a:p>
-            <a:pPr algn="ctr"/>
-            <a:endParaRPr lang="en-US"/>
-          </a:p>
-        </p:txBody>
-      </p:sp>
-      <p:sp>
-        <p:nvSpPr>
-          <p:cNvPr id="7" name="Title 1">
-            <a:extLst>
-              <a:ext uri="{FF2B5EF4-FFF2-40B4-BE49-F238E27FC236}">
-                <a16:creationId xmlns:a16="http://schemas.microsoft.com/office/drawing/2014/main" id="{578DE48D-B009-44BF-B609-F3AF8BACF5A1}"/>
-              </a:ext>
-            </a:extLst>
-          </p:cNvPr>
-          <p:cNvSpPr txBox="1">
-            <a:spLocks/>
-          </p:cNvSpPr>
-          <p:nvPr/>
-        </p:nvSpPr>
-        <p:spPr>
-          <a:xfrm>
-            <a:off x="5627579" y="422159"/>
-            <a:ext cx="1693231" cy="1325563"/>
-          </a:xfrm>
-          <a:prstGeom prst="rect">
-            <a:avLst/>
-          </a:prstGeom>
-        </p:spPr>
-        <p:txBody>
-          <a:bodyPr vert="horz" lIns="91440" tIns="45720" rIns="91440" bIns="45720" rtlCol="0" anchor="ctr">
-            <a:normAutofit/>
-          </a:bodyPr>
-          <a:lstStyle>
-            <a:lvl1pPr algn="l" defTabSz="914400" rtl="0" eaLnBrk="1" latinLnBrk="0" hangingPunct="1">
-              <a:lnSpc>
-                <a:spcPct val="90000"/>
-              </a:lnSpc>
-              <a:spcBef>
-                <a:spcPct val="0"/>
-              </a:spcBef>
-              <a:buNone/>
-              <a:defRPr sz="4400" kern="1200">
-                <a:solidFill>
-                  <a:schemeClr val="tx1"/>
-                </a:solidFill>
-                <a:latin typeface="+mj-lt"/>
-                <a:ea typeface="+mj-ea"/>
-                <a:cs typeface="+mj-cs"/>
-              </a:defRPr>
-            </a:lvl1pPr>
-          </a:lstStyle>
-          <a:p>
-            <a:r>
-              <a:rPr lang="en-US" sz="3200" dirty="0">
-                <a:solidFill>
-                  <a:srgbClr val="FBC5A2"/>
-                </a:solidFill>
-                <a:latin typeface="Alegreya Sans Thin" panose="00000300000000000000" pitchFamily="2" charset="0"/>
-              </a:rPr>
-              <a:t>portfolio</a:t>
-            </a:r>
-          </a:p>
-        </p:txBody>
-      </p:sp>
-      <p:sp>
-        <p:nvSpPr>
-          <p:cNvPr id="8" name="Title 1">
-            <a:extLst>
-              <a:ext uri="{FF2B5EF4-FFF2-40B4-BE49-F238E27FC236}">
-                <a16:creationId xmlns:a16="http://schemas.microsoft.com/office/drawing/2014/main" id="{C6358EC4-C6F5-4711-87FF-2FD031D527EF}"/>
-              </a:ext>
-            </a:extLst>
-          </p:cNvPr>
-          <p:cNvSpPr txBox="1">
-            <a:spLocks/>
-          </p:cNvSpPr>
-          <p:nvPr/>
-        </p:nvSpPr>
-        <p:spPr>
-          <a:xfrm>
-            <a:off x="7623269" y="422158"/>
-            <a:ext cx="1526341" cy="1325563"/>
-          </a:xfrm>
-          <a:prstGeom prst="rect">
-            <a:avLst/>
-          </a:prstGeom>
-        </p:spPr>
-        <p:txBody>
-          <a:bodyPr vert="horz" lIns="91440" tIns="45720" rIns="91440" bIns="45720" rtlCol="0" anchor="ctr">
-            <a:normAutofit/>
-          </a:bodyPr>
-          <a:lstStyle>
-            <a:lvl1pPr algn="l" defTabSz="914400" rtl="0" eaLnBrk="1" latinLnBrk="0" hangingPunct="1">
-              <a:lnSpc>
-                <a:spcPct val="90000"/>
-              </a:lnSpc>
-              <a:spcBef>
-                <a:spcPct val="0"/>
-              </a:spcBef>
-              <a:buNone/>
-              <a:defRPr sz="4400" kern="1200">
-                <a:solidFill>
-                  <a:schemeClr val="tx1"/>
-                </a:solidFill>
-                <a:latin typeface="+mj-lt"/>
-                <a:ea typeface="+mj-ea"/>
-                <a:cs typeface="+mj-cs"/>
-              </a:defRPr>
-            </a:lvl1pPr>
-          </a:lstStyle>
-          <a:p>
-            <a:r>
-              <a:rPr lang="en-US" sz="3200" dirty="0">
-                <a:solidFill>
-                  <a:srgbClr val="FBC5A2"/>
-                </a:solidFill>
-                <a:latin typeface="Alegreya Sans Thin" panose="00000300000000000000" pitchFamily="2" charset="0"/>
-              </a:rPr>
-              <a:t>contact</a:t>
-            </a:r>
-          </a:p>
-        </p:txBody>
-      </p:sp>
-      <p:sp>
-        <p:nvSpPr>
-          <p:cNvPr id="9" name="Title 1">
-            <a:extLst>
-              <a:ext uri="{FF2B5EF4-FFF2-40B4-BE49-F238E27FC236}">
-                <a16:creationId xmlns:a16="http://schemas.microsoft.com/office/drawing/2014/main" id="{265284E1-7E9D-46A8-8166-CE42EE493C77}"/>
-              </a:ext>
-            </a:extLst>
-          </p:cNvPr>
-          <p:cNvSpPr txBox="1">
-            <a:spLocks/>
-          </p:cNvSpPr>
-          <p:nvPr/>
-        </p:nvSpPr>
-        <p:spPr>
-          <a:xfrm>
-            <a:off x="9634392" y="422158"/>
-            <a:ext cx="1526341" cy="1325563"/>
-          </a:xfrm>
-          <a:prstGeom prst="rect">
-            <a:avLst/>
-          </a:prstGeom>
-        </p:spPr>
-        <p:txBody>
-          <a:bodyPr vert="horz" lIns="91440" tIns="45720" rIns="91440" bIns="45720" rtlCol="0" anchor="ctr">
-            <a:normAutofit/>
-          </a:bodyPr>
-          <a:lstStyle>
-            <a:lvl1pPr algn="l" defTabSz="914400" rtl="0" eaLnBrk="1" latinLnBrk="0" hangingPunct="1">
-              <a:lnSpc>
-                <a:spcPct val="90000"/>
-              </a:lnSpc>
-              <a:spcBef>
-                <a:spcPct val="0"/>
-              </a:spcBef>
-              <a:buNone/>
-              <a:defRPr sz="4400" kern="1200">
-                <a:solidFill>
-                  <a:schemeClr val="tx1"/>
-                </a:solidFill>
-                <a:latin typeface="+mj-lt"/>
-                <a:ea typeface="+mj-ea"/>
-                <a:cs typeface="+mj-cs"/>
-              </a:defRPr>
-            </a:lvl1pPr>
-          </a:lstStyle>
-          <a:p>
-            <a:r>
-              <a:rPr lang="en-US" sz="3200" dirty="0">
-                <a:solidFill>
-                  <a:srgbClr val="FBC5A2"/>
-                </a:solidFill>
-                <a:latin typeface="Alegreya Sans Thin" panose="00000300000000000000" pitchFamily="2" charset="0"/>
-              </a:rPr>
-              <a:t>about</a:t>
-            </a:r>
-          </a:p>
-        </p:txBody>
-      </p:sp>
-      <p:sp>
-        <p:nvSpPr>
-          <p:cNvPr id="10" name="Rectangle 9">
-            <a:extLst>
-              <a:ext uri="{FF2B5EF4-FFF2-40B4-BE49-F238E27FC236}">
-                <a16:creationId xmlns:a16="http://schemas.microsoft.com/office/drawing/2014/main" id="{1982BA7F-3614-4A4E-9778-C78732DDE1D7}"/>
-              </a:ext>
-            </a:extLst>
-          </p:cNvPr>
-          <p:cNvSpPr/>
-          <p:nvPr/>
-        </p:nvSpPr>
-        <p:spPr>
-          <a:xfrm flipH="1" flipV="1">
-            <a:off x="7275697" y="1016498"/>
-            <a:ext cx="130895" cy="136881"/>
-          </a:xfrm>
-          <a:prstGeom prst="rect">
-            <a:avLst/>
-          </a:prstGeom>
-          <a:solidFill>
-            <a:srgbClr val="FF8047"/>
-          </a:solidFill>
-          <a:ln>
-            <a:noFill/>
-          </a:ln>
-        </p:spPr>
-        <p:style>
-          <a:lnRef idx="2">
-            <a:schemeClr val="accent1">
-              <a:shade val="50000"/>
-            </a:schemeClr>
-          </a:lnRef>
-          <a:fillRef idx="1">
-            <a:schemeClr val="accent1"/>
-          </a:fillRef>
-          <a:effectRef idx="0">
-            <a:schemeClr val="accent1"/>
-          </a:effectRef>
-          <a:fontRef idx="minor">
-            <a:schemeClr val="lt1"/>
-          </a:fontRef>
-        </p:style>
-        <p:txBody>
-          <a:bodyPr rtlCol="0" anchor="ctr"/>
-          <a:lstStyle/>
-          <a:p>
-            <a:pPr algn="ctr"/>
-            <a:endParaRPr lang="en-US"/>
-          </a:p>
-        </p:txBody>
-      </p:sp>
-      <p:sp>
-        <p:nvSpPr>
-          <p:cNvPr id="11" name="Rectangle 10">
-            <a:extLst>
-              <a:ext uri="{FF2B5EF4-FFF2-40B4-BE49-F238E27FC236}">
-                <a16:creationId xmlns:a16="http://schemas.microsoft.com/office/drawing/2014/main" id="{9C272424-7C2B-4B3F-9FC9-2CBCEA291A11}"/>
-              </a:ext>
-            </a:extLst>
-          </p:cNvPr>
-          <p:cNvSpPr/>
-          <p:nvPr/>
-        </p:nvSpPr>
-        <p:spPr>
-          <a:xfrm flipH="1" flipV="1">
-            <a:off x="9262273" y="1016497"/>
-            <a:ext cx="130895" cy="136881"/>
-          </a:xfrm>
-          <a:prstGeom prst="rect">
-            <a:avLst/>
-          </a:prstGeom>
-          <a:solidFill>
-            <a:srgbClr val="FF8047"/>
-          </a:solidFill>
-          <a:ln>
-            <a:noFill/>
-          </a:ln>
-        </p:spPr>
-        <p:style>
-          <a:lnRef idx="2">
-            <a:schemeClr val="accent1">
-              <a:shade val="50000"/>
-            </a:schemeClr>
-          </a:lnRef>
-          <a:fillRef idx="1">
-            <a:schemeClr val="accent1"/>
-          </a:fillRef>
-          <a:effectRef idx="0">
-            <a:schemeClr val="accent1"/>
-          </a:effectRef>
-          <a:fontRef idx="minor">
-            <a:schemeClr val="lt1"/>
-          </a:fontRef>
-        </p:style>
-        <p:txBody>
-          <a:bodyPr rtlCol="0" anchor="ctr"/>
-          <a:lstStyle/>
-          <a:p>
-            <a:pPr algn="ctr"/>
-            <a:endParaRPr lang="en-US"/>
-          </a:p>
-        </p:txBody>
-      </p:sp>
-      <p:sp>
-        <p:nvSpPr>
-          <p:cNvPr id="13" name="TextBox 12">
-            <a:extLst>
-              <a:ext uri="{FF2B5EF4-FFF2-40B4-BE49-F238E27FC236}">
-                <a16:creationId xmlns:a16="http://schemas.microsoft.com/office/drawing/2014/main" id="{2F9BC14B-E033-42B2-8F47-7F1E18B4BEB1}"/>
-              </a:ext>
-            </a:extLst>
-          </p:cNvPr>
-          <p:cNvSpPr txBox="1"/>
-          <p:nvPr/>
-        </p:nvSpPr>
-        <p:spPr>
-          <a:xfrm>
-            <a:off x="11007627" y="6396427"/>
-            <a:ext cx="898623" cy="369332"/>
-          </a:xfrm>
-          <a:prstGeom prst="rect">
-            <a:avLst/>
-          </a:prstGeom>
-          <a:solidFill>
-            <a:srgbClr val="0F0F1A"/>
-          </a:solidFill>
-        </p:spPr>
-        <p:txBody>
-          <a:bodyPr wrap="square" rtlCol="0">
-            <a:spAutoFit/>
-          </a:bodyPr>
-          <a:lstStyle/>
-          <a:p>
-            <a:r>
-              <a:rPr lang="en-US" dirty="0">
-                <a:solidFill>
-                  <a:schemeClr val="bg1"/>
-                </a:solidFill>
-              </a:rPr>
-              <a:t>#0f0f1a</a:t>
-            </a:r>
-          </a:p>
-        </p:txBody>
-      </p:sp>
-      <p:sp>
-        <p:nvSpPr>
-          <p:cNvPr id="14" name="TextBox 13">
-            <a:extLst>
-              <a:ext uri="{FF2B5EF4-FFF2-40B4-BE49-F238E27FC236}">
-                <a16:creationId xmlns:a16="http://schemas.microsoft.com/office/drawing/2014/main" id="{69C887E6-F1BC-4248-BDAF-AB12E16A55E6}"/>
-              </a:ext>
-            </a:extLst>
-          </p:cNvPr>
-          <p:cNvSpPr txBox="1"/>
-          <p:nvPr/>
-        </p:nvSpPr>
-        <p:spPr>
-          <a:xfrm>
-            <a:off x="9886211" y="6973332"/>
-            <a:ext cx="1022701" cy="369332"/>
-          </a:xfrm>
-          <a:prstGeom prst="rect">
-            <a:avLst/>
-          </a:prstGeom>
-          <a:solidFill>
-            <a:srgbClr val="0F0F1A"/>
-          </a:solidFill>
-        </p:spPr>
-        <p:txBody>
-          <a:bodyPr wrap="square" rtlCol="0">
-            <a:spAutoFit/>
-          </a:bodyPr>
-          <a:lstStyle/>
-          <a:p>
-            <a:r>
-              <a:rPr lang="en-US" dirty="0">
-                <a:solidFill>
-                  <a:srgbClr val="FBC5A2"/>
-                </a:solidFill>
-              </a:rPr>
-              <a:t>#fbc5a2</a:t>
-            </a:r>
-          </a:p>
-        </p:txBody>
-      </p:sp>
-      <p:sp>
-        <p:nvSpPr>
-          <p:cNvPr id="15" name="TextBox 14">
-            <a:extLst>
-              <a:ext uri="{FF2B5EF4-FFF2-40B4-BE49-F238E27FC236}">
-                <a16:creationId xmlns:a16="http://schemas.microsoft.com/office/drawing/2014/main" id="{2FEA50A1-1069-4196-A347-287903D3DF43}"/>
-              </a:ext>
-            </a:extLst>
-          </p:cNvPr>
-          <p:cNvSpPr txBox="1"/>
-          <p:nvPr/>
-        </p:nvSpPr>
-        <p:spPr>
-          <a:xfrm>
-            <a:off x="11181999" y="6973332"/>
-            <a:ext cx="959201" cy="369332"/>
-          </a:xfrm>
-          <a:prstGeom prst="rect">
-            <a:avLst/>
-          </a:prstGeom>
-          <a:solidFill>
-            <a:srgbClr val="0F0F1A"/>
-          </a:solidFill>
-        </p:spPr>
-        <p:txBody>
-          <a:bodyPr wrap="square" rtlCol="0">
-            <a:spAutoFit/>
-          </a:bodyPr>
-          <a:lstStyle/>
-          <a:p>
-            <a:r>
-              <a:rPr lang="en-US" dirty="0">
-                <a:solidFill>
-                  <a:srgbClr val="FF8047"/>
-                </a:solidFill>
-              </a:rPr>
-              <a:t>#ff8047</a:t>
-            </a:r>
-          </a:p>
-        </p:txBody>
-      </p:sp>
       <p:pic>
         <p:nvPicPr>
           <p:cNvPr id="4" name="Picture 3">
             <a:extLst>
               <a:ext uri="{FF2B5EF4-FFF2-40B4-BE49-F238E27FC236}">
-                <a16:creationId xmlns:a16="http://schemas.microsoft.com/office/drawing/2014/main" id="{35E11240-9681-4D2B-938A-999D3752550A}"/>
+                <a16:creationId xmlns:a16="http://schemas.microsoft.com/office/drawing/2014/main" id="{CAA4445F-3BED-4DDC-A992-F6288B3A2275}"/>
               </a:ext>
             </a:extLst>
           </p:cNvPr>
@@ -5779,45 +5256,28 @@
           <p:nvPr/>
         </p:nvPicPr>
         <p:blipFill>
-          <a:blip r:embed="rId3"/>
+          <a:blip r:embed="rId2">
+            <a:duotone>
+              <a:schemeClr val="accent3">
+                <a:shade val="45000"/>
+                <a:satMod val="135000"/>
+              </a:schemeClr>
+              <a:prstClr val="white"/>
+            </a:duotone>
+            <a:extLst>
+              <a:ext uri="{28A0092B-C50C-407E-A947-70E740481C1C}">
+                <a14:useLocalDpi xmlns:a14="http://schemas.microsoft.com/office/drawing/2010/main" val="0"/>
+              </a:ext>
+            </a:extLst>
+          </a:blip>
           <a:stretch>
             <a:fillRect/>
           </a:stretch>
         </p:blipFill>
         <p:spPr>
           <a:xfrm>
-            <a:off x="7150210" y="863058"/>
-            <a:ext cx="341200" cy="393604"/>
-          </a:xfrm>
-          <a:prstGeom prst="rect">
-            <a:avLst/>
-          </a:prstGeom>
-        </p:spPr>
-      </p:pic>
-      <p:pic>
-        <p:nvPicPr>
-          <p:cNvPr id="18" name="Picture 17">
-            <a:extLst>
-              <a:ext uri="{FF2B5EF4-FFF2-40B4-BE49-F238E27FC236}">
-                <a16:creationId xmlns:a16="http://schemas.microsoft.com/office/drawing/2014/main" id="{B6F0472C-50BC-4EB2-A62B-B58C74B90ACA}"/>
-              </a:ext>
-            </a:extLst>
-          </p:cNvPr>
-          <p:cNvPicPr>
-            <a:picLocks noChangeAspect="1"/>
-          </p:cNvPicPr>
-          <p:nvPr/>
-        </p:nvPicPr>
-        <p:blipFill>
-          <a:blip r:embed="rId3"/>
-          <a:stretch>
-            <a:fillRect/>
-          </a:stretch>
-        </p:blipFill>
-        <p:spPr>
-          <a:xfrm>
-            <a:off x="9172580" y="888135"/>
-            <a:ext cx="341200" cy="393604"/>
+            <a:off x="6678952" y="1002053"/>
+            <a:ext cx="5068937" cy="5068937"/>
           </a:xfrm>
           <a:prstGeom prst="rect">
             <a:avLst/>
@@ -5827,7 +5287,7 @@
     </p:spTree>
     <p:extLst>
       <p:ext uri="{BB962C8B-B14F-4D97-AF65-F5344CB8AC3E}">
-        <p14:creationId xmlns:p14="http://schemas.microsoft.com/office/powerpoint/2010/main" val="2222751745"/>
+        <p14:creationId xmlns:p14="http://schemas.microsoft.com/office/powerpoint/2010/main" val="681381714"/>
       </p:ext>
     </p:extLst>
   </p:cSld>
@@ -5862,36 +5322,6 @@
           <a:chExt cx="0" cy="0"/>
         </a:xfrm>
       </p:grpSpPr>
-      <p:pic>
-        <p:nvPicPr>
-          <p:cNvPr id="4" name="Picture 3">
-            <a:extLst>
-              <a:ext uri="{FF2B5EF4-FFF2-40B4-BE49-F238E27FC236}">
-                <a16:creationId xmlns:a16="http://schemas.microsoft.com/office/drawing/2014/main" id="{78BDB9AB-5883-4F5A-9F96-EE43451CAA7E}"/>
-              </a:ext>
-            </a:extLst>
-          </p:cNvPr>
-          <p:cNvPicPr>
-            <a:picLocks noChangeAspect="1"/>
-          </p:cNvPicPr>
-          <p:nvPr/>
-        </p:nvPicPr>
-        <p:blipFill>
-          <a:blip r:embed="rId2"/>
-          <a:stretch>
-            <a:fillRect/>
-          </a:stretch>
-        </p:blipFill>
-        <p:spPr>
-          <a:xfrm>
-            <a:off x="3402772" y="350379"/>
-            <a:ext cx="632950" cy="1136222"/>
-          </a:xfrm>
-          <a:prstGeom prst="rect">
-            <a:avLst/>
-          </a:prstGeom>
-        </p:spPr>
-      </p:pic>
       <p:sp>
         <p:nvSpPr>
           <p:cNvPr id="2" name="Title 1">
@@ -5916,7 +5346,7 @@
         </p:spPr>
         <p:txBody>
           <a:bodyPr anchor="b">
-            <a:normAutofit fontScale="90000"/>
+            <a:normAutofit/>
           </a:bodyPr>
           <a:lstStyle/>
           <a:p>
@@ -6026,7 +5456,7 @@
           <p:nvPr/>
         </p:nvPicPr>
         <p:blipFill>
-          <a:blip r:embed="rId3">
+          <a:blip r:embed="rId2">
             <a:extLst>
               <a:ext uri="{28A0092B-C50C-407E-A947-70E740481C1C}">
                 <a14:useLocalDpi xmlns:a14="http://schemas.microsoft.com/office/drawing/2010/main" val="0"/>
@@ -6503,10 +5933,70 @@
           </a:p>
         </p:txBody>
       </p:sp>
+      <p:pic>
+        <p:nvPicPr>
+          <p:cNvPr id="4" name="Picture 3">
+            <a:extLst>
+              <a:ext uri="{FF2B5EF4-FFF2-40B4-BE49-F238E27FC236}">
+                <a16:creationId xmlns:a16="http://schemas.microsoft.com/office/drawing/2014/main" id="{35E11240-9681-4D2B-938A-999D3752550A}"/>
+              </a:ext>
+            </a:extLst>
+          </p:cNvPr>
+          <p:cNvPicPr>
+            <a:picLocks noChangeAspect="1"/>
+          </p:cNvPicPr>
+          <p:nvPr/>
+        </p:nvPicPr>
+        <p:blipFill>
+          <a:blip r:embed="rId3"/>
+          <a:stretch>
+            <a:fillRect/>
+          </a:stretch>
+        </p:blipFill>
+        <p:spPr>
+          <a:xfrm>
+            <a:off x="7150210" y="863058"/>
+            <a:ext cx="341200" cy="393604"/>
+          </a:xfrm>
+          <a:prstGeom prst="rect">
+            <a:avLst/>
+          </a:prstGeom>
+        </p:spPr>
+      </p:pic>
+      <p:pic>
+        <p:nvPicPr>
+          <p:cNvPr id="18" name="Picture 17">
+            <a:extLst>
+              <a:ext uri="{FF2B5EF4-FFF2-40B4-BE49-F238E27FC236}">
+                <a16:creationId xmlns:a16="http://schemas.microsoft.com/office/drawing/2014/main" id="{B6F0472C-50BC-4EB2-A62B-B58C74B90ACA}"/>
+              </a:ext>
+            </a:extLst>
+          </p:cNvPr>
+          <p:cNvPicPr>
+            <a:picLocks noChangeAspect="1"/>
+          </p:cNvPicPr>
+          <p:nvPr/>
+        </p:nvPicPr>
+        <p:blipFill>
+          <a:blip r:embed="rId3"/>
+          <a:stretch>
+            <a:fillRect/>
+          </a:stretch>
+        </p:blipFill>
+        <p:spPr>
+          <a:xfrm>
+            <a:off x="9172580" y="888135"/>
+            <a:ext cx="341200" cy="393604"/>
+          </a:xfrm>
+          <a:prstGeom prst="rect">
+            <a:avLst/>
+          </a:prstGeom>
+        </p:spPr>
+      </p:pic>
     </p:spTree>
     <p:extLst>
       <p:ext uri="{BB962C8B-B14F-4D97-AF65-F5344CB8AC3E}">
-        <p14:creationId xmlns:p14="http://schemas.microsoft.com/office/powerpoint/2010/main" val="2323542024"/>
+        <p14:creationId xmlns:p14="http://schemas.microsoft.com/office/powerpoint/2010/main" val="2222751745"/>
       </p:ext>
     </p:extLst>
   </p:cSld>
@@ -6546,7 +6036,7 @@
           <p:cNvPr id="4" name="Picture 3">
             <a:extLst>
               <a:ext uri="{FF2B5EF4-FFF2-40B4-BE49-F238E27FC236}">
-                <a16:creationId xmlns:a16="http://schemas.microsoft.com/office/drawing/2014/main" id="{33442AF1-21B7-44D8-901B-109677C878BD}"/>
+                <a16:creationId xmlns:a16="http://schemas.microsoft.com/office/drawing/2014/main" id="{78BDB9AB-5883-4F5A-9F96-EE43451CAA7E}"/>
               </a:ext>
             </a:extLst>
           </p:cNvPr>
@@ -6563,8 +6053,8 @@
         </p:blipFill>
         <p:spPr>
           <a:xfrm>
-            <a:off x="3436916" y="338715"/>
-            <a:ext cx="572253" cy="1072153"/>
+            <a:off x="3402772" y="350379"/>
+            <a:ext cx="632950" cy="1136222"/>
           </a:xfrm>
           <a:prstGeom prst="rect">
             <a:avLst/>
@@ -6595,7 +6085,7 @@
         </p:spPr>
         <p:txBody>
           <a:bodyPr anchor="b">
-            <a:normAutofit fontScale="90000"/>
+            <a:normAutofit/>
           </a:bodyPr>
           <a:lstStyle/>
           <a:p>
@@ -7185,7 +6675,7 @@
     </p:spTree>
     <p:extLst>
       <p:ext uri="{BB962C8B-B14F-4D97-AF65-F5344CB8AC3E}">
-        <p14:creationId xmlns:p14="http://schemas.microsoft.com/office/powerpoint/2010/main" val="462892233"/>
+        <p14:creationId xmlns:p14="http://schemas.microsoft.com/office/powerpoint/2010/main" val="2323542024"/>
       </p:ext>
     </p:extLst>
   </p:cSld>
@@ -7220,6 +6710,36 @@
           <a:chExt cx="0" cy="0"/>
         </a:xfrm>
       </p:grpSpPr>
+      <p:pic>
+        <p:nvPicPr>
+          <p:cNvPr id="4" name="Picture 3">
+            <a:extLst>
+              <a:ext uri="{FF2B5EF4-FFF2-40B4-BE49-F238E27FC236}">
+                <a16:creationId xmlns:a16="http://schemas.microsoft.com/office/drawing/2014/main" id="{33442AF1-21B7-44D8-901B-109677C878BD}"/>
+              </a:ext>
+            </a:extLst>
+          </p:cNvPr>
+          <p:cNvPicPr>
+            <a:picLocks noChangeAspect="1"/>
+          </p:cNvPicPr>
+          <p:nvPr/>
+        </p:nvPicPr>
+        <p:blipFill>
+          <a:blip r:embed="rId2"/>
+          <a:stretch>
+            <a:fillRect/>
+          </a:stretch>
+        </p:blipFill>
+        <p:spPr>
+          <a:xfrm>
+            <a:off x="3436916" y="338715"/>
+            <a:ext cx="572253" cy="1072153"/>
+          </a:xfrm>
+          <a:prstGeom prst="rect">
+            <a:avLst/>
+          </a:prstGeom>
+        </p:spPr>
+      </p:pic>
       <p:sp>
         <p:nvSpPr>
           <p:cNvPr id="2" name="Title 1">
@@ -7244,7 +6764,656 @@
         </p:spPr>
         <p:txBody>
           <a:bodyPr anchor="b">
-            <a:normAutofit fontScale="90000"/>
+            <a:normAutofit/>
+          </a:bodyPr>
+          <a:lstStyle/>
+          <a:p>
+            <a:r>
+              <a:rPr lang="en-US" sz="8000" dirty="0">
+                <a:solidFill>
+                  <a:srgbClr val="FBC5A2"/>
+                </a:solidFill>
+                <a:latin typeface="Run Wild - Demo" pitchFamily="2" charset="0"/>
+              </a:rPr>
+              <a:t>kv	aish</a:t>
+            </a:r>
+          </a:p>
+        </p:txBody>
+      </p:sp>
+      <p:sp>
+        <p:nvSpPr>
+          <p:cNvPr id="3" name="Title 1">
+            <a:extLst>
+              <a:ext uri="{FF2B5EF4-FFF2-40B4-BE49-F238E27FC236}">
+                <a16:creationId xmlns:a16="http://schemas.microsoft.com/office/drawing/2014/main" id="{08EFA241-A330-4BEB-8BE7-AF0A2C6EDACE}"/>
+              </a:ext>
+            </a:extLst>
+          </p:cNvPr>
+          <p:cNvSpPr txBox="1">
+            <a:spLocks/>
+          </p:cNvSpPr>
+          <p:nvPr/>
+        </p:nvSpPr>
+        <p:spPr>
+          <a:xfrm>
+            <a:off x="5149811" y="2708284"/>
+            <a:ext cx="5441522" cy="1325563"/>
+          </a:xfrm>
+          <a:prstGeom prst="rect">
+            <a:avLst/>
+          </a:prstGeom>
+        </p:spPr>
+        <p:txBody>
+          <a:bodyPr vert="horz" lIns="91440" tIns="45720" rIns="91440" bIns="45720" rtlCol="0" anchor="ctr">
+            <a:normAutofit/>
+          </a:bodyPr>
+          <a:lstStyle>
+            <a:lvl1pPr algn="l" defTabSz="914400" rtl="0" eaLnBrk="1" latinLnBrk="0" hangingPunct="1">
+              <a:lnSpc>
+                <a:spcPct val="90000"/>
+              </a:lnSpc>
+              <a:spcBef>
+                <a:spcPct val="0"/>
+              </a:spcBef>
+              <a:buNone/>
+              <a:defRPr sz="4400" kern="1200">
+                <a:solidFill>
+                  <a:schemeClr val="tx1"/>
+                </a:solidFill>
+                <a:latin typeface="+mj-lt"/>
+                <a:ea typeface="+mj-ea"/>
+                <a:cs typeface="+mj-cs"/>
+              </a:defRPr>
+            </a:lvl1pPr>
+          </a:lstStyle>
+          <a:p>
+            <a:r>
+              <a:rPr lang="en-US" sz="3200" dirty="0">
+                <a:solidFill>
+                  <a:srgbClr val="FBC5A2"/>
+                </a:solidFill>
+                <a:latin typeface="Alegreya Sans Thin" panose="00000300000000000000" pitchFamily="2" charset="0"/>
+              </a:rPr>
+              <a:t>Hello  there </a:t>
+            </a:r>
+          </a:p>
+          <a:p>
+            <a:r>
+              <a:rPr lang="en-US" sz="3200" dirty="0" err="1">
+                <a:solidFill>
+                  <a:srgbClr val="FBC5A2"/>
+                </a:solidFill>
+                <a:latin typeface="Alegreya Sans Thin" panose="00000300000000000000" pitchFamily="2" charset="0"/>
+              </a:rPr>
+              <a:t>Im</a:t>
+            </a:r>
+            <a:r>
+              <a:rPr lang="en-US" sz="3200" dirty="0">
+                <a:solidFill>
+                  <a:srgbClr val="FBC5A2"/>
+                </a:solidFill>
+                <a:latin typeface="Alegreya Sans Thin" panose="00000300000000000000" pitchFamily="2" charset="0"/>
+              </a:rPr>
+              <a:t> Kanika Asavari Vaish</a:t>
+            </a:r>
+          </a:p>
+        </p:txBody>
+      </p:sp>
+      <p:pic>
+        <p:nvPicPr>
+          <p:cNvPr id="5" name="Picture 4">
+            <a:extLst>
+              <a:ext uri="{FF2B5EF4-FFF2-40B4-BE49-F238E27FC236}">
+                <a16:creationId xmlns:a16="http://schemas.microsoft.com/office/drawing/2014/main" id="{A6A9BD23-4661-4DD6-852B-418E2FD5B64C}"/>
+              </a:ext>
+            </a:extLst>
+          </p:cNvPr>
+          <p:cNvPicPr>
+            <a:picLocks noChangeAspect="1"/>
+          </p:cNvPicPr>
+          <p:nvPr/>
+        </p:nvPicPr>
+        <p:blipFill>
+          <a:blip r:embed="rId3">
+            <a:extLst>
+              <a:ext uri="{28A0092B-C50C-407E-A947-70E740481C1C}">
+                <a14:useLocalDpi xmlns:a14="http://schemas.microsoft.com/office/drawing/2010/main" val="0"/>
+              </a:ext>
+            </a:extLst>
+          </a:blip>
+          <a:stretch>
+            <a:fillRect/>
+          </a:stretch>
+        </p:blipFill>
+        <p:spPr>
+          <a:xfrm>
+            <a:off x="903180" y="1486601"/>
+            <a:ext cx="3820869" cy="5094492"/>
+          </a:xfrm>
+          <a:prstGeom prst="rect">
+            <a:avLst/>
+          </a:prstGeom>
+        </p:spPr>
+      </p:pic>
+      <p:sp>
+        <p:nvSpPr>
+          <p:cNvPr id="6" name="Rectangle 5">
+            <a:extLst>
+              <a:ext uri="{FF2B5EF4-FFF2-40B4-BE49-F238E27FC236}">
+                <a16:creationId xmlns:a16="http://schemas.microsoft.com/office/drawing/2014/main" id="{EA6ABC74-7487-4FB9-B52F-59DC2ED0294C}"/>
+              </a:ext>
+            </a:extLst>
+          </p:cNvPr>
+          <p:cNvSpPr/>
+          <p:nvPr/>
+        </p:nvSpPr>
+        <p:spPr>
+          <a:xfrm>
+            <a:off x="1032437" y="1279038"/>
+            <a:ext cx="2473929" cy="56098"/>
+          </a:xfrm>
+          <a:prstGeom prst="rect">
+            <a:avLst/>
+          </a:prstGeom>
+          <a:solidFill>
+            <a:srgbClr val="FF8047"/>
+          </a:solidFill>
+          <a:ln>
+            <a:noFill/>
+          </a:ln>
+        </p:spPr>
+        <p:style>
+          <a:lnRef idx="2">
+            <a:schemeClr val="accent1">
+              <a:shade val="50000"/>
+            </a:schemeClr>
+          </a:lnRef>
+          <a:fillRef idx="1">
+            <a:schemeClr val="accent1"/>
+          </a:fillRef>
+          <a:effectRef idx="0">
+            <a:schemeClr val="accent1"/>
+          </a:effectRef>
+          <a:fontRef idx="minor">
+            <a:schemeClr val="lt1"/>
+          </a:fontRef>
+        </p:style>
+        <p:txBody>
+          <a:bodyPr rtlCol="0" anchor="ctr"/>
+          <a:lstStyle/>
+          <a:p>
+            <a:pPr algn="ctr"/>
+            <a:endParaRPr lang="en-US"/>
+          </a:p>
+        </p:txBody>
+      </p:sp>
+      <p:sp>
+        <p:nvSpPr>
+          <p:cNvPr id="7" name="Title 1">
+            <a:extLst>
+              <a:ext uri="{FF2B5EF4-FFF2-40B4-BE49-F238E27FC236}">
+                <a16:creationId xmlns:a16="http://schemas.microsoft.com/office/drawing/2014/main" id="{578DE48D-B009-44BF-B609-F3AF8BACF5A1}"/>
+              </a:ext>
+            </a:extLst>
+          </p:cNvPr>
+          <p:cNvSpPr txBox="1">
+            <a:spLocks/>
+          </p:cNvSpPr>
+          <p:nvPr/>
+        </p:nvSpPr>
+        <p:spPr>
+          <a:xfrm>
+            <a:off x="5627579" y="422159"/>
+            <a:ext cx="1693231" cy="1325563"/>
+          </a:xfrm>
+          <a:prstGeom prst="rect">
+            <a:avLst/>
+          </a:prstGeom>
+        </p:spPr>
+        <p:txBody>
+          <a:bodyPr vert="horz" lIns="91440" tIns="45720" rIns="91440" bIns="45720" rtlCol="0" anchor="ctr">
+            <a:normAutofit/>
+          </a:bodyPr>
+          <a:lstStyle>
+            <a:lvl1pPr algn="l" defTabSz="914400" rtl="0" eaLnBrk="1" latinLnBrk="0" hangingPunct="1">
+              <a:lnSpc>
+                <a:spcPct val="90000"/>
+              </a:lnSpc>
+              <a:spcBef>
+                <a:spcPct val="0"/>
+              </a:spcBef>
+              <a:buNone/>
+              <a:defRPr sz="4400" kern="1200">
+                <a:solidFill>
+                  <a:schemeClr val="tx1"/>
+                </a:solidFill>
+                <a:latin typeface="+mj-lt"/>
+                <a:ea typeface="+mj-ea"/>
+                <a:cs typeface="+mj-cs"/>
+              </a:defRPr>
+            </a:lvl1pPr>
+          </a:lstStyle>
+          <a:p>
+            <a:r>
+              <a:rPr lang="en-US" sz="3200" dirty="0">
+                <a:solidFill>
+                  <a:srgbClr val="FBC5A2"/>
+                </a:solidFill>
+                <a:latin typeface="Alegreya Sans Thin" panose="00000300000000000000" pitchFamily="2" charset="0"/>
+              </a:rPr>
+              <a:t>portfolio</a:t>
+            </a:r>
+          </a:p>
+        </p:txBody>
+      </p:sp>
+      <p:sp>
+        <p:nvSpPr>
+          <p:cNvPr id="8" name="Title 1">
+            <a:extLst>
+              <a:ext uri="{FF2B5EF4-FFF2-40B4-BE49-F238E27FC236}">
+                <a16:creationId xmlns:a16="http://schemas.microsoft.com/office/drawing/2014/main" id="{C6358EC4-C6F5-4711-87FF-2FD031D527EF}"/>
+              </a:ext>
+            </a:extLst>
+          </p:cNvPr>
+          <p:cNvSpPr txBox="1">
+            <a:spLocks/>
+          </p:cNvSpPr>
+          <p:nvPr/>
+        </p:nvSpPr>
+        <p:spPr>
+          <a:xfrm>
+            <a:off x="7623269" y="422158"/>
+            <a:ext cx="1526341" cy="1325563"/>
+          </a:xfrm>
+          <a:prstGeom prst="rect">
+            <a:avLst/>
+          </a:prstGeom>
+        </p:spPr>
+        <p:txBody>
+          <a:bodyPr vert="horz" lIns="91440" tIns="45720" rIns="91440" bIns="45720" rtlCol="0" anchor="ctr">
+            <a:normAutofit/>
+          </a:bodyPr>
+          <a:lstStyle>
+            <a:lvl1pPr algn="l" defTabSz="914400" rtl="0" eaLnBrk="1" latinLnBrk="0" hangingPunct="1">
+              <a:lnSpc>
+                <a:spcPct val="90000"/>
+              </a:lnSpc>
+              <a:spcBef>
+                <a:spcPct val="0"/>
+              </a:spcBef>
+              <a:buNone/>
+              <a:defRPr sz="4400" kern="1200">
+                <a:solidFill>
+                  <a:schemeClr val="tx1"/>
+                </a:solidFill>
+                <a:latin typeface="+mj-lt"/>
+                <a:ea typeface="+mj-ea"/>
+                <a:cs typeface="+mj-cs"/>
+              </a:defRPr>
+            </a:lvl1pPr>
+          </a:lstStyle>
+          <a:p>
+            <a:r>
+              <a:rPr lang="en-US" sz="3200" dirty="0">
+                <a:solidFill>
+                  <a:srgbClr val="FBC5A2"/>
+                </a:solidFill>
+                <a:latin typeface="Alegreya Sans Thin" panose="00000300000000000000" pitchFamily="2" charset="0"/>
+              </a:rPr>
+              <a:t>contact</a:t>
+            </a:r>
+          </a:p>
+        </p:txBody>
+      </p:sp>
+      <p:sp>
+        <p:nvSpPr>
+          <p:cNvPr id="9" name="Title 1">
+            <a:extLst>
+              <a:ext uri="{FF2B5EF4-FFF2-40B4-BE49-F238E27FC236}">
+                <a16:creationId xmlns:a16="http://schemas.microsoft.com/office/drawing/2014/main" id="{265284E1-7E9D-46A8-8166-CE42EE493C77}"/>
+              </a:ext>
+            </a:extLst>
+          </p:cNvPr>
+          <p:cNvSpPr txBox="1">
+            <a:spLocks/>
+          </p:cNvSpPr>
+          <p:nvPr/>
+        </p:nvSpPr>
+        <p:spPr>
+          <a:xfrm>
+            <a:off x="9634392" y="422158"/>
+            <a:ext cx="1526341" cy="1325563"/>
+          </a:xfrm>
+          <a:prstGeom prst="rect">
+            <a:avLst/>
+          </a:prstGeom>
+        </p:spPr>
+        <p:txBody>
+          <a:bodyPr vert="horz" lIns="91440" tIns="45720" rIns="91440" bIns="45720" rtlCol="0" anchor="ctr">
+            <a:normAutofit/>
+          </a:bodyPr>
+          <a:lstStyle>
+            <a:lvl1pPr algn="l" defTabSz="914400" rtl="0" eaLnBrk="1" latinLnBrk="0" hangingPunct="1">
+              <a:lnSpc>
+                <a:spcPct val="90000"/>
+              </a:lnSpc>
+              <a:spcBef>
+                <a:spcPct val="0"/>
+              </a:spcBef>
+              <a:buNone/>
+              <a:defRPr sz="4400" kern="1200">
+                <a:solidFill>
+                  <a:schemeClr val="tx1"/>
+                </a:solidFill>
+                <a:latin typeface="+mj-lt"/>
+                <a:ea typeface="+mj-ea"/>
+                <a:cs typeface="+mj-cs"/>
+              </a:defRPr>
+            </a:lvl1pPr>
+          </a:lstStyle>
+          <a:p>
+            <a:r>
+              <a:rPr lang="en-US" sz="3200" dirty="0">
+                <a:solidFill>
+                  <a:srgbClr val="FBC5A2"/>
+                </a:solidFill>
+                <a:latin typeface="Alegreya Sans Thin" panose="00000300000000000000" pitchFamily="2" charset="0"/>
+              </a:rPr>
+              <a:t>about</a:t>
+            </a:r>
+          </a:p>
+        </p:txBody>
+      </p:sp>
+      <p:sp>
+        <p:nvSpPr>
+          <p:cNvPr id="10" name="Rectangle 9">
+            <a:extLst>
+              <a:ext uri="{FF2B5EF4-FFF2-40B4-BE49-F238E27FC236}">
+                <a16:creationId xmlns:a16="http://schemas.microsoft.com/office/drawing/2014/main" id="{1982BA7F-3614-4A4E-9778-C78732DDE1D7}"/>
+              </a:ext>
+            </a:extLst>
+          </p:cNvPr>
+          <p:cNvSpPr/>
+          <p:nvPr/>
+        </p:nvSpPr>
+        <p:spPr>
+          <a:xfrm flipH="1" flipV="1">
+            <a:off x="7275697" y="1016498"/>
+            <a:ext cx="130895" cy="136881"/>
+          </a:xfrm>
+          <a:prstGeom prst="rect">
+            <a:avLst/>
+          </a:prstGeom>
+          <a:solidFill>
+            <a:srgbClr val="FF8047"/>
+          </a:solidFill>
+          <a:ln>
+            <a:noFill/>
+          </a:ln>
+        </p:spPr>
+        <p:style>
+          <a:lnRef idx="2">
+            <a:schemeClr val="accent1">
+              <a:shade val="50000"/>
+            </a:schemeClr>
+          </a:lnRef>
+          <a:fillRef idx="1">
+            <a:schemeClr val="accent1"/>
+          </a:fillRef>
+          <a:effectRef idx="0">
+            <a:schemeClr val="accent1"/>
+          </a:effectRef>
+          <a:fontRef idx="minor">
+            <a:schemeClr val="lt1"/>
+          </a:fontRef>
+        </p:style>
+        <p:txBody>
+          <a:bodyPr rtlCol="0" anchor="ctr"/>
+          <a:lstStyle/>
+          <a:p>
+            <a:pPr algn="ctr"/>
+            <a:endParaRPr lang="en-US"/>
+          </a:p>
+        </p:txBody>
+      </p:sp>
+      <p:sp>
+        <p:nvSpPr>
+          <p:cNvPr id="11" name="Rectangle 10">
+            <a:extLst>
+              <a:ext uri="{FF2B5EF4-FFF2-40B4-BE49-F238E27FC236}">
+                <a16:creationId xmlns:a16="http://schemas.microsoft.com/office/drawing/2014/main" id="{9C272424-7C2B-4B3F-9FC9-2CBCEA291A11}"/>
+              </a:ext>
+            </a:extLst>
+          </p:cNvPr>
+          <p:cNvSpPr/>
+          <p:nvPr/>
+        </p:nvSpPr>
+        <p:spPr>
+          <a:xfrm flipH="1" flipV="1">
+            <a:off x="9262273" y="1016497"/>
+            <a:ext cx="130895" cy="136881"/>
+          </a:xfrm>
+          <a:prstGeom prst="rect">
+            <a:avLst/>
+          </a:prstGeom>
+          <a:solidFill>
+            <a:srgbClr val="FF8047"/>
+          </a:solidFill>
+          <a:ln>
+            <a:noFill/>
+          </a:ln>
+        </p:spPr>
+        <p:style>
+          <a:lnRef idx="2">
+            <a:schemeClr val="accent1">
+              <a:shade val="50000"/>
+            </a:schemeClr>
+          </a:lnRef>
+          <a:fillRef idx="1">
+            <a:schemeClr val="accent1"/>
+          </a:fillRef>
+          <a:effectRef idx="0">
+            <a:schemeClr val="accent1"/>
+          </a:effectRef>
+          <a:fontRef idx="minor">
+            <a:schemeClr val="lt1"/>
+          </a:fontRef>
+        </p:style>
+        <p:txBody>
+          <a:bodyPr rtlCol="0" anchor="ctr"/>
+          <a:lstStyle/>
+          <a:p>
+            <a:pPr algn="ctr"/>
+            <a:endParaRPr lang="en-US"/>
+          </a:p>
+        </p:txBody>
+      </p:sp>
+      <p:sp>
+        <p:nvSpPr>
+          <p:cNvPr id="13" name="TextBox 12">
+            <a:extLst>
+              <a:ext uri="{FF2B5EF4-FFF2-40B4-BE49-F238E27FC236}">
+                <a16:creationId xmlns:a16="http://schemas.microsoft.com/office/drawing/2014/main" id="{2F9BC14B-E033-42B2-8F47-7F1E18B4BEB1}"/>
+              </a:ext>
+            </a:extLst>
+          </p:cNvPr>
+          <p:cNvSpPr txBox="1"/>
+          <p:nvPr/>
+        </p:nvSpPr>
+        <p:spPr>
+          <a:xfrm>
+            <a:off x="11007627" y="6396427"/>
+            <a:ext cx="898623" cy="369332"/>
+          </a:xfrm>
+          <a:prstGeom prst="rect">
+            <a:avLst/>
+          </a:prstGeom>
+          <a:solidFill>
+            <a:srgbClr val="0F0F1A"/>
+          </a:solidFill>
+        </p:spPr>
+        <p:txBody>
+          <a:bodyPr wrap="square" rtlCol="0">
+            <a:spAutoFit/>
+          </a:bodyPr>
+          <a:lstStyle/>
+          <a:p>
+            <a:r>
+              <a:rPr lang="en-US" dirty="0">
+                <a:solidFill>
+                  <a:schemeClr val="bg1"/>
+                </a:solidFill>
+              </a:rPr>
+              <a:t>#0f0f1a</a:t>
+            </a:r>
+          </a:p>
+        </p:txBody>
+      </p:sp>
+      <p:sp>
+        <p:nvSpPr>
+          <p:cNvPr id="14" name="TextBox 13">
+            <a:extLst>
+              <a:ext uri="{FF2B5EF4-FFF2-40B4-BE49-F238E27FC236}">
+                <a16:creationId xmlns:a16="http://schemas.microsoft.com/office/drawing/2014/main" id="{69C887E6-F1BC-4248-BDAF-AB12E16A55E6}"/>
+              </a:ext>
+            </a:extLst>
+          </p:cNvPr>
+          <p:cNvSpPr txBox="1"/>
+          <p:nvPr/>
+        </p:nvSpPr>
+        <p:spPr>
+          <a:xfrm>
+            <a:off x="9886211" y="6973332"/>
+            <a:ext cx="1022701" cy="369332"/>
+          </a:xfrm>
+          <a:prstGeom prst="rect">
+            <a:avLst/>
+          </a:prstGeom>
+          <a:solidFill>
+            <a:srgbClr val="0F0F1A"/>
+          </a:solidFill>
+        </p:spPr>
+        <p:txBody>
+          <a:bodyPr wrap="square" rtlCol="0">
+            <a:spAutoFit/>
+          </a:bodyPr>
+          <a:lstStyle/>
+          <a:p>
+            <a:r>
+              <a:rPr lang="en-US" dirty="0">
+                <a:solidFill>
+                  <a:srgbClr val="FBC5A2"/>
+                </a:solidFill>
+              </a:rPr>
+              <a:t>#fbc5a2</a:t>
+            </a:r>
+          </a:p>
+        </p:txBody>
+      </p:sp>
+      <p:sp>
+        <p:nvSpPr>
+          <p:cNvPr id="15" name="TextBox 14">
+            <a:extLst>
+              <a:ext uri="{FF2B5EF4-FFF2-40B4-BE49-F238E27FC236}">
+                <a16:creationId xmlns:a16="http://schemas.microsoft.com/office/drawing/2014/main" id="{2FEA50A1-1069-4196-A347-287903D3DF43}"/>
+              </a:ext>
+            </a:extLst>
+          </p:cNvPr>
+          <p:cNvSpPr txBox="1"/>
+          <p:nvPr/>
+        </p:nvSpPr>
+        <p:spPr>
+          <a:xfrm>
+            <a:off x="11181999" y="6973332"/>
+            <a:ext cx="959201" cy="369332"/>
+          </a:xfrm>
+          <a:prstGeom prst="rect">
+            <a:avLst/>
+          </a:prstGeom>
+          <a:solidFill>
+            <a:srgbClr val="0F0F1A"/>
+          </a:solidFill>
+        </p:spPr>
+        <p:txBody>
+          <a:bodyPr wrap="square" rtlCol="0">
+            <a:spAutoFit/>
+          </a:bodyPr>
+          <a:lstStyle/>
+          <a:p>
+            <a:r>
+              <a:rPr lang="en-US" dirty="0">
+                <a:solidFill>
+                  <a:srgbClr val="FF8047"/>
+                </a:solidFill>
+              </a:rPr>
+              <a:t>#ff8047</a:t>
+            </a:r>
+          </a:p>
+        </p:txBody>
+      </p:sp>
+    </p:spTree>
+    <p:extLst>
+      <p:ext uri="{BB962C8B-B14F-4D97-AF65-F5344CB8AC3E}">
+        <p14:creationId xmlns:p14="http://schemas.microsoft.com/office/powerpoint/2010/main" val="462892233"/>
+      </p:ext>
+    </p:extLst>
+  </p:cSld>
+  <p:clrMapOvr>
+    <a:masterClrMapping/>
+  </p:clrMapOvr>
+</p:sld>
+</file>
+
+<file path=ppt/slides/slide9.xml><?xml version="1.0" encoding="utf-8"?>
+<p:sld xmlns:a="http://schemas.openxmlformats.org/drawingml/2006/main" xmlns:r="http://schemas.openxmlformats.org/officeDocument/2006/relationships" xmlns:p="http://schemas.openxmlformats.org/presentationml/2006/main">
+  <p:cSld>
+    <p:bg>
+      <p:bgPr>
+        <a:solidFill>
+          <a:srgbClr val="0F0F1A"/>
+        </a:solidFill>
+        <a:effectLst/>
+      </p:bgPr>
+    </p:bg>
+    <p:spTree>
+      <p:nvGrpSpPr>
+        <p:cNvPr id="1" name=""/>
+        <p:cNvGrpSpPr/>
+        <p:nvPr/>
+      </p:nvGrpSpPr>
+      <p:grpSpPr>
+        <a:xfrm>
+          <a:off x="0" y="0"/>
+          <a:ext cx="0" cy="0"/>
+          <a:chOff x="0" y="0"/>
+          <a:chExt cx="0" cy="0"/>
+        </a:xfrm>
+      </p:grpSpPr>
+      <p:sp>
+        <p:nvSpPr>
+          <p:cNvPr id="2" name="Title 1">
+            <a:extLst>
+              <a:ext uri="{FF2B5EF4-FFF2-40B4-BE49-F238E27FC236}">
+                <a16:creationId xmlns:a16="http://schemas.microsoft.com/office/drawing/2014/main" id="{EECEBA9E-9071-4ACD-AB60-D6FD8EE87D00}"/>
+              </a:ext>
+            </a:extLst>
+          </p:cNvPr>
+          <p:cNvSpPr>
+            <a:spLocks noGrp="1"/>
+          </p:cNvSpPr>
+          <p:nvPr>
+            <p:ph type="title"/>
+          </p:nvPr>
+        </p:nvSpPr>
+        <p:spPr>
+          <a:xfrm>
+            <a:off x="903180" y="305443"/>
+            <a:ext cx="3688921" cy="1325563"/>
+          </a:xfrm>
+        </p:spPr>
+        <p:txBody>
+          <a:bodyPr anchor="b">
+            <a:normAutofit/>
           </a:bodyPr>
           <a:lstStyle/>
           <a:p>
@@ -10815,76 +10984,6 @@
     <p:extLst>
       <p:ext uri="{BB962C8B-B14F-4D97-AF65-F5344CB8AC3E}">
         <p14:creationId xmlns:p14="http://schemas.microsoft.com/office/powerpoint/2010/main" val="2413240575"/>
-      </p:ext>
-    </p:extLst>
-  </p:cSld>
-  <p:clrMapOvr>
-    <a:masterClrMapping/>
-  </p:clrMapOvr>
-</p:sld>
-</file>
-
-<file path=ppt/slides/slide9.xml><?xml version="1.0" encoding="utf-8"?>
-<p:sld xmlns:a="http://schemas.openxmlformats.org/drawingml/2006/main" xmlns:r="http://schemas.openxmlformats.org/officeDocument/2006/relationships" xmlns:p="http://schemas.openxmlformats.org/presentationml/2006/main">
-  <p:cSld>
-    <p:bg>
-      <p:bgPr>
-        <a:solidFill>
-          <a:srgbClr val="DF9E63"/>
-        </a:solidFill>
-        <a:effectLst/>
-      </p:bgPr>
-    </p:bg>
-    <p:spTree>
-      <p:nvGrpSpPr>
-        <p:cNvPr id="1" name=""/>
-        <p:cNvGrpSpPr/>
-        <p:nvPr/>
-      </p:nvGrpSpPr>
-      <p:grpSpPr>
-        <a:xfrm>
-          <a:off x="0" y="0"/>
-          <a:ext cx="0" cy="0"/>
-          <a:chOff x="0" y="0"/>
-          <a:chExt cx="0" cy="0"/>
-        </a:xfrm>
-      </p:grpSpPr>
-      <p:sp>
-        <p:nvSpPr>
-          <p:cNvPr id="2" name="Title 1">
-            <a:extLst>
-              <a:ext uri="{FF2B5EF4-FFF2-40B4-BE49-F238E27FC236}">
-                <a16:creationId xmlns:a16="http://schemas.microsoft.com/office/drawing/2014/main" id="{9AAAD01F-5244-4614-B534-B6D1F6DE6283}"/>
-              </a:ext>
-            </a:extLst>
-          </p:cNvPr>
-          <p:cNvSpPr>
-            <a:spLocks noGrp="1"/>
-          </p:cNvSpPr>
-          <p:nvPr>
-            <p:ph type="ctrTitle"/>
-          </p:nvPr>
-        </p:nvSpPr>
-        <p:spPr/>
-        <p:txBody>
-          <a:bodyPr/>
-          <a:lstStyle/>
-          <a:p>
-            <a:r>
-              <a:rPr lang="en-US" dirty="0">
-                <a:solidFill>
-                  <a:srgbClr val="FFEAC9"/>
-                </a:solidFill>
-              </a:rPr>
-              <a:t>kvaish</a:t>
-            </a:r>
-          </a:p>
-        </p:txBody>
-      </p:sp>
-    </p:spTree>
-    <p:extLst>
-      <p:ext uri="{BB962C8B-B14F-4D97-AF65-F5344CB8AC3E}">
-        <p14:creationId xmlns:p14="http://schemas.microsoft.com/office/powerpoint/2010/main" val="521107553"/>
       </p:ext>
     </p:extLst>
   </p:cSld>

</xml_diff>

<commit_message>
most content in potfolio
</commit_message>
<xml_diff>
--- a/mood.pptx
+++ b/mood.pptx
@@ -5052,6 +5052,124 @@
           </a:prstGeom>
         </p:spPr>
       </p:pic>
+      <p:pic>
+        <p:nvPicPr>
+          <p:cNvPr id="5" name="Picture 4">
+            <a:extLst>
+              <a:ext uri="{FF2B5EF4-FFF2-40B4-BE49-F238E27FC236}">
+                <a16:creationId xmlns:a16="http://schemas.microsoft.com/office/drawing/2014/main" id="{371F1485-9CAF-6145-903C-DE6D8BD79C58}"/>
+              </a:ext>
+            </a:extLst>
+          </p:cNvPr>
+          <p:cNvPicPr>
+            <a:picLocks noChangeAspect="1"/>
+          </p:cNvPicPr>
+          <p:nvPr/>
+        </p:nvPicPr>
+        <p:blipFill>
+          <a:blip r:embed="rId4"/>
+          <a:stretch>
+            <a:fillRect/>
+          </a:stretch>
+        </p:blipFill>
+        <p:spPr>
+          <a:xfrm>
+            <a:off x="402199" y="1011017"/>
+            <a:ext cx="1205778" cy="381685"/>
+          </a:xfrm>
+          <a:prstGeom prst="rect">
+            <a:avLst/>
+          </a:prstGeom>
+        </p:spPr>
+      </p:pic>
+      <p:pic>
+        <p:nvPicPr>
+          <p:cNvPr id="6" name="Picture 5">
+            <a:extLst>
+              <a:ext uri="{FF2B5EF4-FFF2-40B4-BE49-F238E27FC236}">
+                <a16:creationId xmlns:a16="http://schemas.microsoft.com/office/drawing/2014/main" id="{77F2E6E9-72D0-6946-8CEB-AEEB738B9D95}"/>
+              </a:ext>
+            </a:extLst>
+          </p:cNvPr>
+          <p:cNvPicPr>
+            <a:picLocks noChangeAspect="1"/>
+          </p:cNvPicPr>
+          <p:nvPr/>
+        </p:nvPicPr>
+        <p:blipFill rotWithShape="1">
+          <a:blip r:embed="rId5"/>
+          <a:srcRect l="6174" t="23077"/>
+          <a:stretch/>
+        </p:blipFill>
+        <p:spPr>
+          <a:xfrm>
+            <a:off x="432758" y="1392702"/>
+            <a:ext cx="1301828" cy="381685"/>
+          </a:xfrm>
+          <a:prstGeom prst="rect">
+            <a:avLst/>
+          </a:prstGeom>
+        </p:spPr>
+      </p:pic>
+      <p:pic>
+        <p:nvPicPr>
+          <p:cNvPr id="7" name="Picture 6">
+            <a:extLst>
+              <a:ext uri="{FF2B5EF4-FFF2-40B4-BE49-F238E27FC236}">
+                <a16:creationId xmlns:a16="http://schemas.microsoft.com/office/drawing/2014/main" id="{DAF88008-FA90-7441-BCCB-CD025BA84EFE}"/>
+              </a:ext>
+            </a:extLst>
+          </p:cNvPr>
+          <p:cNvPicPr>
+            <a:picLocks noChangeAspect="1"/>
+          </p:cNvPicPr>
+          <p:nvPr/>
+        </p:nvPicPr>
+        <p:blipFill rotWithShape="1">
+          <a:blip r:embed="rId6"/>
+          <a:srcRect l="3474" r="-1"/>
+          <a:stretch/>
+        </p:blipFill>
+        <p:spPr>
+          <a:xfrm>
+            <a:off x="402199" y="1731820"/>
+            <a:ext cx="1033386" cy="381685"/>
+          </a:xfrm>
+          <a:prstGeom prst="rect">
+            <a:avLst/>
+          </a:prstGeom>
+        </p:spPr>
+      </p:pic>
+      <p:pic>
+        <p:nvPicPr>
+          <p:cNvPr id="8" name="Picture 7">
+            <a:extLst>
+              <a:ext uri="{FF2B5EF4-FFF2-40B4-BE49-F238E27FC236}">
+                <a16:creationId xmlns:a16="http://schemas.microsoft.com/office/drawing/2014/main" id="{6B65748A-BE3D-044B-AAE1-3AF8A7ACD88E}"/>
+              </a:ext>
+            </a:extLst>
+          </p:cNvPr>
+          <p:cNvPicPr>
+            <a:picLocks noChangeAspect="1"/>
+          </p:cNvPicPr>
+          <p:nvPr/>
+        </p:nvPicPr>
+        <p:blipFill>
+          <a:blip r:embed="rId7"/>
+          <a:stretch>
+            <a:fillRect/>
+          </a:stretch>
+        </p:blipFill>
+        <p:spPr>
+          <a:xfrm>
+            <a:off x="439621" y="2071301"/>
+            <a:ext cx="986463" cy="381322"/>
+          </a:xfrm>
+          <a:prstGeom prst="rect">
+            <a:avLst/>
+          </a:prstGeom>
+        </p:spPr>
+      </p:pic>
     </p:spTree>
     <p:extLst>
       <p:ext uri="{BB962C8B-B14F-4D97-AF65-F5344CB8AC3E}">

</xml_diff>

<commit_message>
updated all pages 2022.04.17 (hover over gallery, carousel on index, no more resume, added acting)
</commit_message>
<xml_diff>
--- a/mood.pptx
+++ b/mood.pptx
@@ -21,14 +21,16 @@
     <p:sldId id="267" r:id="rId15"/>
     <p:sldId id="268" r:id="rId16"/>
     <p:sldId id="266" r:id="rId17"/>
-    <p:sldId id="257" r:id="rId18"/>
-    <p:sldId id="258" r:id="rId19"/>
-    <p:sldId id="259" r:id="rId20"/>
-    <p:sldId id="260" r:id="rId21"/>
-    <p:sldId id="261" r:id="rId22"/>
-    <p:sldId id="262" r:id="rId23"/>
-    <p:sldId id="263" r:id="rId24"/>
-    <p:sldId id="264" r:id="rId25"/>
+    <p:sldId id="281" r:id="rId18"/>
+    <p:sldId id="282" r:id="rId19"/>
+    <p:sldId id="257" r:id="rId20"/>
+    <p:sldId id="258" r:id="rId21"/>
+    <p:sldId id="259" r:id="rId22"/>
+    <p:sldId id="260" r:id="rId23"/>
+    <p:sldId id="261" r:id="rId24"/>
+    <p:sldId id="262" r:id="rId25"/>
+    <p:sldId id="263" r:id="rId26"/>
+    <p:sldId id="264" r:id="rId27"/>
   </p:sldIdLst>
   <p:sldSz cx="12192000" cy="6858000"/>
   <p:notesSz cx="6858000" cy="9144000"/>
@@ -282,7 +284,7 @@
           <a:p>
             <a:fld id="{2C937129-3323-4A0E-946D-8D61D760E2BF}" type="datetimeFigureOut">
               <a:rPr lang="en-US" smtClean="0"/>
-              <a:t>5/16/20</a:t>
+              <a:t>4/16/22</a:t>
             </a:fld>
             <a:endParaRPr lang="en-US"/>
           </a:p>
@@ -480,7 +482,7 @@
           <a:p>
             <a:fld id="{2C937129-3323-4A0E-946D-8D61D760E2BF}" type="datetimeFigureOut">
               <a:rPr lang="en-US" smtClean="0"/>
-              <a:t>5/16/20</a:t>
+              <a:t>4/16/22</a:t>
             </a:fld>
             <a:endParaRPr lang="en-US"/>
           </a:p>
@@ -688,7 +690,7 @@
           <a:p>
             <a:fld id="{2C937129-3323-4A0E-946D-8D61D760E2BF}" type="datetimeFigureOut">
               <a:rPr lang="en-US" smtClean="0"/>
-              <a:t>5/16/20</a:t>
+              <a:t>4/16/22</a:t>
             </a:fld>
             <a:endParaRPr lang="en-US"/>
           </a:p>
@@ -886,7 +888,7 @@
           <a:p>
             <a:fld id="{2C937129-3323-4A0E-946D-8D61D760E2BF}" type="datetimeFigureOut">
               <a:rPr lang="en-US" smtClean="0"/>
-              <a:t>5/16/20</a:t>
+              <a:t>4/16/22</a:t>
             </a:fld>
             <a:endParaRPr lang="en-US"/>
           </a:p>
@@ -1161,7 +1163,7 @@
           <a:p>
             <a:fld id="{2C937129-3323-4A0E-946D-8D61D760E2BF}" type="datetimeFigureOut">
               <a:rPr lang="en-US" smtClean="0"/>
-              <a:t>5/16/20</a:t>
+              <a:t>4/16/22</a:t>
             </a:fld>
             <a:endParaRPr lang="en-US"/>
           </a:p>
@@ -1426,7 +1428,7 @@
           <a:p>
             <a:fld id="{2C937129-3323-4A0E-946D-8D61D760E2BF}" type="datetimeFigureOut">
               <a:rPr lang="en-US" smtClean="0"/>
-              <a:t>5/16/20</a:t>
+              <a:t>4/16/22</a:t>
             </a:fld>
             <a:endParaRPr lang="en-US"/>
           </a:p>
@@ -1838,7 +1840,7 @@
           <a:p>
             <a:fld id="{2C937129-3323-4A0E-946D-8D61D760E2BF}" type="datetimeFigureOut">
               <a:rPr lang="en-US" smtClean="0"/>
-              <a:t>5/16/20</a:t>
+              <a:t>4/16/22</a:t>
             </a:fld>
             <a:endParaRPr lang="en-US"/>
           </a:p>
@@ -1979,7 +1981,7 @@
           <a:p>
             <a:fld id="{2C937129-3323-4A0E-946D-8D61D760E2BF}" type="datetimeFigureOut">
               <a:rPr lang="en-US" smtClean="0"/>
-              <a:t>5/16/20</a:t>
+              <a:t>4/16/22</a:t>
             </a:fld>
             <a:endParaRPr lang="en-US"/>
           </a:p>
@@ -2092,7 +2094,7 @@
           <a:p>
             <a:fld id="{2C937129-3323-4A0E-946D-8D61D760E2BF}" type="datetimeFigureOut">
               <a:rPr lang="en-US" smtClean="0"/>
-              <a:t>5/16/20</a:t>
+              <a:t>4/16/22</a:t>
             </a:fld>
             <a:endParaRPr lang="en-US"/>
           </a:p>
@@ -2403,7 +2405,7 @@
           <a:p>
             <a:fld id="{2C937129-3323-4A0E-946D-8D61D760E2BF}" type="datetimeFigureOut">
               <a:rPr lang="en-US" smtClean="0"/>
-              <a:t>5/16/20</a:t>
+              <a:t>4/16/22</a:t>
             </a:fld>
             <a:endParaRPr lang="en-US"/>
           </a:p>
@@ -2691,7 +2693,7 @@
           <a:p>
             <a:fld id="{2C937129-3323-4A0E-946D-8D61D760E2BF}" type="datetimeFigureOut">
               <a:rPr lang="en-US" smtClean="0"/>
-              <a:t>5/16/20</a:t>
+              <a:t>4/16/22</a:t>
             </a:fld>
             <a:endParaRPr lang="en-US"/>
           </a:p>
@@ -2932,7 +2934,7 @@
           <a:p>
             <a:fld id="{2C937129-3323-4A0E-946D-8D61D760E2BF}" type="datetimeFigureOut">
               <a:rPr lang="en-US" smtClean="0"/>
-              <a:t>5/16/20</a:t>
+              <a:t>4/16/22</a:t>
             </a:fld>
             <a:endParaRPr lang="en-US"/>
           </a:p>
@@ -4216,7 +4218,7 @@
         </p:spPr>
         <p:txBody>
           <a:bodyPr anchor="b">
-            <a:normAutofit/>
+            <a:normAutofit fontScale="90000"/>
           </a:bodyPr>
           <a:lstStyle/>
           <a:p>
@@ -4955,7 +4957,7 @@
         </p:spPr>
         <p:txBody>
           <a:bodyPr anchor="b">
-            <a:normAutofit/>
+            <a:normAutofit fontScale="90000"/>
           </a:bodyPr>
           <a:lstStyle/>
           <a:p>
@@ -5634,7 +5636,7 @@
         </p:spPr>
         <p:txBody>
           <a:bodyPr anchor="b">
-            <a:normAutofit/>
+            <a:normAutofit fontScale="90000"/>
           </a:bodyPr>
           <a:lstStyle/>
           <a:p>
@@ -6288,14 +6290,20 @@
           <a:lstStyle/>
           <a:p>
             <a:r>
-              <a:rPr lang="en-US" sz="8000" dirty="0">
+              <a:rPr lang="en-US" sz="8000" dirty="0" err="1">
                 <a:solidFill>
                   <a:srgbClr val="FBC5A2"/>
                 </a:solidFill>
                 <a:latin typeface="Run Wild - Demo" pitchFamily="2" charset="0"/>
               </a:rPr>
-              <a:t>kv	aish</a:t>
+              <a:t>kvaish</a:t>
             </a:r>
+            <a:endParaRPr lang="en-US" sz="8000" dirty="0">
+              <a:solidFill>
+                <a:srgbClr val="FBC5A2"/>
+              </a:solidFill>
+              <a:latin typeface="Run Wild - Demo" pitchFamily="2" charset="0"/>
+            </a:endParaRPr>
           </a:p>
         </p:txBody>
       </p:sp>
@@ -9869,7 +9877,7 @@
     <p:bg>
       <p:bgPr>
         <a:solidFill>
-          <a:srgbClr val="DF9E63"/>
+          <a:srgbClr val="0F0F1A"/>
         </a:solidFill>
         <a:effectLst/>
       </p:bgPr>
@@ -9893,7 +9901,7 @@
           <p:cNvPr id="2" name="Title 1">
             <a:extLst>
               <a:ext uri="{FF2B5EF4-FFF2-40B4-BE49-F238E27FC236}">
-                <a16:creationId xmlns:a16="http://schemas.microsoft.com/office/drawing/2014/main" id="{9AAAD01F-5244-4614-B534-B6D1F6DE6283}"/>
+                <a16:creationId xmlns:a16="http://schemas.microsoft.com/office/drawing/2014/main" id="{EECEBA9E-9071-4ACD-AB60-D6FD8EE87D00}"/>
               </a:ext>
             </a:extLst>
           </p:cNvPr>
@@ -9901,29 +9909,242 @@
             <a:spLocks noGrp="1"/>
           </p:cNvSpPr>
           <p:nvPr>
-            <p:ph type="ctrTitle"/>
+            <p:ph type="title"/>
           </p:nvPr>
         </p:nvSpPr>
-        <p:spPr/>
-        <p:txBody>
-          <a:bodyPr/>
+        <p:spPr>
+          <a:xfrm>
+            <a:off x="903180" y="305444"/>
+            <a:ext cx="10554362" cy="1358104"/>
+          </a:xfrm>
+        </p:spPr>
+        <p:txBody>
+          <a:bodyPr anchor="b">
+            <a:normAutofit/>
+          </a:bodyPr>
+          <a:lstStyle/>
+          <a:p>
+            <a:r>
+              <a:rPr lang="en-US" sz="8000" dirty="0">
+                <a:solidFill>
+                  <a:srgbClr val="FBC5A2"/>
+                </a:solidFill>
+                <a:latin typeface="Run Wild - Demo" pitchFamily="2" charset="0"/>
+              </a:rPr>
+              <a:t>kanika  asavari  vaish</a:t>
+            </a:r>
+          </a:p>
+        </p:txBody>
+      </p:sp>
+      <p:sp>
+        <p:nvSpPr>
+          <p:cNvPr id="6" name="Rectangle 5">
+            <a:extLst>
+              <a:ext uri="{FF2B5EF4-FFF2-40B4-BE49-F238E27FC236}">
+                <a16:creationId xmlns:a16="http://schemas.microsoft.com/office/drawing/2014/main" id="{EA6ABC74-7487-4FB9-B52F-59DC2ED0294C}"/>
+              </a:ext>
+            </a:extLst>
+          </p:cNvPr>
+          <p:cNvSpPr/>
+          <p:nvPr/>
+        </p:nvSpPr>
+        <p:spPr>
+          <a:xfrm>
+            <a:off x="1032436" y="1279038"/>
+            <a:ext cx="9052560" cy="56098"/>
+          </a:xfrm>
+          <a:prstGeom prst="rect">
+            <a:avLst/>
+          </a:prstGeom>
+          <a:solidFill>
+            <a:srgbClr val="FF8047"/>
+          </a:solidFill>
+          <a:ln>
+            <a:noFill/>
+          </a:ln>
+        </p:spPr>
+        <p:style>
+          <a:lnRef idx="2">
+            <a:schemeClr val="accent1">
+              <a:shade val="50000"/>
+            </a:schemeClr>
+          </a:lnRef>
+          <a:fillRef idx="1">
+            <a:schemeClr val="accent1"/>
+          </a:fillRef>
+          <a:effectRef idx="0">
+            <a:schemeClr val="accent1"/>
+          </a:effectRef>
+          <a:fontRef idx="minor">
+            <a:schemeClr val="lt1"/>
+          </a:fontRef>
+        </p:style>
+        <p:txBody>
+          <a:bodyPr rtlCol="0" anchor="ctr"/>
+          <a:lstStyle/>
+          <a:p>
+            <a:pPr algn="ctr"/>
+            <a:endParaRPr lang="en-US"/>
+          </a:p>
+        </p:txBody>
+      </p:sp>
+      <p:sp>
+        <p:nvSpPr>
+          <p:cNvPr id="13" name="TextBox 12">
+            <a:extLst>
+              <a:ext uri="{FF2B5EF4-FFF2-40B4-BE49-F238E27FC236}">
+                <a16:creationId xmlns:a16="http://schemas.microsoft.com/office/drawing/2014/main" id="{2F9BC14B-E033-42B2-8F47-7F1E18B4BEB1}"/>
+              </a:ext>
+            </a:extLst>
+          </p:cNvPr>
+          <p:cNvSpPr txBox="1"/>
+          <p:nvPr/>
+        </p:nvSpPr>
+        <p:spPr>
+          <a:xfrm>
+            <a:off x="11007627" y="6396427"/>
+            <a:ext cx="898623" cy="369332"/>
+          </a:xfrm>
+          <a:prstGeom prst="rect">
+            <a:avLst/>
+          </a:prstGeom>
+          <a:solidFill>
+            <a:srgbClr val="0F0F1A"/>
+          </a:solidFill>
+        </p:spPr>
+        <p:txBody>
+          <a:bodyPr wrap="square" rtlCol="0">
+            <a:spAutoFit/>
+          </a:bodyPr>
           <a:lstStyle/>
           <a:p>
             <a:r>
               <a:rPr lang="en-US" dirty="0">
                 <a:solidFill>
-                  <a:srgbClr val="FFEAC9"/>
+                  <a:schemeClr val="bg1"/>
                 </a:solidFill>
               </a:rPr>
-              <a:t>kvaish</a:t>
+              <a:t>#0f0f1a</a:t>
             </a:r>
           </a:p>
         </p:txBody>
       </p:sp>
+      <p:sp>
+        <p:nvSpPr>
+          <p:cNvPr id="14" name="TextBox 13">
+            <a:extLst>
+              <a:ext uri="{FF2B5EF4-FFF2-40B4-BE49-F238E27FC236}">
+                <a16:creationId xmlns:a16="http://schemas.microsoft.com/office/drawing/2014/main" id="{69C887E6-F1BC-4248-BDAF-AB12E16A55E6}"/>
+              </a:ext>
+            </a:extLst>
+          </p:cNvPr>
+          <p:cNvSpPr txBox="1"/>
+          <p:nvPr/>
+        </p:nvSpPr>
+        <p:spPr>
+          <a:xfrm>
+            <a:off x="9886211" y="6973332"/>
+            <a:ext cx="1022701" cy="369332"/>
+          </a:xfrm>
+          <a:prstGeom prst="rect">
+            <a:avLst/>
+          </a:prstGeom>
+          <a:solidFill>
+            <a:srgbClr val="0F0F1A"/>
+          </a:solidFill>
+        </p:spPr>
+        <p:txBody>
+          <a:bodyPr wrap="square" rtlCol="0">
+            <a:spAutoFit/>
+          </a:bodyPr>
+          <a:lstStyle/>
+          <a:p>
+            <a:r>
+              <a:rPr lang="en-US" dirty="0">
+                <a:solidFill>
+                  <a:srgbClr val="FBC5A2"/>
+                </a:solidFill>
+              </a:rPr>
+              <a:t>#fbc5a2</a:t>
+            </a:r>
+          </a:p>
+        </p:txBody>
+      </p:sp>
+      <p:sp>
+        <p:nvSpPr>
+          <p:cNvPr id="15" name="TextBox 14">
+            <a:extLst>
+              <a:ext uri="{FF2B5EF4-FFF2-40B4-BE49-F238E27FC236}">
+                <a16:creationId xmlns:a16="http://schemas.microsoft.com/office/drawing/2014/main" id="{2FEA50A1-1069-4196-A347-287903D3DF43}"/>
+              </a:ext>
+            </a:extLst>
+          </p:cNvPr>
+          <p:cNvSpPr txBox="1"/>
+          <p:nvPr/>
+        </p:nvSpPr>
+        <p:spPr>
+          <a:xfrm>
+            <a:off x="11181999" y="6973332"/>
+            <a:ext cx="959201" cy="369332"/>
+          </a:xfrm>
+          <a:prstGeom prst="rect">
+            <a:avLst/>
+          </a:prstGeom>
+          <a:solidFill>
+            <a:srgbClr val="0F0F1A"/>
+          </a:solidFill>
+        </p:spPr>
+        <p:txBody>
+          <a:bodyPr wrap="square" rtlCol="0">
+            <a:spAutoFit/>
+          </a:bodyPr>
+          <a:lstStyle/>
+          <a:p>
+            <a:r>
+              <a:rPr lang="en-US" dirty="0">
+                <a:solidFill>
+                  <a:srgbClr val="FF8047"/>
+                </a:solidFill>
+              </a:rPr>
+              <a:t>#ff8047</a:t>
+            </a:r>
+          </a:p>
+        </p:txBody>
+      </p:sp>
+      <p:pic>
+        <p:nvPicPr>
+          <p:cNvPr id="17" name="Picture 16">
+            <a:extLst>
+              <a:ext uri="{FF2B5EF4-FFF2-40B4-BE49-F238E27FC236}">
+                <a16:creationId xmlns:a16="http://schemas.microsoft.com/office/drawing/2014/main" id="{E5E09AAA-EABB-E346-B66D-2763AE5F6009}"/>
+              </a:ext>
+            </a:extLst>
+          </p:cNvPr>
+          <p:cNvPicPr>
+            <a:picLocks noChangeAspect="1"/>
+          </p:cNvPicPr>
+          <p:nvPr/>
+        </p:nvPicPr>
+        <p:blipFill>
+          <a:blip r:embed="rId2"/>
+          <a:stretch>
+            <a:fillRect/>
+          </a:stretch>
+        </p:blipFill>
+        <p:spPr>
+          <a:xfrm>
+            <a:off x="10590320" y="92241"/>
+            <a:ext cx="978672" cy="1459111"/>
+          </a:xfrm>
+          <a:prstGeom prst="rect">
+            <a:avLst/>
+          </a:prstGeom>
+        </p:spPr>
+      </p:pic>
     </p:spTree>
     <p:extLst>
       <p:ext uri="{BB962C8B-B14F-4D97-AF65-F5344CB8AC3E}">
-        <p14:creationId xmlns:p14="http://schemas.microsoft.com/office/powerpoint/2010/main" val="521107553"/>
+        <p14:creationId xmlns:p14="http://schemas.microsoft.com/office/powerpoint/2010/main" val="3888703825"/>
       </p:ext>
     </p:extLst>
   </p:cSld>
@@ -9939,7 +10160,7 @@
     <p:bg>
       <p:bgPr>
         <a:solidFill>
-          <a:srgbClr val="DF9E63"/>
+          <a:srgbClr val="0F0F1A"/>
         </a:solidFill>
         <a:effectLst/>
       </p:bgPr>
@@ -9958,50 +10179,12 @@
           <a:chExt cx="0" cy="0"/>
         </a:xfrm>
       </p:grpSpPr>
-      <p:sp>
-        <p:nvSpPr>
-          <p:cNvPr id="2" name="Title 1">
-            <a:extLst>
-              <a:ext uri="{FF2B5EF4-FFF2-40B4-BE49-F238E27FC236}">
-                <a16:creationId xmlns:a16="http://schemas.microsoft.com/office/drawing/2014/main" id="{9AAAD01F-5244-4614-B534-B6D1F6DE6283}"/>
-              </a:ext>
-            </a:extLst>
-          </p:cNvPr>
-          <p:cNvSpPr>
-            <a:spLocks noGrp="1"/>
-          </p:cNvSpPr>
-          <p:nvPr>
-            <p:ph type="ctrTitle"/>
-          </p:nvPr>
-        </p:nvSpPr>
-        <p:spPr>
-          <a:xfrm>
-            <a:off x="340659" y="1062599"/>
-            <a:ext cx="2569882" cy="1220413"/>
-          </a:xfrm>
-        </p:spPr>
-        <p:txBody>
-          <a:bodyPr anchor="ctr"/>
-          <a:lstStyle/>
-          <a:p>
-            <a:r>
-              <a:rPr lang="en-US" b="1" dirty="0">
-                <a:solidFill>
-                  <a:srgbClr val="FFEAC9"/>
-                </a:solidFill>
-                <a:latin typeface="AR BONNIE" panose="02000000000000000000" pitchFamily="2" charset="0"/>
-              </a:rPr>
-              <a:t>kvaish</a:t>
-            </a:r>
-          </a:p>
-        </p:txBody>
-      </p:sp>
       <p:pic>
         <p:nvPicPr>
-          <p:cNvPr id="3" name="Picture 2">
-            <a:extLst>
-              <a:ext uri="{FF2B5EF4-FFF2-40B4-BE49-F238E27FC236}">
-                <a16:creationId xmlns:a16="http://schemas.microsoft.com/office/drawing/2014/main" id="{B3553EDE-3EDF-4BBE-B0E5-576B7E1FB88C}"/>
+          <p:cNvPr id="5" name="Picture 4">
+            <a:extLst>
+              <a:ext uri="{FF2B5EF4-FFF2-40B4-BE49-F238E27FC236}">
+                <a16:creationId xmlns:a16="http://schemas.microsoft.com/office/drawing/2014/main" id="{2E8C4712-C2EC-904D-A07A-B836669EDA32}"/>
               </a:ext>
             </a:extLst>
           </p:cNvPr>
@@ -10018,8 +10201,218 @@
         </p:blipFill>
         <p:spPr>
           <a:xfrm>
-            <a:off x="-167341" y="3089836"/>
-            <a:ext cx="12460941" cy="3881718"/>
+            <a:off x="165253" y="178435"/>
+            <a:ext cx="2985571" cy="415751"/>
+          </a:xfrm>
+          <a:prstGeom prst="rect">
+            <a:avLst/>
+          </a:prstGeom>
+        </p:spPr>
+      </p:pic>
+      <p:pic>
+        <p:nvPicPr>
+          <p:cNvPr id="9" name="Picture 8">
+            <a:extLst>
+              <a:ext uri="{FF2B5EF4-FFF2-40B4-BE49-F238E27FC236}">
+                <a16:creationId xmlns:a16="http://schemas.microsoft.com/office/drawing/2014/main" id="{D4FA012E-BDFF-3643-B944-B3C1704175EB}"/>
+              </a:ext>
+            </a:extLst>
+          </p:cNvPr>
+          <p:cNvPicPr>
+            <a:picLocks noChangeAspect="1"/>
+          </p:cNvPicPr>
+          <p:nvPr/>
+        </p:nvPicPr>
+        <p:blipFill>
+          <a:blip r:embed="rId3"/>
+          <a:stretch>
+            <a:fillRect/>
+          </a:stretch>
+        </p:blipFill>
+        <p:spPr>
+          <a:xfrm>
+            <a:off x="4454188" y="183603"/>
+            <a:ext cx="903468" cy="394618"/>
+          </a:xfrm>
+          <a:prstGeom prst="rect">
+            <a:avLst/>
+          </a:prstGeom>
+        </p:spPr>
+      </p:pic>
+      <p:pic>
+        <p:nvPicPr>
+          <p:cNvPr id="10" name="Picture 9">
+            <a:extLst>
+              <a:ext uri="{FF2B5EF4-FFF2-40B4-BE49-F238E27FC236}">
+                <a16:creationId xmlns:a16="http://schemas.microsoft.com/office/drawing/2014/main" id="{BC6E0CC8-E829-7D4A-99EF-87B70C81E1A2}"/>
+              </a:ext>
+            </a:extLst>
+          </p:cNvPr>
+          <p:cNvPicPr>
+            <a:picLocks noChangeAspect="1"/>
+          </p:cNvPicPr>
+          <p:nvPr/>
+        </p:nvPicPr>
+        <p:blipFill>
+          <a:blip r:embed="rId4"/>
+          <a:stretch>
+            <a:fillRect/>
+          </a:stretch>
+        </p:blipFill>
+        <p:spPr>
+          <a:xfrm>
+            <a:off x="5544496" y="195631"/>
+            <a:ext cx="903468" cy="394618"/>
+          </a:xfrm>
+          <a:prstGeom prst="rect">
+            <a:avLst/>
+          </a:prstGeom>
+        </p:spPr>
+      </p:pic>
+      <p:pic>
+        <p:nvPicPr>
+          <p:cNvPr id="11" name="Picture 10">
+            <a:extLst>
+              <a:ext uri="{FF2B5EF4-FFF2-40B4-BE49-F238E27FC236}">
+                <a16:creationId xmlns:a16="http://schemas.microsoft.com/office/drawing/2014/main" id="{4EBAF1D1-69A4-824B-8E2A-02E5A51FF8FC}"/>
+              </a:ext>
+            </a:extLst>
+          </p:cNvPr>
+          <p:cNvPicPr>
+            <a:picLocks noChangeAspect="1"/>
+          </p:cNvPicPr>
+          <p:nvPr/>
+        </p:nvPicPr>
+        <p:blipFill>
+          <a:blip r:embed="rId5"/>
+          <a:stretch>
+            <a:fillRect/>
+          </a:stretch>
+        </p:blipFill>
+        <p:spPr>
+          <a:xfrm>
+            <a:off x="6584233" y="148736"/>
+            <a:ext cx="1153086" cy="431154"/>
+          </a:xfrm>
+          <a:prstGeom prst="rect">
+            <a:avLst/>
+          </a:prstGeom>
+        </p:spPr>
+      </p:pic>
+      <p:pic>
+        <p:nvPicPr>
+          <p:cNvPr id="12" name="Picture 11">
+            <a:extLst>
+              <a:ext uri="{FF2B5EF4-FFF2-40B4-BE49-F238E27FC236}">
+                <a16:creationId xmlns:a16="http://schemas.microsoft.com/office/drawing/2014/main" id="{16754CC0-AB0C-7E49-98D1-E19D1B2B6499}"/>
+              </a:ext>
+            </a:extLst>
+          </p:cNvPr>
+          <p:cNvPicPr>
+            <a:picLocks noChangeAspect="1"/>
+          </p:cNvPicPr>
+          <p:nvPr/>
+        </p:nvPicPr>
+        <p:blipFill>
+          <a:blip r:embed="rId6"/>
+          <a:stretch>
+            <a:fillRect/>
+          </a:stretch>
+        </p:blipFill>
+        <p:spPr>
+          <a:xfrm>
+            <a:off x="7737319" y="145652"/>
+            <a:ext cx="970086" cy="448534"/>
+          </a:xfrm>
+          <a:prstGeom prst="rect">
+            <a:avLst/>
+          </a:prstGeom>
+        </p:spPr>
+      </p:pic>
+      <p:pic>
+        <p:nvPicPr>
+          <p:cNvPr id="18" name="Picture 17">
+            <a:extLst>
+              <a:ext uri="{FF2B5EF4-FFF2-40B4-BE49-F238E27FC236}">
+                <a16:creationId xmlns:a16="http://schemas.microsoft.com/office/drawing/2014/main" id="{1F3E9459-A5E4-B249-8AB3-6DD6251B8BDB}"/>
+              </a:ext>
+            </a:extLst>
+          </p:cNvPr>
+          <p:cNvPicPr>
+            <a:picLocks noChangeAspect="1"/>
+          </p:cNvPicPr>
+          <p:nvPr/>
+        </p:nvPicPr>
+        <p:blipFill>
+          <a:blip r:embed="rId7"/>
+          <a:stretch>
+            <a:fillRect/>
+          </a:stretch>
+        </p:blipFill>
+        <p:spPr>
+          <a:xfrm>
+            <a:off x="8800825" y="203125"/>
+            <a:ext cx="1198817" cy="431154"/>
+          </a:xfrm>
+          <a:prstGeom prst="rect">
+            <a:avLst/>
+          </a:prstGeom>
+        </p:spPr>
+      </p:pic>
+      <p:pic>
+        <p:nvPicPr>
+          <p:cNvPr id="19" name="Picture 18">
+            <a:extLst>
+              <a:ext uri="{FF2B5EF4-FFF2-40B4-BE49-F238E27FC236}">
+                <a16:creationId xmlns:a16="http://schemas.microsoft.com/office/drawing/2014/main" id="{B41BC697-79DA-0D4F-842B-247CD1FE3ABE}"/>
+              </a:ext>
+            </a:extLst>
+          </p:cNvPr>
+          <p:cNvPicPr>
+            <a:picLocks noChangeAspect="1"/>
+          </p:cNvPicPr>
+          <p:nvPr/>
+        </p:nvPicPr>
+        <p:blipFill>
+          <a:blip r:embed="rId8"/>
+          <a:stretch>
+            <a:fillRect/>
+          </a:stretch>
+        </p:blipFill>
+        <p:spPr>
+          <a:xfrm>
+            <a:off x="10080960" y="174498"/>
+            <a:ext cx="788861" cy="415751"/>
+          </a:xfrm>
+          <a:prstGeom prst="rect">
+            <a:avLst/>
+          </a:prstGeom>
+        </p:spPr>
+      </p:pic>
+      <p:pic>
+        <p:nvPicPr>
+          <p:cNvPr id="20" name="Picture 19">
+            <a:extLst>
+              <a:ext uri="{FF2B5EF4-FFF2-40B4-BE49-F238E27FC236}">
+                <a16:creationId xmlns:a16="http://schemas.microsoft.com/office/drawing/2014/main" id="{1196AA5A-8629-7547-B5FC-6A57E51786B3}"/>
+              </a:ext>
+            </a:extLst>
+          </p:cNvPr>
+          <p:cNvPicPr>
+            <a:picLocks noChangeAspect="1"/>
+          </p:cNvPicPr>
+          <p:nvPr/>
+        </p:nvPicPr>
+        <p:blipFill>
+          <a:blip r:embed="rId9"/>
+          <a:stretch>
+            <a:fillRect/>
+          </a:stretch>
+        </p:blipFill>
+        <p:spPr>
+          <a:xfrm>
+            <a:off x="11056661" y="136398"/>
+            <a:ext cx="970086" cy="415751"/>
           </a:xfrm>
           <a:prstGeom prst="rect">
             <a:avLst/>
@@ -10029,7 +10422,7 @@
     </p:spTree>
     <p:extLst>
       <p:ext uri="{BB962C8B-B14F-4D97-AF65-F5344CB8AC3E}">
-        <p14:creationId xmlns:p14="http://schemas.microsoft.com/office/powerpoint/2010/main" val="2657985456"/>
+        <p14:creationId xmlns:p14="http://schemas.microsoft.com/office/powerpoint/2010/main" val="3631654026"/>
       </p:ext>
     </p:extLst>
   </p:cSld>
@@ -10080,62 +10473,26 @@
             <p:ph type="ctrTitle"/>
           </p:nvPr>
         </p:nvSpPr>
-        <p:spPr>
-          <a:xfrm>
-            <a:off x="340659" y="1062599"/>
-            <a:ext cx="2569882" cy="1220413"/>
-          </a:xfrm>
-        </p:spPr>
-        <p:txBody>
-          <a:bodyPr anchor="ctr"/>
+        <p:spPr/>
+        <p:txBody>
+          <a:bodyPr/>
           <a:lstStyle/>
           <a:p>
             <a:r>
-              <a:rPr lang="en-US" b="1" dirty="0">
+              <a:rPr lang="en-US" dirty="0">
                 <a:solidFill>
                   <a:srgbClr val="FFEAC9"/>
                 </a:solidFill>
-                <a:latin typeface="Century Gothic" panose="020B0502020202020204" pitchFamily="34" charset="0"/>
               </a:rPr>
               <a:t>kvaish</a:t>
             </a:r>
           </a:p>
         </p:txBody>
       </p:sp>
-      <p:pic>
-        <p:nvPicPr>
-          <p:cNvPr id="3" name="Picture 2">
-            <a:extLst>
-              <a:ext uri="{FF2B5EF4-FFF2-40B4-BE49-F238E27FC236}">
-                <a16:creationId xmlns:a16="http://schemas.microsoft.com/office/drawing/2014/main" id="{B3553EDE-3EDF-4BBE-B0E5-576B7E1FB88C}"/>
-              </a:ext>
-            </a:extLst>
-          </p:cNvPr>
-          <p:cNvPicPr>
-            <a:picLocks noChangeAspect="1"/>
-          </p:cNvPicPr>
-          <p:nvPr/>
-        </p:nvPicPr>
-        <p:blipFill>
-          <a:blip r:embed="rId2"/>
-          <a:stretch>
-            <a:fillRect/>
-          </a:stretch>
-        </p:blipFill>
-        <p:spPr>
-          <a:xfrm>
-            <a:off x="-167341" y="3089836"/>
-            <a:ext cx="12460941" cy="3881718"/>
-          </a:xfrm>
-          <a:prstGeom prst="rect">
-            <a:avLst/>
-          </a:prstGeom>
-        </p:spPr>
-      </p:pic>
     </p:spTree>
     <p:extLst>
       <p:ext uri="{BB962C8B-B14F-4D97-AF65-F5344CB8AC3E}">
-        <p14:creationId xmlns:p14="http://schemas.microsoft.com/office/powerpoint/2010/main" val="3478512421"/>
+        <p14:creationId xmlns:p14="http://schemas.microsoft.com/office/powerpoint/2010/main" val="521107553"/>
       </p:ext>
     </p:extLst>
   </p:cSld>
@@ -10309,9 +10666,7 @@
           </a:xfrm>
         </p:spPr>
         <p:txBody>
-          <a:bodyPr anchor="ctr">
-            <a:normAutofit/>
-          </a:bodyPr>
+          <a:bodyPr anchor="ctr"/>
           <a:lstStyle/>
           <a:p>
             <a:r>
@@ -10319,8 +10674,7 @@
                 <a:solidFill>
                   <a:srgbClr val="FFEAC9"/>
                 </a:solidFill>
-                <a:latin typeface="Dubai" panose="020B0503030403030204" pitchFamily="34" charset="-78"/>
-                <a:cs typeface="Dubai" panose="020B0503030403030204" pitchFamily="34" charset="-78"/>
+                <a:latin typeface="AR BONNIE" panose="02000000000000000000" pitchFamily="2" charset="0"/>
               </a:rPr>
               <a:t>kvaish</a:t>
             </a:r>
@@ -10360,7 +10714,7 @@
     </p:spTree>
     <p:extLst>
       <p:ext uri="{BB962C8B-B14F-4D97-AF65-F5344CB8AC3E}">
-        <p14:creationId xmlns:p14="http://schemas.microsoft.com/office/powerpoint/2010/main" val="1821017117"/>
+        <p14:creationId xmlns:p14="http://schemas.microsoft.com/office/powerpoint/2010/main" val="2657985456"/>
       </p:ext>
     </p:extLst>
   </p:cSld>
@@ -10418,9 +10772,7 @@
           </a:xfrm>
         </p:spPr>
         <p:txBody>
-          <a:bodyPr anchor="ctr">
-            <a:normAutofit/>
-          </a:bodyPr>
+          <a:bodyPr anchor="ctr"/>
           <a:lstStyle/>
           <a:p>
             <a:r>
@@ -10428,8 +10780,7 @@
                 <a:solidFill>
                   <a:srgbClr val="FFEAC9"/>
                 </a:solidFill>
-                <a:latin typeface="Eras Medium ITC" panose="020B0602030504020804" pitchFamily="34" charset="0"/>
-                <a:cs typeface="Dubai" panose="020B0503030403030204" pitchFamily="34" charset="-78"/>
+                <a:latin typeface="Century Gothic" panose="020B0502020202020204" pitchFamily="34" charset="0"/>
               </a:rPr>
               <a:t>kvaish</a:t>
             </a:r>
@@ -10469,7 +10820,7 @@
     </p:spTree>
     <p:extLst>
       <p:ext uri="{BB962C8B-B14F-4D97-AF65-F5344CB8AC3E}">
-        <p14:creationId xmlns:p14="http://schemas.microsoft.com/office/powerpoint/2010/main" val="1329085931"/>
+        <p14:creationId xmlns:p14="http://schemas.microsoft.com/office/powerpoint/2010/main" val="3478512421"/>
       </p:ext>
     </p:extLst>
   </p:cSld>
@@ -10537,7 +10888,7 @@
                 <a:solidFill>
                   <a:srgbClr val="FFEAC9"/>
                 </a:solidFill>
-                <a:latin typeface="Gabriola" panose="04040605051002020D02" pitchFamily="82" charset="0"/>
+                <a:latin typeface="Dubai" panose="020B0503030403030204" pitchFamily="34" charset="-78"/>
                 <a:cs typeface="Dubai" panose="020B0503030403030204" pitchFamily="34" charset="-78"/>
               </a:rPr>
               <a:t>kvaish</a:t>
@@ -10578,7 +10929,7 @@
     </p:spTree>
     <p:extLst>
       <p:ext uri="{BB962C8B-B14F-4D97-AF65-F5344CB8AC3E}">
-        <p14:creationId xmlns:p14="http://schemas.microsoft.com/office/powerpoint/2010/main" val="2198146352"/>
+        <p14:creationId xmlns:p14="http://schemas.microsoft.com/office/powerpoint/2010/main" val="1821017117"/>
       </p:ext>
     </p:extLst>
   </p:cSld>
@@ -10646,6 +10997,224 @@
                 <a:solidFill>
                   <a:srgbClr val="FFEAC9"/>
                 </a:solidFill>
+                <a:latin typeface="Eras Medium ITC" panose="020B0602030504020804" pitchFamily="34" charset="0"/>
+                <a:cs typeface="Dubai" panose="020B0503030403030204" pitchFamily="34" charset="-78"/>
+              </a:rPr>
+              <a:t>kvaish</a:t>
+            </a:r>
+          </a:p>
+        </p:txBody>
+      </p:sp>
+      <p:pic>
+        <p:nvPicPr>
+          <p:cNvPr id="3" name="Picture 2">
+            <a:extLst>
+              <a:ext uri="{FF2B5EF4-FFF2-40B4-BE49-F238E27FC236}">
+                <a16:creationId xmlns:a16="http://schemas.microsoft.com/office/drawing/2014/main" id="{B3553EDE-3EDF-4BBE-B0E5-576B7E1FB88C}"/>
+              </a:ext>
+            </a:extLst>
+          </p:cNvPr>
+          <p:cNvPicPr>
+            <a:picLocks noChangeAspect="1"/>
+          </p:cNvPicPr>
+          <p:nvPr/>
+        </p:nvPicPr>
+        <p:blipFill>
+          <a:blip r:embed="rId2"/>
+          <a:stretch>
+            <a:fillRect/>
+          </a:stretch>
+        </p:blipFill>
+        <p:spPr>
+          <a:xfrm>
+            <a:off x="-167341" y="3089836"/>
+            <a:ext cx="12460941" cy="3881718"/>
+          </a:xfrm>
+          <a:prstGeom prst="rect">
+            <a:avLst/>
+          </a:prstGeom>
+        </p:spPr>
+      </p:pic>
+    </p:spTree>
+    <p:extLst>
+      <p:ext uri="{BB962C8B-B14F-4D97-AF65-F5344CB8AC3E}">
+        <p14:creationId xmlns:p14="http://schemas.microsoft.com/office/powerpoint/2010/main" val="1329085931"/>
+      </p:ext>
+    </p:extLst>
+  </p:cSld>
+  <p:clrMapOvr>
+    <a:masterClrMapping/>
+  </p:clrMapOvr>
+</p:sld>
+</file>
+
+<file path=ppt/slides/slide24.xml><?xml version="1.0" encoding="utf-8"?>
+<p:sld xmlns:a="http://schemas.openxmlformats.org/drawingml/2006/main" xmlns:r="http://schemas.openxmlformats.org/officeDocument/2006/relationships" xmlns:p="http://schemas.openxmlformats.org/presentationml/2006/main">
+  <p:cSld>
+    <p:bg>
+      <p:bgPr>
+        <a:solidFill>
+          <a:srgbClr val="DF9E63"/>
+        </a:solidFill>
+        <a:effectLst/>
+      </p:bgPr>
+    </p:bg>
+    <p:spTree>
+      <p:nvGrpSpPr>
+        <p:cNvPr id="1" name=""/>
+        <p:cNvGrpSpPr/>
+        <p:nvPr/>
+      </p:nvGrpSpPr>
+      <p:grpSpPr>
+        <a:xfrm>
+          <a:off x="0" y="0"/>
+          <a:ext cx="0" cy="0"/>
+          <a:chOff x="0" y="0"/>
+          <a:chExt cx="0" cy="0"/>
+        </a:xfrm>
+      </p:grpSpPr>
+      <p:sp>
+        <p:nvSpPr>
+          <p:cNvPr id="2" name="Title 1">
+            <a:extLst>
+              <a:ext uri="{FF2B5EF4-FFF2-40B4-BE49-F238E27FC236}">
+                <a16:creationId xmlns:a16="http://schemas.microsoft.com/office/drawing/2014/main" id="{9AAAD01F-5244-4614-B534-B6D1F6DE6283}"/>
+              </a:ext>
+            </a:extLst>
+          </p:cNvPr>
+          <p:cNvSpPr>
+            <a:spLocks noGrp="1"/>
+          </p:cNvSpPr>
+          <p:nvPr>
+            <p:ph type="ctrTitle"/>
+          </p:nvPr>
+        </p:nvSpPr>
+        <p:spPr>
+          <a:xfrm>
+            <a:off x="340659" y="1062599"/>
+            <a:ext cx="2569882" cy="1220413"/>
+          </a:xfrm>
+        </p:spPr>
+        <p:txBody>
+          <a:bodyPr anchor="ctr">
+            <a:normAutofit/>
+          </a:bodyPr>
+          <a:lstStyle/>
+          <a:p>
+            <a:r>
+              <a:rPr lang="en-US" b="1" dirty="0">
+                <a:solidFill>
+                  <a:srgbClr val="FFEAC9"/>
+                </a:solidFill>
+                <a:latin typeface="Gabriola" panose="04040605051002020D02" pitchFamily="82" charset="0"/>
+                <a:cs typeface="Dubai" panose="020B0503030403030204" pitchFamily="34" charset="-78"/>
+              </a:rPr>
+              <a:t>kvaish</a:t>
+            </a:r>
+          </a:p>
+        </p:txBody>
+      </p:sp>
+      <p:pic>
+        <p:nvPicPr>
+          <p:cNvPr id="3" name="Picture 2">
+            <a:extLst>
+              <a:ext uri="{FF2B5EF4-FFF2-40B4-BE49-F238E27FC236}">
+                <a16:creationId xmlns:a16="http://schemas.microsoft.com/office/drawing/2014/main" id="{B3553EDE-3EDF-4BBE-B0E5-576B7E1FB88C}"/>
+              </a:ext>
+            </a:extLst>
+          </p:cNvPr>
+          <p:cNvPicPr>
+            <a:picLocks noChangeAspect="1"/>
+          </p:cNvPicPr>
+          <p:nvPr/>
+        </p:nvPicPr>
+        <p:blipFill>
+          <a:blip r:embed="rId2"/>
+          <a:stretch>
+            <a:fillRect/>
+          </a:stretch>
+        </p:blipFill>
+        <p:spPr>
+          <a:xfrm>
+            <a:off x="-167341" y="3089836"/>
+            <a:ext cx="12460941" cy="3881718"/>
+          </a:xfrm>
+          <a:prstGeom prst="rect">
+            <a:avLst/>
+          </a:prstGeom>
+        </p:spPr>
+      </p:pic>
+    </p:spTree>
+    <p:extLst>
+      <p:ext uri="{BB962C8B-B14F-4D97-AF65-F5344CB8AC3E}">
+        <p14:creationId xmlns:p14="http://schemas.microsoft.com/office/powerpoint/2010/main" val="2198146352"/>
+      </p:ext>
+    </p:extLst>
+  </p:cSld>
+  <p:clrMapOvr>
+    <a:masterClrMapping/>
+  </p:clrMapOvr>
+</p:sld>
+</file>
+
+<file path=ppt/slides/slide25.xml><?xml version="1.0" encoding="utf-8"?>
+<p:sld xmlns:a="http://schemas.openxmlformats.org/drawingml/2006/main" xmlns:r="http://schemas.openxmlformats.org/officeDocument/2006/relationships" xmlns:p="http://schemas.openxmlformats.org/presentationml/2006/main">
+  <p:cSld>
+    <p:bg>
+      <p:bgPr>
+        <a:solidFill>
+          <a:srgbClr val="DF9E63"/>
+        </a:solidFill>
+        <a:effectLst/>
+      </p:bgPr>
+    </p:bg>
+    <p:spTree>
+      <p:nvGrpSpPr>
+        <p:cNvPr id="1" name=""/>
+        <p:cNvGrpSpPr/>
+        <p:nvPr/>
+      </p:nvGrpSpPr>
+      <p:grpSpPr>
+        <a:xfrm>
+          <a:off x="0" y="0"/>
+          <a:ext cx="0" cy="0"/>
+          <a:chOff x="0" y="0"/>
+          <a:chExt cx="0" cy="0"/>
+        </a:xfrm>
+      </p:grpSpPr>
+      <p:sp>
+        <p:nvSpPr>
+          <p:cNvPr id="2" name="Title 1">
+            <a:extLst>
+              <a:ext uri="{FF2B5EF4-FFF2-40B4-BE49-F238E27FC236}">
+                <a16:creationId xmlns:a16="http://schemas.microsoft.com/office/drawing/2014/main" id="{9AAAD01F-5244-4614-B534-B6D1F6DE6283}"/>
+              </a:ext>
+            </a:extLst>
+          </p:cNvPr>
+          <p:cNvSpPr>
+            <a:spLocks noGrp="1"/>
+          </p:cNvSpPr>
+          <p:nvPr>
+            <p:ph type="ctrTitle"/>
+          </p:nvPr>
+        </p:nvSpPr>
+        <p:spPr>
+          <a:xfrm>
+            <a:off x="340659" y="1062599"/>
+            <a:ext cx="2569882" cy="1220413"/>
+          </a:xfrm>
+        </p:spPr>
+        <p:txBody>
+          <a:bodyPr anchor="ctr">
+            <a:normAutofit/>
+          </a:bodyPr>
+          <a:lstStyle/>
+          <a:p>
+            <a:r>
+              <a:rPr lang="en-US" b="1" dirty="0">
+                <a:solidFill>
+                  <a:srgbClr val="FFEAC9"/>
+                </a:solidFill>
                 <a:latin typeface="Josefin Sans" pitchFamily="2" charset="0"/>
                 <a:cs typeface="Dubai" panose="020B0503030403030204" pitchFamily="34" charset="-78"/>
               </a:rPr>
@@ -10753,126 +11322,6 @@
         <p:spPr>
           <a:xfrm>
             <a:off x="516965" y="3641447"/>
-            <a:ext cx="2569882" cy="1220413"/>
-          </a:xfrm>
-          <a:prstGeom prst="rect">
-            <a:avLst/>
-          </a:prstGeom>
-        </p:spPr>
-        <p:txBody>
-          <a:bodyPr vert="horz" lIns="91440" tIns="45720" rIns="91440" bIns="45720" rtlCol="0" anchor="ctr">
-            <a:normAutofit/>
-          </a:bodyPr>
-          <a:lstStyle>
-            <a:lvl1pPr algn="ctr" defTabSz="914400" rtl="0" eaLnBrk="1" latinLnBrk="0" hangingPunct="1">
-              <a:lnSpc>
-                <a:spcPct val="90000"/>
-              </a:lnSpc>
-              <a:spcBef>
-                <a:spcPct val="0"/>
-              </a:spcBef>
-              <a:buNone/>
-              <a:defRPr sz="6000" kern="1200">
-                <a:solidFill>
-                  <a:schemeClr val="tx1"/>
-                </a:solidFill>
-                <a:latin typeface="+mj-lt"/>
-                <a:ea typeface="+mj-ea"/>
-                <a:cs typeface="+mj-cs"/>
-              </a:defRPr>
-            </a:lvl1pPr>
-          </a:lstStyle>
-          <a:p>
-            <a:r>
-              <a:rPr lang="en-US" b="1" dirty="0">
-                <a:solidFill>
-                  <a:srgbClr val="C97529"/>
-                </a:solidFill>
-                <a:latin typeface="Josefin Sans" pitchFamily="2" charset="0"/>
-                <a:cs typeface="Dubai" panose="020B0503030403030204" pitchFamily="34" charset="-78"/>
-              </a:rPr>
-              <a:t>Header</a:t>
-            </a:r>
-          </a:p>
-        </p:txBody>
-      </p:sp>
-      <p:sp>
-        <p:nvSpPr>
-          <p:cNvPr id="7" name="Title 1">
-            <a:extLst>
-              <a:ext uri="{FF2B5EF4-FFF2-40B4-BE49-F238E27FC236}">
-                <a16:creationId xmlns:a16="http://schemas.microsoft.com/office/drawing/2014/main" id="{36E643B4-C94B-40F6-BC7C-1C0833906455}"/>
-              </a:ext>
-            </a:extLst>
-          </p:cNvPr>
-          <p:cNvSpPr txBox="1">
-            <a:spLocks/>
-          </p:cNvSpPr>
-          <p:nvPr/>
-        </p:nvSpPr>
-        <p:spPr>
-          <a:xfrm>
-            <a:off x="516965" y="5030695"/>
-            <a:ext cx="2569882" cy="1220413"/>
-          </a:xfrm>
-          <a:prstGeom prst="rect">
-            <a:avLst/>
-          </a:prstGeom>
-        </p:spPr>
-        <p:txBody>
-          <a:bodyPr vert="horz" lIns="91440" tIns="45720" rIns="91440" bIns="45720" rtlCol="0" anchor="ctr">
-            <a:normAutofit fontScale="92500"/>
-          </a:bodyPr>
-          <a:lstStyle>
-            <a:lvl1pPr algn="ctr" defTabSz="914400" rtl="0" eaLnBrk="1" latinLnBrk="0" hangingPunct="1">
-              <a:lnSpc>
-                <a:spcPct val="90000"/>
-              </a:lnSpc>
-              <a:spcBef>
-                <a:spcPct val="0"/>
-              </a:spcBef>
-              <a:buNone/>
-              <a:defRPr sz="6000" kern="1200">
-                <a:solidFill>
-                  <a:schemeClr val="tx1"/>
-                </a:solidFill>
-                <a:latin typeface="+mj-lt"/>
-                <a:ea typeface="+mj-ea"/>
-                <a:cs typeface="+mj-cs"/>
-              </a:defRPr>
-            </a:lvl1pPr>
-          </a:lstStyle>
-          <a:p>
-            <a:r>
-              <a:rPr lang="en-US" b="1" dirty="0">
-                <a:solidFill>
-                  <a:srgbClr val="DF9E63"/>
-                </a:solidFill>
-                <a:latin typeface="Josefin Sans" pitchFamily="2" charset="0"/>
-                <a:cs typeface="Dubai" panose="020B0503030403030204" pitchFamily="34" charset="-78"/>
-              </a:rPr>
-              <a:t>content</a:t>
-            </a:r>
-          </a:p>
-        </p:txBody>
-      </p:sp>
-      <p:sp>
-        <p:nvSpPr>
-          <p:cNvPr id="9" name="Title 1">
-            <a:extLst>
-              <a:ext uri="{FF2B5EF4-FFF2-40B4-BE49-F238E27FC236}">
-                <a16:creationId xmlns:a16="http://schemas.microsoft.com/office/drawing/2014/main" id="{FD7D1842-65C1-48C6-BFE0-E05511A7680B}"/>
-              </a:ext>
-            </a:extLst>
-          </p:cNvPr>
-          <p:cNvSpPr txBox="1">
-            <a:spLocks/>
-          </p:cNvSpPr>
-          <p:nvPr/>
-        </p:nvSpPr>
-        <p:spPr>
-          <a:xfrm>
-            <a:off x="9399775" y="0"/>
             <a:ext cx="2569882" cy="1220413"/>
           </a:xfrm>
           <a:prstGeom prst="rect">
@@ -10905,20 +11354,23 @@
           <a:p>
             <a:r>
               <a:rPr lang="en-US" b="1" dirty="0">
+                <a:solidFill>
+                  <a:srgbClr val="C97529"/>
+                </a:solidFill>
                 <a:latin typeface="Josefin Sans" pitchFamily="2" charset="0"/>
                 <a:cs typeface="Dubai" panose="020B0503030403030204" pitchFamily="34" charset="-78"/>
               </a:rPr>
-              <a:t>#de9e63</a:t>
+              <a:t>Header</a:t>
             </a:r>
           </a:p>
         </p:txBody>
       </p:sp>
       <p:sp>
         <p:nvSpPr>
-          <p:cNvPr id="10" name="Title 1">
-            <a:extLst>
-              <a:ext uri="{FF2B5EF4-FFF2-40B4-BE49-F238E27FC236}">
-                <a16:creationId xmlns:a16="http://schemas.microsoft.com/office/drawing/2014/main" id="{699114F4-719C-45A0-B850-66FB6B8B7138}"/>
+          <p:cNvPr id="7" name="Title 1">
+            <a:extLst>
+              <a:ext uri="{FF2B5EF4-FFF2-40B4-BE49-F238E27FC236}">
+                <a16:creationId xmlns:a16="http://schemas.microsoft.com/office/drawing/2014/main" id="{36E643B4-C94B-40F6-BC7C-1C0833906455}"/>
               </a:ext>
             </a:extLst>
           </p:cNvPr>
@@ -10929,64 +11381,7 @@
         </p:nvSpPr>
         <p:spPr>
           <a:xfrm>
-            <a:off x="9395666" y="5681012"/>
-            <a:ext cx="2569882" cy="1220413"/>
-          </a:xfrm>
-          <a:prstGeom prst="rect">
-            <a:avLst/>
-          </a:prstGeom>
-        </p:spPr>
-        <p:txBody>
-          <a:bodyPr vert="horz" lIns="91440" tIns="45720" rIns="91440" bIns="45720" rtlCol="0" anchor="ctr">
-            <a:normAutofit/>
-          </a:bodyPr>
-          <a:lstStyle>
-            <a:lvl1pPr algn="ctr" defTabSz="914400" rtl="0" eaLnBrk="1" latinLnBrk="0" hangingPunct="1">
-              <a:lnSpc>
-                <a:spcPct val="90000"/>
-              </a:lnSpc>
-              <a:spcBef>
-                <a:spcPct val="0"/>
-              </a:spcBef>
-              <a:buNone/>
-              <a:defRPr sz="6000" kern="1200">
-                <a:solidFill>
-                  <a:schemeClr val="tx1"/>
-                </a:solidFill>
-                <a:latin typeface="+mj-lt"/>
-                <a:ea typeface="+mj-ea"/>
-                <a:cs typeface="+mj-cs"/>
-              </a:defRPr>
-            </a:lvl1pPr>
-          </a:lstStyle>
-          <a:p>
-            <a:r>
-              <a:rPr lang="en-US" b="1" dirty="0">
-                <a:latin typeface="Josefin Sans" pitchFamily="2" charset="0"/>
-                <a:cs typeface="Dubai" panose="020B0503030403030204" pitchFamily="34" charset="-78"/>
-              </a:rPr>
-              <a:t>#ffefd9</a:t>
-            </a:r>
-          </a:p>
-        </p:txBody>
-      </p:sp>
-      <p:sp>
-        <p:nvSpPr>
-          <p:cNvPr id="11" name="Title 1">
-            <a:extLst>
-              <a:ext uri="{FF2B5EF4-FFF2-40B4-BE49-F238E27FC236}">
-                <a16:creationId xmlns:a16="http://schemas.microsoft.com/office/drawing/2014/main" id="{839C9C29-72DE-473B-ABF8-53092DEDC6C6}"/>
-              </a:ext>
-            </a:extLst>
-          </p:cNvPr>
-          <p:cNvSpPr txBox="1">
-            <a:spLocks/>
-          </p:cNvSpPr>
-          <p:nvPr/>
-        </p:nvSpPr>
-        <p:spPr>
-          <a:xfrm>
-            <a:off x="9395666" y="3794547"/>
+            <a:off x="516965" y="5030695"/>
             <a:ext cx="2569882" cy="1220413"/>
           </a:xfrm>
           <a:prstGeom prst="rect">
@@ -11019,110 +11414,23 @@
           <a:p>
             <a:r>
               <a:rPr lang="en-US" b="1" dirty="0">
+                <a:solidFill>
+                  <a:srgbClr val="DF9E63"/>
+                </a:solidFill>
                 <a:latin typeface="Josefin Sans" pitchFamily="2" charset="0"/>
                 <a:cs typeface="Dubai" panose="020B0503030403030204" pitchFamily="34" charset="-78"/>
               </a:rPr>
-              <a:t>#c97529</a:t>
+              <a:t>content</a:t>
             </a:r>
           </a:p>
         </p:txBody>
       </p:sp>
-      <p:pic>
-        <p:nvPicPr>
-          <p:cNvPr id="12" name="Picture 11">
-            <a:extLst>
-              <a:ext uri="{FF2B5EF4-FFF2-40B4-BE49-F238E27FC236}">
-                <a16:creationId xmlns:a16="http://schemas.microsoft.com/office/drawing/2014/main" id="{336A2928-C929-46E7-88B5-3F260E0E0737}"/>
-              </a:ext>
-            </a:extLst>
-          </p:cNvPr>
-          <p:cNvPicPr>
-            <a:picLocks noChangeAspect="1"/>
-          </p:cNvPicPr>
-          <p:nvPr/>
-        </p:nvPicPr>
-        <p:blipFill>
-          <a:blip r:embed="rId3"/>
-          <a:stretch>
-            <a:fillRect/>
-          </a:stretch>
-        </p:blipFill>
-        <p:spPr>
-          <a:xfrm>
-            <a:off x="12811125" y="138674"/>
-            <a:ext cx="895350" cy="923925"/>
-          </a:xfrm>
-          <a:prstGeom prst="rect">
-            <a:avLst/>
-          </a:prstGeom>
-        </p:spPr>
-      </p:pic>
-      <p:pic>
-        <p:nvPicPr>
-          <p:cNvPr id="13" name="Picture 12">
-            <a:extLst>
-              <a:ext uri="{FF2B5EF4-FFF2-40B4-BE49-F238E27FC236}">
-                <a16:creationId xmlns:a16="http://schemas.microsoft.com/office/drawing/2014/main" id="{9EA7936F-6002-4A31-80B0-515F201D0649}"/>
-              </a:ext>
-            </a:extLst>
-          </p:cNvPr>
-          <p:cNvPicPr>
-            <a:picLocks noChangeAspect="1"/>
-          </p:cNvPicPr>
-          <p:nvPr/>
-        </p:nvPicPr>
-        <p:blipFill>
-          <a:blip r:embed="rId4"/>
-          <a:stretch>
-            <a:fillRect/>
-          </a:stretch>
-        </p:blipFill>
-        <p:spPr>
-          <a:xfrm>
-            <a:off x="12792075" y="1821049"/>
-            <a:ext cx="933450" cy="923925"/>
-          </a:xfrm>
-          <a:prstGeom prst="rect">
-            <a:avLst/>
-          </a:prstGeom>
-        </p:spPr>
-      </p:pic>
-      <p:pic>
-        <p:nvPicPr>
-          <p:cNvPr id="14" name="Picture 13">
-            <a:extLst>
-              <a:ext uri="{FF2B5EF4-FFF2-40B4-BE49-F238E27FC236}">
-                <a16:creationId xmlns:a16="http://schemas.microsoft.com/office/drawing/2014/main" id="{32381728-761F-41F8-B856-239DBA8EC312}"/>
-              </a:ext>
-            </a:extLst>
-          </p:cNvPr>
-          <p:cNvPicPr>
-            <a:picLocks noChangeAspect="1"/>
-          </p:cNvPicPr>
-          <p:nvPr/>
-        </p:nvPicPr>
-        <p:blipFill>
-          <a:blip r:embed="rId5"/>
-          <a:stretch>
-            <a:fillRect/>
-          </a:stretch>
-        </p:blipFill>
-        <p:spPr>
-          <a:xfrm>
-            <a:off x="12782550" y="3669834"/>
-            <a:ext cx="942975" cy="914400"/>
-          </a:xfrm>
-          <a:prstGeom prst="rect">
-            <a:avLst/>
-          </a:prstGeom>
-        </p:spPr>
-      </p:pic>
-      <p:sp>
-        <p:nvSpPr>
-          <p:cNvPr id="15" name="Title 1">
-            <a:extLst>
-              <a:ext uri="{FF2B5EF4-FFF2-40B4-BE49-F238E27FC236}">
-                <a16:creationId xmlns:a16="http://schemas.microsoft.com/office/drawing/2014/main" id="{7F70C19C-762D-4759-BA36-752A2D268027}"/>
+      <p:sp>
+        <p:nvSpPr>
+          <p:cNvPr id="9" name="Title 1">
+            <a:extLst>
+              <a:ext uri="{FF2B5EF4-FFF2-40B4-BE49-F238E27FC236}">
+                <a16:creationId xmlns:a16="http://schemas.microsoft.com/office/drawing/2014/main" id="{FD7D1842-65C1-48C6-BFE0-E05511A7680B}"/>
               </a:ext>
             </a:extLst>
           </p:cNvPr>
@@ -11133,7 +11441,64 @@
         </p:nvSpPr>
         <p:spPr>
           <a:xfrm>
-            <a:off x="13927605" y="115563"/>
+            <a:off x="9399775" y="0"/>
+            <a:ext cx="2569882" cy="1220413"/>
+          </a:xfrm>
+          <a:prstGeom prst="rect">
+            <a:avLst/>
+          </a:prstGeom>
+        </p:spPr>
+        <p:txBody>
+          <a:bodyPr vert="horz" lIns="91440" tIns="45720" rIns="91440" bIns="45720" rtlCol="0" anchor="ctr">
+            <a:normAutofit fontScale="77500" lnSpcReduction="20000"/>
+          </a:bodyPr>
+          <a:lstStyle>
+            <a:lvl1pPr algn="ctr" defTabSz="914400" rtl="0" eaLnBrk="1" latinLnBrk="0" hangingPunct="1">
+              <a:lnSpc>
+                <a:spcPct val="90000"/>
+              </a:lnSpc>
+              <a:spcBef>
+                <a:spcPct val="0"/>
+              </a:spcBef>
+              <a:buNone/>
+              <a:defRPr sz="6000" kern="1200">
+                <a:solidFill>
+                  <a:schemeClr val="tx1"/>
+                </a:solidFill>
+                <a:latin typeface="+mj-lt"/>
+                <a:ea typeface="+mj-ea"/>
+                <a:cs typeface="+mj-cs"/>
+              </a:defRPr>
+            </a:lvl1pPr>
+          </a:lstStyle>
+          <a:p>
+            <a:r>
+              <a:rPr lang="en-US" b="1" dirty="0">
+                <a:latin typeface="Josefin Sans" pitchFamily="2" charset="0"/>
+                <a:cs typeface="Dubai" panose="020B0503030403030204" pitchFamily="34" charset="-78"/>
+              </a:rPr>
+              <a:t>#de9e63</a:t>
+            </a:r>
+          </a:p>
+        </p:txBody>
+      </p:sp>
+      <p:sp>
+        <p:nvSpPr>
+          <p:cNvPr id="10" name="Title 1">
+            <a:extLst>
+              <a:ext uri="{FF2B5EF4-FFF2-40B4-BE49-F238E27FC236}">
+                <a16:creationId xmlns:a16="http://schemas.microsoft.com/office/drawing/2014/main" id="{699114F4-719C-45A0-B850-66FB6B8B7138}"/>
+              </a:ext>
+            </a:extLst>
+          </p:cNvPr>
+          <p:cNvSpPr txBox="1">
+            <a:spLocks/>
+          </p:cNvSpPr>
+          <p:nvPr/>
+        </p:nvSpPr>
+        <p:spPr>
+          <a:xfrm>
+            <a:off x="9395666" y="5681012"/>
             <a:ext cx="2569882" cy="1220413"/>
           </a:xfrm>
           <a:prstGeom prst="rect">
@@ -11169,17 +11534,17 @@
                 <a:latin typeface="Josefin Sans" pitchFamily="2" charset="0"/>
                 <a:cs typeface="Dubai" panose="020B0503030403030204" pitchFamily="34" charset="-78"/>
               </a:rPr>
-              <a:t>#de9e63</a:t>
+              <a:t>#ffefd9</a:t>
             </a:r>
           </a:p>
         </p:txBody>
       </p:sp>
       <p:sp>
         <p:nvSpPr>
-          <p:cNvPr id="16" name="Title 1">
-            <a:extLst>
-              <a:ext uri="{FF2B5EF4-FFF2-40B4-BE49-F238E27FC236}">
-                <a16:creationId xmlns:a16="http://schemas.microsoft.com/office/drawing/2014/main" id="{73880714-783B-4229-978A-4F26FEC8392A}"/>
+          <p:cNvPr id="11" name="Title 1">
+            <a:extLst>
+              <a:ext uri="{FF2B5EF4-FFF2-40B4-BE49-F238E27FC236}">
+                <a16:creationId xmlns:a16="http://schemas.microsoft.com/office/drawing/2014/main" id="{839C9C29-72DE-473B-ABF8-53092DEDC6C6}"/>
               </a:ext>
             </a:extLst>
           </p:cNvPr>
@@ -11190,7 +11555,268 @@
         </p:nvSpPr>
         <p:spPr>
           <a:xfrm>
+            <a:off x="9395666" y="3794547"/>
+            <a:ext cx="2569882" cy="1220413"/>
+          </a:xfrm>
+          <a:prstGeom prst="rect">
+            <a:avLst/>
+          </a:prstGeom>
+        </p:spPr>
+        <p:txBody>
+          <a:bodyPr vert="horz" lIns="91440" tIns="45720" rIns="91440" bIns="45720" rtlCol="0" anchor="ctr">
+            <a:normAutofit fontScale="77500" lnSpcReduction="20000"/>
+          </a:bodyPr>
+          <a:lstStyle>
+            <a:lvl1pPr algn="ctr" defTabSz="914400" rtl="0" eaLnBrk="1" latinLnBrk="0" hangingPunct="1">
+              <a:lnSpc>
+                <a:spcPct val="90000"/>
+              </a:lnSpc>
+              <a:spcBef>
+                <a:spcPct val="0"/>
+              </a:spcBef>
+              <a:buNone/>
+              <a:defRPr sz="6000" kern="1200">
+                <a:solidFill>
+                  <a:schemeClr val="tx1"/>
+                </a:solidFill>
+                <a:latin typeface="+mj-lt"/>
+                <a:ea typeface="+mj-ea"/>
+                <a:cs typeface="+mj-cs"/>
+              </a:defRPr>
+            </a:lvl1pPr>
+          </a:lstStyle>
+          <a:p>
+            <a:r>
+              <a:rPr lang="en-US" b="1" dirty="0">
+                <a:latin typeface="Josefin Sans" pitchFamily="2" charset="0"/>
+                <a:cs typeface="Dubai" panose="020B0503030403030204" pitchFamily="34" charset="-78"/>
+              </a:rPr>
+              <a:t>#c97529</a:t>
+            </a:r>
+          </a:p>
+        </p:txBody>
+      </p:sp>
+      <p:pic>
+        <p:nvPicPr>
+          <p:cNvPr id="12" name="Picture 11">
+            <a:extLst>
+              <a:ext uri="{FF2B5EF4-FFF2-40B4-BE49-F238E27FC236}">
+                <a16:creationId xmlns:a16="http://schemas.microsoft.com/office/drawing/2014/main" id="{336A2928-C929-46E7-88B5-3F260E0E0737}"/>
+              </a:ext>
+            </a:extLst>
+          </p:cNvPr>
+          <p:cNvPicPr>
+            <a:picLocks noChangeAspect="1"/>
+          </p:cNvPicPr>
+          <p:nvPr/>
+        </p:nvPicPr>
+        <p:blipFill>
+          <a:blip r:embed="rId3"/>
+          <a:stretch>
+            <a:fillRect/>
+          </a:stretch>
+        </p:blipFill>
+        <p:spPr>
+          <a:xfrm>
+            <a:off x="12811125" y="138674"/>
+            <a:ext cx="895350" cy="923925"/>
+          </a:xfrm>
+          <a:prstGeom prst="rect">
+            <a:avLst/>
+          </a:prstGeom>
+        </p:spPr>
+      </p:pic>
+      <p:pic>
+        <p:nvPicPr>
+          <p:cNvPr id="13" name="Picture 12">
+            <a:extLst>
+              <a:ext uri="{FF2B5EF4-FFF2-40B4-BE49-F238E27FC236}">
+                <a16:creationId xmlns:a16="http://schemas.microsoft.com/office/drawing/2014/main" id="{9EA7936F-6002-4A31-80B0-515F201D0649}"/>
+              </a:ext>
+            </a:extLst>
+          </p:cNvPr>
+          <p:cNvPicPr>
+            <a:picLocks noChangeAspect="1"/>
+          </p:cNvPicPr>
+          <p:nvPr/>
+        </p:nvPicPr>
+        <p:blipFill>
+          <a:blip r:embed="rId4"/>
+          <a:stretch>
+            <a:fillRect/>
+          </a:stretch>
+        </p:blipFill>
+        <p:spPr>
+          <a:xfrm>
+            <a:off x="12792075" y="1821049"/>
+            <a:ext cx="933450" cy="923925"/>
+          </a:xfrm>
+          <a:prstGeom prst="rect">
+            <a:avLst/>
+          </a:prstGeom>
+        </p:spPr>
+      </p:pic>
+      <p:pic>
+        <p:nvPicPr>
+          <p:cNvPr id="14" name="Picture 13">
+            <a:extLst>
+              <a:ext uri="{FF2B5EF4-FFF2-40B4-BE49-F238E27FC236}">
+                <a16:creationId xmlns:a16="http://schemas.microsoft.com/office/drawing/2014/main" id="{32381728-761F-41F8-B856-239DBA8EC312}"/>
+              </a:ext>
+            </a:extLst>
+          </p:cNvPr>
+          <p:cNvPicPr>
+            <a:picLocks noChangeAspect="1"/>
+          </p:cNvPicPr>
+          <p:nvPr/>
+        </p:nvPicPr>
+        <p:blipFill>
+          <a:blip r:embed="rId5"/>
+          <a:stretch>
+            <a:fillRect/>
+          </a:stretch>
+        </p:blipFill>
+        <p:spPr>
+          <a:xfrm>
+            <a:off x="12782550" y="3669834"/>
+            <a:ext cx="942975" cy="914400"/>
+          </a:xfrm>
+          <a:prstGeom prst="rect">
+            <a:avLst/>
+          </a:prstGeom>
+        </p:spPr>
+      </p:pic>
+      <p:sp>
+        <p:nvSpPr>
+          <p:cNvPr id="15" name="Title 1">
+            <a:extLst>
+              <a:ext uri="{FF2B5EF4-FFF2-40B4-BE49-F238E27FC236}">
+                <a16:creationId xmlns:a16="http://schemas.microsoft.com/office/drawing/2014/main" id="{7F70C19C-762D-4759-BA36-752A2D268027}"/>
+              </a:ext>
+            </a:extLst>
+          </p:cNvPr>
+          <p:cNvSpPr txBox="1">
+            <a:spLocks/>
+          </p:cNvSpPr>
+          <p:nvPr/>
+        </p:nvSpPr>
+        <p:spPr>
+          <a:xfrm>
+            <a:off x="13927605" y="115563"/>
+            <a:ext cx="2569882" cy="1220413"/>
+          </a:xfrm>
+          <a:prstGeom prst="rect">
+            <a:avLst/>
+          </a:prstGeom>
+        </p:spPr>
+        <p:txBody>
+          <a:bodyPr vert="horz" lIns="91440" tIns="45720" rIns="91440" bIns="45720" rtlCol="0" anchor="ctr">
+            <a:normAutofit fontScale="77500" lnSpcReduction="20000"/>
+          </a:bodyPr>
+          <a:lstStyle>
+            <a:lvl1pPr algn="ctr" defTabSz="914400" rtl="0" eaLnBrk="1" latinLnBrk="0" hangingPunct="1">
+              <a:lnSpc>
+                <a:spcPct val="90000"/>
+              </a:lnSpc>
+              <a:spcBef>
+                <a:spcPct val="0"/>
+              </a:spcBef>
+              <a:buNone/>
+              <a:defRPr sz="6000" kern="1200">
+                <a:solidFill>
+                  <a:schemeClr val="tx1"/>
+                </a:solidFill>
+                <a:latin typeface="+mj-lt"/>
+                <a:ea typeface="+mj-ea"/>
+                <a:cs typeface="+mj-cs"/>
+              </a:defRPr>
+            </a:lvl1pPr>
+          </a:lstStyle>
+          <a:p>
+            <a:r>
+              <a:rPr lang="en-US" b="1" dirty="0">
+                <a:latin typeface="Josefin Sans" pitchFamily="2" charset="0"/>
+                <a:cs typeface="Dubai" panose="020B0503030403030204" pitchFamily="34" charset="-78"/>
+              </a:rPr>
+              <a:t>#de9e63</a:t>
+            </a:r>
+          </a:p>
+        </p:txBody>
+      </p:sp>
+      <p:sp>
+        <p:nvSpPr>
+          <p:cNvPr id="16" name="Title 1">
+            <a:extLst>
+              <a:ext uri="{FF2B5EF4-FFF2-40B4-BE49-F238E27FC236}">
+                <a16:creationId xmlns:a16="http://schemas.microsoft.com/office/drawing/2014/main" id="{73880714-783B-4229-978A-4F26FEC8392A}"/>
+              </a:ext>
+            </a:extLst>
+          </p:cNvPr>
+          <p:cNvSpPr txBox="1">
+            <a:spLocks/>
+          </p:cNvSpPr>
+          <p:nvPr/>
+        </p:nvSpPr>
+        <p:spPr>
+          <a:xfrm>
             <a:off x="13927605" y="3516827"/>
+            <a:ext cx="2569882" cy="1220413"/>
+          </a:xfrm>
+          <a:prstGeom prst="rect">
+            <a:avLst/>
+          </a:prstGeom>
+        </p:spPr>
+        <p:txBody>
+          <a:bodyPr vert="horz" lIns="91440" tIns="45720" rIns="91440" bIns="45720" rtlCol="0" anchor="ctr">
+            <a:normAutofit fontScale="77500" lnSpcReduction="20000"/>
+          </a:bodyPr>
+          <a:lstStyle>
+            <a:lvl1pPr algn="ctr" defTabSz="914400" rtl="0" eaLnBrk="1" latinLnBrk="0" hangingPunct="1">
+              <a:lnSpc>
+                <a:spcPct val="90000"/>
+              </a:lnSpc>
+              <a:spcBef>
+                <a:spcPct val="0"/>
+              </a:spcBef>
+              <a:buNone/>
+              <a:defRPr sz="6000" kern="1200">
+                <a:solidFill>
+                  <a:schemeClr val="tx1"/>
+                </a:solidFill>
+                <a:latin typeface="+mj-lt"/>
+                <a:ea typeface="+mj-ea"/>
+                <a:cs typeface="+mj-cs"/>
+              </a:defRPr>
+            </a:lvl1pPr>
+          </a:lstStyle>
+          <a:p>
+            <a:r>
+              <a:rPr lang="en-US" b="1" dirty="0">
+                <a:latin typeface="Josefin Sans" pitchFamily="2" charset="0"/>
+                <a:cs typeface="Dubai" panose="020B0503030403030204" pitchFamily="34" charset="-78"/>
+              </a:rPr>
+              <a:t>#c97529</a:t>
+            </a:r>
+          </a:p>
+        </p:txBody>
+      </p:sp>
+      <p:sp>
+        <p:nvSpPr>
+          <p:cNvPr id="18" name="Title 1">
+            <a:extLst>
+              <a:ext uri="{FF2B5EF4-FFF2-40B4-BE49-F238E27FC236}">
+                <a16:creationId xmlns:a16="http://schemas.microsoft.com/office/drawing/2014/main" id="{EE4E22DF-44DD-4D14-A083-C17119AC68DD}"/>
+              </a:ext>
+            </a:extLst>
+          </p:cNvPr>
+          <p:cNvSpPr txBox="1">
+            <a:spLocks/>
+          </p:cNvSpPr>
+          <p:nvPr/>
+        </p:nvSpPr>
+        <p:spPr>
+          <a:xfrm>
+            <a:off x="13927605" y="1816195"/>
             <a:ext cx="2569882" cy="1220413"/>
           </a:xfrm>
           <a:prstGeom prst="rect">
@@ -11226,63 +11852,6 @@
                 <a:latin typeface="Josefin Sans" pitchFamily="2" charset="0"/>
                 <a:cs typeface="Dubai" panose="020B0503030403030204" pitchFamily="34" charset="-78"/>
               </a:rPr>
-              <a:t>#c97529</a:t>
-            </a:r>
-          </a:p>
-        </p:txBody>
-      </p:sp>
-      <p:sp>
-        <p:nvSpPr>
-          <p:cNvPr id="18" name="Title 1">
-            <a:extLst>
-              <a:ext uri="{FF2B5EF4-FFF2-40B4-BE49-F238E27FC236}">
-                <a16:creationId xmlns:a16="http://schemas.microsoft.com/office/drawing/2014/main" id="{EE4E22DF-44DD-4D14-A083-C17119AC68DD}"/>
-              </a:ext>
-            </a:extLst>
-          </p:cNvPr>
-          <p:cNvSpPr txBox="1">
-            <a:spLocks/>
-          </p:cNvSpPr>
-          <p:nvPr/>
-        </p:nvSpPr>
-        <p:spPr>
-          <a:xfrm>
-            <a:off x="13927605" y="1816195"/>
-            <a:ext cx="2569882" cy="1220413"/>
-          </a:xfrm>
-          <a:prstGeom prst="rect">
-            <a:avLst/>
-          </a:prstGeom>
-        </p:spPr>
-        <p:txBody>
-          <a:bodyPr vert="horz" lIns="91440" tIns="45720" rIns="91440" bIns="45720" rtlCol="0" anchor="ctr">
-            <a:normAutofit/>
-          </a:bodyPr>
-          <a:lstStyle>
-            <a:lvl1pPr algn="ctr" defTabSz="914400" rtl="0" eaLnBrk="1" latinLnBrk="0" hangingPunct="1">
-              <a:lnSpc>
-                <a:spcPct val="90000"/>
-              </a:lnSpc>
-              <a:spcBef>
-                <a:spcPct val="0"/>
-              </a:spcBef>
-              <a:buNone/>
-              <a:defRPr sz="6000" kern="1200">
-                <a:solidFill>
-                  <a:schemeClr val="tx1"/>
-                </a:solidFill>
-                <a:latin typeface="+mj-lt"/>
-                <a:ea typeface="+mj-ea"/>
-                <a:cs typeface="+mj-cs"/>
-              </a:defRPr>
-            </a:lvl1pPr>
-          </a:lstStyle>
-          <a:p>
-            <a:r>
-              <a:rPr lang="en-US" b="1" dirty="0">
-                <a:latin typeface="Josefin Sans" pitchFamily="2" charset="0"/>
-                <a:cs typeface="Dubai" panose="020B0503030403030204" pitchFamily="34" charset="-78"/>
-              </a:rPr>
               <a:t>#ffefd9</a:t>
             </a:r>
           </a:p>
@@ -11301,7 +11870,7 @@
 </p:sld>
 </file>
 
-<file path=ppt/slides/slide24.xml><?xml version="1.0" encoding="utf-8"?>
+<file path=ppt/slides/slide26.xml><?xml version="1.0" encoding="utf-8"?>
 <p:sld xmlns:a="http://schemas.openxmlformats.org/drawingml/2006/main" xmlns:r="http://schemas.openxmlformats.org/officeDocument/2006/relationships" xmlns:p="http://schemas.openxmlformats.org/presentationml/2006/main">
   <p:cSld>
     <p:bg>

</xml_diff>